<commit_message>
add new slides about: Network Manager; Network Manager HUD; and Network Identity
</commit_message>
<xml_diff>
--- a/unity-multiplayer.pptx
+++ b/unity-multiplayer.pptx
@@ -5,13 +5,21 @@
     <p:sldMasterId id="2147483648" r:id="rId1"/>
   </p:sldMasterIdLst>
   <p:notesMasterIdLst>
-    <p:notesMasterId r:id="rId6"/>
+    <p:notesMasterId r:id="rId14"/>
   </p:notesMasterIdLst>
   <p:sldIdLst>
     <p:sldId id="256" r:id="rId2"/>
     <p:sldId id="298" r:id="rId3"/>
     <p:sldId id="353" r:id="rId4"/>
-    <p:sldId id="352" r:id="rId5"/>
+    <p:sldId id="354" r:id="rId5"/>
+    <p:sldId id="356" r:id="rId6"/>
+    <p:sldId id="358" r:id="rId7"/>
+    <p:sldId id="359" r:id="rId8"/>
+    <p:sldId id="355" r:id="rId9"/>
+    <p:sldId id="360" r:id="rId10"/>
+    <p:sldId id="361" r:id="rId11"/>
+    <p:sldId id="357" r:id="rId12"/>
+    <p:sldId id="352" r:id="rId13"/>
   </p:sldIdLst>
   <p:sldSz cx="12192000" cy="6858000"/>
   <p:notesSz cx="6858000" cy="9144000"/>
@@ -200,7 +208,7 @@
           <a:p>
             <a:fld id="{94D3EB41-CF60-4C9F-BD83-AE56FA0945EB}" type="datetimeFigureOut">
               <a:rPr lang="pt-BR" smtClean="0"/>
-              <a:t>19/08/2019</a:t>
+              <a:t>03/09/2019</a:t>
             </a:fld>
             <a:endParaRPr lang="pt-BR"/>
           </a:p>
@@ -358,7 +366,7 @@
           <a:p>
             <a:fld id="{020F486D-935E-4125-8FD7-C735663CC7DE}" type="slidenum">
               <a:rPr lang="pt-BR" smtClean="0"/>
-              <a:t>‹nº›</a:t>
+              <a:t>‹#›</a:t>
             </a:fld>
             <a:endParaRPr lang="pt-BR"/>
           </a:p>
@@ -710,7 +718,7 @@
           <a:p>
             <a:fld id="{9642BF85-54FF-46CE-B398-87F998CFD60B}" type="datetimeFigureOut">
               <a:rPr lang="pt-BR" smtClean="0"/>
-              <a:t>19/08/2019</a:t>
+              <a:t>03/09/2019</a:t>
             </a:fld>
             <a:endParaRPr lang="pt-BR"/>
           </a:p>
@@ -752,7 +760,7 @@
           <a:p>
             <a:fld id="{29185252-FBA3-417A-8652-C405B89605D8}" type="slidenum">
               <a:rPr lang="pt-BR" smtClean="0"/>
-              <a:t>‹nº›</a:t>
+              <a:t>‹#›</a:t>
             </a:fld>
             <a:endParaRPr lang="pt-BR"/>
           </a:p>
@@ -878,7 +886,7 @@
           <a:p>
             <a:fld id="{9642BF85-54FF-46CE-B398-87F998CFD60B}" type="datetimeFigureOut">
               <a:rPr lang="pt-BR" smtClean="0"/>
-              <a:t>19/08/2019</a:t>
+              <a:t>03/09/2019</a:t>
             </a:fld>
             <a:endParaRPr lang="pt-BR"/>
           </a:p>
@@ -920,7 +928,7 @@
           <a:p>
             <a:fld id="{29185252-FBA3-417A-8652-C405B89605D8}" type="slidenum">
               <a:rPr lang="pt-BR" smtClean="0"/>
-              <a:t>‹nº›</a:t>
+              <a:t>‹#›</a:t>
             </a:fld>
             <a:endParaRPr lang="pt-BR"/>
           </a:p>
@@ -1056,7 +1064,7 @@
           <a:p>
             <a:fld id="{9642BF85-54FF-46CE-B398-87F998CFD60B}" type="datetimeFigureOut">
               <a:rPr lang="pt-BR" smtClean="0"/>
-              <a:t>19/08/2019</a:t>
+              <a:t>03/09/2019</a:t>
             </a:fld>
             <a:endParaRPr lang="pt-BR"/>
           </a:p>
@@ -1098,7 +1106,7 @@
           <a:p>
             <a:fld id="{29185252-FBA3-417A-8652-C405B89605D8}" type="slidenum">
               <a:rPr lang="pt-BR" smtClean="0"/>
-              <a:t>‹nº›</a:t>
+              <a:t>‹#›</a:t>
             </a:fld>
             <a:endParaRPr lang="pt-BR"/>
           </a:p>
@@ -1393,7 +1401,7 @@
           <a:p>
             <a:fld id="{9642BF85-54FF-46CE-B398-87F998CFD60B}" type="datetimeFigureOut">
               <a:rPr lang="pt-BR" smtClean="0"/>
-              <a:t>19/08/2019</a:t>
+              <a:t>03/09/2019</a:t>
             </a:fld>
             <a:endParaRPr lang="pt-BR"/>
           </a:p>
@@ -1435,7 +1443,7 @@
           <a:p>
             <a:fld id="{29185252-FBA3-417A-8652-C405B89605D8}" type="slidenum">
               <a:rPr lang="pt-BR" smtClean="0"/>
-              <a:t>‹nº›</a:t>
+              <a:t>‹#›</a:t>
             </a:fld>
             <a:endParaRPr lang="pt-BR"/>
           </a:p>
@@ -1664,7 +1672,7 @@
           <a:p>
             <a:fld id="{9642BF85-54FF-46CE-B398-87F998CFD60B}" type="datetimeFigureOut">
               <a:rPr lang="pt-BR" smtClean="0"/>
-              <a:t>19/08/2019</a:t>
+              <a:t>03/09/2019</a:t>
             </a:fld>
             <a:endParaRPr lang="pt-BR"/>
           </a:p>
@@ -1706,7 +1714,7 @@
           <a:p>
             <a:fld id="{29185252-FBA3-417A-8652-C405B89605D8}" type="slidenum">
               <a:rPr lang="pt-BR" smtClean="0"/>
-              <a:t>‹nº›</a:t>
+              <a:t>‹#›</a:t>
             </a:fld>
             <a:endParaRPr lang="pt-BR"/>
           </a:p>
@@ -1910,7 +1918,7 @@
           <a:p>
             <a:fld id="{9642BF85-54FF-46CE-B398-87F998CFD60B}" type="datetimeFigureOut">
               <a:rPr lang="pt-BR" smtClean="0"/>
-              <a:t>19/08/2019</a:t>
+              <a:t>03/09/2019</a:t>
             </a:fld>
             <a:endParaRPr lang="pt-BR"/>
           </a:p>
@@ -1952,7 +1960,7 @@
           <a:p>
             <a:fld id="{29185252-FBA3-417A-8652-C405B89605D8}" type="slidenum">
               <a:rPr lang="pt-BR" smtClean="0"/>
-              <a:t>‹nº›</a:t>
+              <a:t>‹#›</a:t>
             </a:fld>
             <a:endParaRPr lang="pt-BR"/>
           </a:p>
@@ -2274,7 +2282,7 @@
           <a:p>
             <a:fld id="{9642BF85-54FF-46CE-B398-87F998CFD60B}" type="datetimeFigureOut">
               <a:rPr lang="pt-BR" smtClean="0"/>
-              <a:t>19/08/2019</a:t>
+              <a:t>03/09/2019</a:t>
             </a:fld>
             <a:endParaRPr lang="pt-BR"/>
           </a:p>
@@ -2316,7 +2324,7 @@
           <a:p>
             <a:fld id="{29185252-FBA3-417A-8652-C405B89605D8}" type="slidenum">
               <a:rPr lang="pt-BR" smtClean="0"/>
-              <a:t>‹nº›</a:t>
+              <a:t>‹#›</a:t>
             </a:fld>
             <a:endParaRPr lang="pt-BR"/>
           </a:p>
@@ -2408,7 +2416,7 @@
           <a:p>
             <a:fld id="{9642BF85-54FF-46CE-B398-87F998CFD60B}" type="datetimeFigureOut">
               <a:rPr lang="pt-BR" smtClean="0"/>
-              <a:t>19/08/2019</a:t>
+              <a:t>03/09/2019</a:t>
             </a:fld>
             <a:endParaRPr lang="pt-BR"/>
           </a:p>
@@ -2450,7 +2458,7 @@
           <a:p>
             <a:fld id="{29185252-FBA3-417A-8652-C405B89605D8}" type="slidenum">
               <a:rPr lang="pt-BR" smtClean="0"/>
-              <a:t>‹nº›</a:t>
+              <a:t>‹#›</a:t>
             </a:fld>
             <a:endParaRPr lang="pt-BR"/>
           </a:p>
@@ -2503,7 +2511,7 @@
           <a:p>
             <a:fld id="{9642BF85-54FF-46CE-B398-87F998CFD60B}" type="datetimeFigureOut">
               <a:rPr lang="pt-BR" smtClean="0"/>
-              <a:t>19/08/2019</a:t>
+              <a:t>03/09/2019</a:t>
             </a:fld>
             <a:endParaRPr lang="pt-BR"/>
           </a:p>
@@ -2545,7 +2553,7 @@
           <a:p>
             <a:fld id="{29185252-FBA3-417A-8652-C405B89605D8}" type="slidenum">
               <a:rPr lang="pt-BR" smtClean="0"/>
-              <a:t>‹nº›</a:t>
+              <a:t>‹#›</a:t>
             </a:fld>
             <a:endParaRPr lang="pt-BR"/>
           </a:p>
@@ -2778,7 +2786,7 @@
           <a:p>
             <a:fld id="{9642BF85-54FF-46CE-B398-87F998CFD60B}" type="datetimeFigureOut">
               <a:rPr lang="pt-BR" smtClean="0"/>
-              <a:t>19/08/2019</a:t>
+              <a:t>03/09/2019</a:t>
             </a:fld>
             <a:endParaRPr lang="pt-BR"/>
           </a:p>
@@ -2820,7 +2828,7 @@
           <a:p>
             <a:fld id="{29185252-FBA3-417A-8652-C405B89605D8}" type="slidenum">
               <a:rPr lang="pt-BR" smtClean="0"/>
-              <a:t>‹nº›</a:t>
+              <a:t>‹#›</a:t>
             </a:fld>
             <a:endParaRPr lang="pt-BR"/>
           </a:p>
@@ -3030,7 +3038,7 @@
           <a:p>
             <a:fld id="{9642BF85-54FF-46CE-B398-87F998CFD60B}" type="datetimeFigureOut">
               <a:rPr lang="pt-BR" smtClean="0"/>
-              <a:t>19/08/2019</a:t>
+              <a:t>03/09/2019</a:t>
             </a:fld>
             <a:endParaRPr lang="pt-BR"/>
           </a:p>
@@ -3072,7 +3080,7 @@
           <a:p>
             <a:fld id="{29185252-FBA3-417A-8652-C405B89605D8}" type="slidenum">
               <a:rPr lang="pt-BR" smtClean="0"/>
-              <a:t>‹nº›</a:t>
+              <a:t>‹#›</a:t>
             </a:fld>
             <a:endParaRPr lang="pt-BR"/>
           </a:p>
@@ -3250,7 +3258,7 @@
           <a:p>
             <a:fld id="{9642BF85-54FF-46CE-B398-87F998CFD60B}" type="datetimeFigureOut">
               <a:rPr lang="pt-BR" smtClean="0"/>
-              <a:t>19/08/2019</a:t>
+              <a:t>03/09/2019</a:t>
             </a:fld>
             <a:endParaRPr lang="pt-BR"/>
           </a:p>
@@ -3328,7 +3336,7 @@
           <a:p>
             <a:fld id="{29185252-FBA3-417A-8652-C405B89605D8}" type="slidenum">
               <a:rPr lang="pt-BR" smtClean="0"/>
-              <a:t>‹nº›</a:t>
+              <a:t>‹#›</a:t>
             </a:fld>
             <a:endParaRPr lang="pt-BR"/>
           </a:p>
@@ -3689,11 +3697,11 @@
           <a:lstStyle/>
           <a:p>
             <a:r>
-              <a:rPr lang="pt-BR" dirty="0" smtClean="0"/>
+              <a:rPr lang="pt-BR" dirty="0"/>
               <a:t>Jogos </a:t>
             </a:r>
             <a:r>
-              <a:rPr lang="pt-BR" dirty="0" err="1" smtClean="0"/>
+              <a:rPr lang="pt-BR" dirty="0" err="1"/>
               <a:t>Multiplayer</a:t>
             </a:r>
             <a:endParaRPr lang="pt-BR" dirty="0"/>
@@ -3739,6 +3747,546 @@
     <p:extLst>
       <p:ext uri="{BB962C8B-B14F-4D97-AF65-F5344CB8AC3E}">
         <p14:creationId xmlns:p14="http://schemas.microsoft.com/office/powerpoint/2010/main" val="2569797717"/>
+      </p:ext>
+    </p:extLst>
+  </p:cSld>
+  <p:clrMapOvr>
+    <a:masterClrMapping/>
+  </p:clrMapOvr>
+</p:sld>
+</file>
+
+<file path=ppt/slides/slide10.xml><?xml version="1.0" encoding="utf-8"?>
+<p:sld xmlns:a="http://schemas.openxmlformats.org/drawingml/2006/main" xmlns:r="http://schemas.openxmlformats.org/officeDocument/2006/relationships" xmlns:p="http://schemas.openxmlformats.org/presentationml/2006/main">
+  <p:cSld>
+    <p:spTree>
+      <p:nvGrpSpPr>
+        <p:cNvPr id="1" name=""/>
+        <p:cNvGrpSpPr/>
+        <p:nvPr/>
+      </p:nvGrpSpPr>
+      <p:grpSpPr>
+        <a:xfrm>
+          <a:off x="0" y="0"/>
+          <a:ext cx="0" cy="0"/>
+          <a:chOff x="0" y="0"/>
+          <a:chExt cx="0" cy="0"/>
+        </a:xfrm>
+      </p:grpSpPr>
+      <p:sp>
+        <p:nvSpPr>
+          <p:cNvPr id="5" name="Título 4"/>
+          <p:cNvSpPr>
+            <a:spLocks noGrp="1"/>
+          </p:cNvSpPr>
+          <p:nvPr>
+            <p:ph type="title"/>
+          </p:nvPr>
+        </p:nvSpPr>
+        <p:spPr/>
+        <p:txBody>
+          <a:bodyPr/>
+          <a:lstStyle/>
+          <a:p>
+            <a:r>
+              <a:rPr lang="pt-BR" dirty="0"/>
+              <a:t>Network </a:t>
+            </a:r>
+            <a:r>
+              <a:rPr lang="pt-BR" dirty="0" err="1"/>
+              <a:t>Identity</a:t>
+            </a:r>
+            <a:endParaRPr lang="pt-BR" dirty="0"/>
+          </a:p>
+        </p:txBody>
+      </p:sp>
+      <p:sp>
+        <p:nvSpPr>
+          <p:cNvPr id="6" name="Espaço Reservado para Conteúdo 5"/>
+          <p:cNvSpPr>
+            <a:spLocks noGrp="1"/>
+          </p:cNvSpPr>
+          <p:nvPr>
+            <p:ph idx="1"/>
+          </p:nvPr>
+        </p:nvSpPr>
+        <p:spPr/>
+        <p:txBody>
+          <a:bodyPr>
+            <a:normAutofit/>
+          </a:bodyPr>
+          <a:lstStyle/>
+          <a:p>
+            <a:r>
+              <a:rPr lang="pt-BR" dirty="0"/>
+              <a:t>É o componente que controla a identidade única do </a:t>
+            </a:r>
+            <a:r>
+              <a:rPr lang="pt-BR" dirty="0" err="1"/>
+              <a:t>GameObject</a:t>
+            </a:r>
+            <a:r>
+              <a:rPr lang="pt-BR" dirty="0"/>
+              <a:t> na rede e usa essa identidade para apresentá-lo em todo o sistema.</a:t>
+            </a:r>
+          </a:p>
+          <a:p>
+            <a:r>
+              <a:rPr lang="pt-BR" dirty="0"/>
+              <a:t>Os </a:t>
+            </a:r>
+            <a:r>
+              <a:rPr lang="pt-BR" dirty="0" err="1"/>
+              <a:t>GameObjects</a:t>
+            </a:r>
+            <a:r>
+              <a:rPr lang="pt-BR" dirty="0"/>
+              <a:t> gerenciados pelo Network Manager devem ter esse componente.</a:t>
+            </a:r>
+          </a:p>
+        </p:txBody>
+      </p:sp>
+    </p:spTree>
+    <p:extLst>
+      <p:ext uri="{BB962C8B-B14F-4D97-AF65-F5344CB8AC3E}">
+        <p14:creationId xmlns:p14="http://schemas.microsoft.com/office/powerpoint/2010/main" val="657514370"/>
+      </p:ext>
+    </p:extLst>
+  </p:cSld>
+  <p:clrMapOvr>
+    <a:masterClrMapping/>
+  </p:clrMapOvr>
+</p:sld>
+</file>
+
+<file path=ppt/slides/slide11.xml><?xml version="1.0" encoding="utf-8"?>
+<p:sld xmlns:a="http://schemas.openxmlformats.org/drawingml/2006/main" xmlns:r="http://schemas.openxmlformats.org/officeDocument/2006/relationships" xmlns:p="http://schemas.openxmlformats.org/presentationml/2006/main">
+  <p:cSld>
+    <p:spTree>
+      <p:nvGrpSpPr>
+        <p:cNvPr id="1" name=""/>
+        <p:cNvGrpSpPr/>
+        <p:nvPr/>
+      </p:nvGrpSpPr>
+      <p:grpSpPr>
+        <a:xfrm>
+          <a:off x="0" y="0"/>
+          <a:ext cx="0" cy="0"/>
+          <a:chOff x="0" y="0"/>
+          <a:chExt cx="0" cy="0"/>
+        </a:xfrm>
+      </p:grpSpPr>
+      <p:sp>
+        <p:nvSpPr>
+          <p:cNvPr id="5" name="Título 4"/>
+          <p:cNvSpPr>
+            <a:spLocks noGrp="1"/>
+          </p:cNvSpPr>
+          <p:nvPr>
+            <p:ph type="title"/>
+          </p:nvPr>
+        </p:nvSpPr>
+        <p:spPr/>
+        <p:txBody>
+          <a:bodyPr/>
+          <a:lstStyle/>
+          <a:p>
+            <a:r>
+              <a:rPr lang="pt-BR" dirty="0"/>
+              <a:t>Notas</a:t>
+            </a:r>
+          </a:p>
+        </p:txBody>
+      </p:sp>
+      <p:sp>
+        <p:nvSpPr>
+          <p:cNvPr id="6" name="Espaço Reservado para Conteúdo 5"/>
+          <p:cNvSpPr>
+            <a:spLocks noGrp="1"/>
+          </p:cNvSpPr>
+          <p:nvPr>
+            <p:ph idx="1"/>
+          </p:nvPr>
+        </p:nvSpPr>
+        <p:spPr/>
+        <p:txBody>
+          <a:bodyPr>
+            <a:normAutofit/>
+          </a:bodyPr>
+          <a:lstStyle/>
+          <a:p>
+            <a:r>
+              <a:rPr lang="pt-BR" dirty="0"/>
+              <a:t>Deve haver apenas uma Network Manager ativo por cena.</a:t>
+            </a:r>
+            <a:r>
+              <a:rPr lang="en-US" dirty="0"/>
+              <a:t> </a:t>
+            </a:r>
+          </a:p>
+          <a:p>
+            <a:r>
+              <a:rPr lang="en-US" dirty="0"/>
+              <a:t>Do not place the Network Manager component on a networked </a:t>
+            </a:r>
+            <a:r>
+              <a:rPr lang="en-US" dirty="0" err="1"/>
+              <a:t>GameObject</a:t>
+            </a:r>
+            <a:r>
+              <a:rPr lang="en-US" dirty="0"/>
+              <a:t> (one which has a </a:t>
+            </a:r>
+            <a:r>
+              <a:rPr lang="en-US" u="sng" dirty="0">
+                <a:hlinkClick r:id="rId2"/>
+              </a:rPr>
+              <a:t>Network Identity</a:t>
+            </a:r>
+            <a:r>
+              <a:rPr lang="en-US" dirty="0"/>
+              <a:t> component), because Unity disables these when the Scene loads.</a:t>
+            </a:r>
+            <a:endParaRPr lang="pt-BR" dirty="0"/>
+          </a:p>
+        </p:txBody>
+      </p:sp>
+    </p:spTree>
+    <p:extLst>
+      <p:ext uri="{BB962C8B-B14F-4D97-AF65-F5344CB8AC3E}">
+        <p14:creationId xmlns:p14="http://schemas.microsoft.com/office/powerpoint/2010/main" val="128422404"/>
+      </p:ext>
+    </p:extLst>
+  </p:cSld>
+  <p:clrMapOvr>
+    <a:masterClrMapping/>
+  </p:clrMapOvr>
+</p:sld>
+</file>
+
+<file path=ppt/slides/slide12.xml><?xml version="1.0" encoding="utf-8"?>
+<p:sld xmlns:a="http://schemas.openxmlformats.org/drawingml/2006/main" xmlns:r="http://schemas.openxmlformats.org/officeDocument/2006/relationships" xmlns:p="http://schemas.openxmlformats.org/presentationml/2006/main">
+  <p:cSld>
+    <p:spTree>
+      <p:nvGrpSpPr>
+        <p:cNvPr id="1" name=""/>
+        <p:cNvGrpSpPr/>
+        <p:nvPr/>
+      </p:nvGrpSpPr>
+      <p:grpSpPr>
+        <a:xfrm>
+          <a:off x="0" y="0"/>
+          <a:ext cx="0" cy="0"/>
+          <a:chOff x="0" y="0"/>
+          <a:chExt cx="0" cy="0"/>
+        </a:xfrm>
+      </p:grpSpPr>
+      <p:sp>
+        <p:nvSpPr>
+          <p:cNvPr id="5" name="Título 4"/>
+          <p:cNvSpPr>
+            <a:spLocks noGrp="1"/>
+          </p:cNvSpPr>
+          <p:nvPr>
+            <p:ph type="title"/>
+          </p:nvPr>
+        </p:nvSpPr>
+        <p:spPr/>
+        <p:txBody>
+          <a:bodyPr>
+            <a:normAutofit/>
+          </a:bodyPr>
+          <a:lstStyle/>
+          <a:p>
+            <a:r>
+              <a:rPr lang="pt-BR" dirty="0"/>
+              <a:t>Referências</a:t>
+            </a:r>
+          </a:p>
+        </p:txBody>
+      </p:sp>
+      <p:sp>
+        <p:nvSpPr>
+          <p:cNvPr id="6" name="Espaço Reservado para Conteúdo 5"/>
+          <p:cNvSpPr>
+            <a:spLocks noGrp="1"/>
+          </p:cNvSpPr>
+          <p:nvPr>
+            <p:ph idx="1"/>
+          </p:nvPr>
+        </p:nvSpPr>
+        <p:spPr>
+          <a:xfrm>
+            <a:off x="317694" y="1291051"/>
+            <a:ext cx="11705493" cy="5254127"/>
+          </a:xfrm>
+        </p:spPr>
+        <p:txBody>
+          <a:bodyPr>
+            <a:normAutofit fontScale="92500" lnSpcReduction="20000"/>
+          </a:bodyPr>
+          <a:lstStyle/>
+          <a:p>
+            <a:pPr marL="514350" indent="-514350" algn="l">
+              <a:buFont typeface="+mj-lt"/>
+              <a:buAutoNum type="arabicPeriod"/>
+            </a:pPr>
+            <a:r>
+              <a:rPr lang="en-US" dirty="0"/>
+              <a:t>Glover, D. </a:t>
+            </a:r>
+            <a:r>
+              <a:rPr lang="en-US" b="1" dirty="0" err="1"/>
+              <a:t>UNet</a:t>
+            </a:r>
+            <a:r>
+              <a:rPr lang="en-US" b="1" dirty="0"/>
+              <a:t> Deprecation FAQ</a:t>
+            </a:r>
+            <a:r>
+              <a:rPr lang="en-US" dirty="0"/>
+              <a:t>. </a:t>
+            </a:r>
+            <a:r>
+              <a:rPr lang="en-US" dirty="0" err="1"/>
+              <a:t>Disponível</a:t>
+            </a:r>
+            <a:r>
+              <a:rPr lang="en-US" dirty="0"/>
+              <a:t> </a:t>
+            </a:r>
+            <a:r>
+              <a:rPr lang="en-US" dirty="0" err="1"/>
+              <a:t>em</a:t>
+            </a:r>
+            <a:r>
+              <a:rPr lang="en-US" dirty="0"/>
+              <a:t>: </a:t>
+            </a:r>
+            <a:r>
+              <a:rPr lang="en-US" dirty="0">
+                <a:hlinkClick r:id="rId2"/>
+              </a:rPr>
+              <a:t>https://support.unity3d.com/hc/en-us/articles/360001252086-UNet-Deprecation-FAQ</a:t>
+            </a:r>
+            <a:r>
+              <a:rPr lang="en-US" dirty="0"/>
+              <a:t>.</a:t>
+            </a:r>
+          </a:p>
+          <a:p>
+            <a:pPr marL="514350" indent="-514350" algn="l">
+              <a:buFont typeface="+mj-lt"/>
+              <a:buAutoNum type="arabicPeriod"/>
+            </a:pPr>
+            <a:r>
+              <a:rPr lang="en-US" dirty="0"/>
+              <a:t>Unity Blog.</a:t>
+            </a:r>
+            <a:r>
+              <a:rPr lang="en-US" b="1" dirty="0"/>
+              <a:t> Navigating Unity’s multiplayer </a:t>
+            </a:r>
+            <a:r>
+              <a:rPr lang="en-US" b="1" dirty="0" err="1"/>
+              <a:t>Netcode</a:t>
+            </a:r>
+            <a:r>
+              <a:rPr lang="en-US" b="1" dirty="0"/>
+              <a:t> transition</a:t>
+            </a:r>
+            <a:r>
+              <a:rPr lang="en-US" dirty="0"/>
+              <a:t>. </a:t>
+            </a:r>
+            <a:r>
+              <a:rPr lang="en-US" dirty="0" err="1"/>
+              <a:t>Disponível</a:t>
+            </a:r>
+            <a:r>
+              <a:rPr lang="en-US" dirty="0"/>
+              <a:t> </a:t>
+            </a:r>
+            <a:r>
+              <a:rPr lang="en-US" dirty="0" err="1"/>
+              <a:t>em</a:t>
+            </a:r>
+            <a:r>
+              <a:rPr lang="en-US" dirty="0"/>
+              <a:t>: </a:t>
+            </a:r>
+            <a:r>
+              <a:rPr lang="pt-BR" dirty="0">
+                <a:hlinkClick r:id="rId3"/>
+              </a:rPr>
+              <a:t>https://blogs.unity3d.com/2019/06/13/</a:t>
+            </a:r>
+            <a:r>
+              <a:rPr lang="pt-BR" dirty="0" err="1">
+                <a:hlinkClick r:id="rId3"/>
+              </a:rPr>
+              <a:t>navigating</a:t>
+            </a:r>
+            <a:r>
+              <a:rPr lang="pt-BR" dirty="0">
+                <a:hlinkClick r:id="rId3"/>
+              </a:rPr>
+              <a:t>-</a:t>
+            </a:r>
+            <a:r>
+              <a:rPr lang="pt-BR" dirty="0" err="1">
+                <a:hlinkClick r:id="rId3"/>
+              </a:rPr>
+              <a:t>unitys</a:t>
+            </a:r>
+            <a:r>
+              <a:rPr lang="pt-BR" dirty="0">
+                <a:hlinkClick r:id="rId3"/>
+              </a:rPr>
+              <a:t>-multiplayer-</a:t>
+            </a:r>
+            <a:r>
+              <a:rPr lang="pt-BR" dirty="0" err="1">
+                <a:hlinkClick r:id="rId3"/>
+              </a:rPr>
+              <a:t>netcode</a:t>
+            </a:r>
+            <a:r>
+              <a:rPr lang="pt-BR" dirty="0">
+                <a:hlinkClick r:id="rId3"/>
+              </a:rPr>
+              <a:t>-</a:t>
+            </a:r>
+            <a:r>
+              <a:rPr lang="pt-BR" dirty="0" err="1">
+                <a:hlinkClick r:id="rId3"/>
+              </a:rPr>
+              <a:t>transition</a:t>
+            </a:r>
+            <a:r>
+              <a:rPr lang="pt-BR" dirty="0">
+                <a:hlinkClick r:id="rId3"/>
+              </a:rPr>
+              <a:t>/</a:t>
+            </a:r>
+            <a:r>
+              <a:rPr lang="pt-BR" dirty="0"/>
+              <a:t>.</a:t>
+            </a:r>
+          </a:p>
+          <a:p>
+            <a:pPr marL="514350" indent="-514350" algn="l">
+              <a:buFont typeface="+mj-lt"/>
+              <a:buAutoNum type="arabicPeriod"/>
+            </a:pPr>
+            <a:r>
+              <a:rPr lang="pt-BR" dirty="0" err="1"/>
+              <a:t>Unity</a:t>
+            </a:r>
+            <a:r>
+              <a:rPr lang="pt-BR" dirty="0"/>
+              <a:t>. </a:t>
+            </a:r>
+            <a:r>
+              <a:rPr lang="pt-BR" b="1" dirty="0"/>
+              <a:t>Networking HLAPI System </a:t>
+            </a:r>
+            <a:r>
+              <a:rPr lang="pt-BR" b="1" dirty="0" err="1"/>
+              <a:t>Concepts</a:t>
+            </a:r>
+            <a:r>
+              <a:rPr lang="pt-BR" dirty="0"/>
+              <a:t>. </a:t>
+            </a:r>
+            <a:r>
+              <a:rPr lang="pt-BR" dirty="0" err="1"/>
+              <a:t>Documentation</a:t>
+            </a:r>
+            <a:r>
+              <a:rPr lang="pt-BR" dirty="0"/>
+              <a:t>. Disponível em: </a:t>
+            </a:r>
+            <a:r>
+              <a:rPr lang="en-US" dirty="0">
+                <a:hlinkClick r:id="rId4"/>
+              </a:rPr>
+              <a:t>https://docs.unity3d.com/Manual/UNetConcepts.html</a:t>
+            </a:r>
+            <a:r>
+              <a:rPr lang="en-US" dirty="0"/>
+              <a:t>.</a:t>
+            </a:r>
+            <a:endParaRPr lang="pt-BR" dirty="0"/>
+          </a:p>
+          <a:p>
+            <a:pPr marL="514350" indent="-514350" algn="l">
+              <a:buFont typeface="+mj-lt"/>
+              <a:buAutoNum type="arabicPeriod"/>
+            </a:pPr>
+            <a:r>
+              <a:rPr lang="pt-BR" dirty="0" err="1"/>
+              <a:t>Unity</a:t>
+            </a:r>
+            <a:r>
+              <a:rPr lang="pt-BR" dirty="0"/>
+              <a:t>. </a:t>
+            </a:r>
+            <a:r>
+              <a:rPr lang="pt-BR" b="1" dirty="0" err="1"/>
+              <a:t>Using</a:t>
+            </a:r>
+            <a:r>
+              <a:rPr lang="pt-BR" b="1" dirty="0"/>
+              <a:t> </a:t>
+            </a:r>
+            <a:r>
+              <a:rPr lang="pt-BR" b="1" dirty="0" err="1"/>
+              <a:t>the</a:t>
+            </a:r>
+            <a:r>
+              <a:rPr lang="pt-BR" b="1" dirty="0"/>
+              <a:t> Network Manager</a:t>
+            </a:r>
+            <a:r>
+              <a:rPr lang="pt-BR" dirty="0"/>
+              <a:t>. </a:t>
+            </a:r>
+            <a:r>
+              <a:rPr lang="pt-BR" dirty="0" err="1"/>
+              <a:t>Documentation</a:t>
+            </a:r>
+            <a:r>
+              <a:rPr lang="pt-BR" dirty="0"/>
+              <a:t>. Disponível em: </a:t>
+            </a:r>
+            <a:r>
+              <a:rPr lang="en-US" dirty="0">
+                <a:hlinkClick r:id="rId5"/>
+              </a:rPr>
+              <a:t>https://docs.unity3d.com/Manual/UNetManager.html</a:t>
+            </a:r>
+            <a:endParaRPr lang="en-US" dirty="0"/>
+          </a:p>
+          <a:p>
+            <a:pPr marL="514350" indent="-514350" algn="l">
+              <a:buFont typeface="+mj-lt"/>
+              <a:buAutoNum type="arabicPeriod"/>
+            </a:pPr>
+            <a:endParaRPr lang="pt-BR" dirty="0"/>
+          </a:p>
+          <a:p>
+            <a:endParaRPr lang="pt-BR" dirty="0"/>
+          </a:p>
+          <a:p>
+            <a:endParaRPr lang="pt-BR" dirty="0"/>
+          </a:p>
+        </p:txBody>
+      </p:sp>
+    </p:spTree>
+    <p:extLst>
+      <p:ext uri="{BB962C8B-B14F-4D97-AF65-F5344CB8AC3E}">
+        <p14:creationId xmlns:p14="http://schemas.microsoft.com/office/powerpoint/2010/main" val="4155669808"/>
       </p:ext>
     </p:extLst>
   </p:cSld>
@@ -3781,22 +4329,21 @@
           <a:lstStyle/>
           <a:p>
             <a:r>
-              <a:rPr lang="pt-BR" dirty="0" err="1" smtClean="0"/>
+              <a:rPr lang="pt-BR" dirty="0" err="1"/>
               <a:t>UNet</a:t>
             </a:r>
             <a:r>
-              <a:rPr lang="pt-BR" dirty="0" smtClean="0"/>
+              <a:rPr lang="pt-BR" dirty="0"/>
               <a:t> (</a:t>
             </a:r>
             <a:r>
-              <a:rPr lang="pt-BR" dirty="0" err="1" smtClean="0"/>
+              <a:rPr lang="pt-BR" dirty="0" err="1"/>
               <a:t>Unity</a:t>
             </a:r>
             <a:r>
-              <a:rPr lang="pt-BR" dirty="0" smtClean="0"/>
+              <a:rPr lang="pt-BR" dirty="0"/>
               <a:t> Networking)</a:t>
             </a:r>
-            <a:endParaRPr lang="pt-BR" dirty="0"/>
           </a:p>
         </p:txBody>
       </p:sp>
@@ -3818,26 +4365,25 @@
           <a:lstStyle/>
           <a:p>
             <a:r>
-              <a:rPr lang="pt-BR" dirty="0" smtClean="0"/>
+              <a:rPr lang="pt-BR" dirty="0"/>
               <a:t>Conjunto de ferramentas e serviços </a:t>
             </a:r>
             <a:r>
-              <a:rPr lang="pt-BR" dirty="0" err="1" smtClean="0"/>
+              <a:rPr lang="pt-BR" dirty="0" err="1"/>
               <a:t>multiplayer</a:t>
             </a:r>
             <a:r>
-              <a:rPr lang="pt-BR" dirty="0" smtClean="0"/>
+              <a:rPr lang="pt-BR" dirty="0"/>
               <a:t> para desenvolvedores </a:t>
             </a:r>
             <a:r>
-              <a:rPr lang="pt-BR" dirty="0" err="1" smtClean="0"/>
+              <a:rPr lang="pt-BR" dirty="0" err="1"/>
               <a:t>Unity</a:t>
             </a:r>
             <a:r>
-              <a:rPr lang="pt-BR" dirty="0" smtClean="0"/>
+              <a:rPr lang="pt-BR" dirty="0"/>
               <a:t>.</a:t>
             </a:r>
-            <a:endParaRPr lang="pt-BR" dirty="0"/>
           </a:p>
         </p:txBody>
       </p:sp>
@@ -3887,14 +4433,13 @@
           <a:lstStyle/>
           <a:p>
             <a:r>
-              <a:rPr lang="pt-BR" dirty="0" err="1" smtClean="0"/>
+              <a:rPr lang="pt-BR" dirty="0" err="1"/>
               <a:t>UNet</a:t>
             </a:r>
             <a:r>
-              <a:rPr lang="pt-BR" dirty="0" smtClean="0"/>
+              <a:rPr lang="pt-BR" dirty="0"/>
               <a:t> descontinuado</a:t>
             </a:r>
-            <a:endParaRPr lang="pt-BR" dirty="0"/>
           </a:p>
         </p:txBody>
       </p:sp>
@@ -3916,46 +4461,45 @@
           <a:lstStyle/>
           <a:p>
             <a:r>
-              <a:rPr lang="pt-BR" dirty="0" smtClean="0"/>
+              <a:rPr lang="pt-BR" dirty="0"/>
               <a:t>A </a:t>
             </a:r>
             <a:r>
-              <a:rPr lang="pt-BR" dirty="0" err="1" smtClean="0"/>
+              <a:rPr lang="pt-BR" dirty="0" err="1"/>
               <a:t>UNet</a:t>
             </a:r>
             <a:r>
-              <a:rPr lang="pt-BR" dirty="0" smtClean="0"/>
+              <a:rPr lang="pt-BR" dirty="0"/>
               <a:t> não atende mais as necessidades de muitos dos criadores de jogos </a:t>
             </a:r>
             <a:r>
-              <a:rPr lang="pt-BR" dirty="0" err="1" smtClean="0"/>
+              <a:rPr lang="pt-BR" dirty="0" err="1"/>
               <a:t>multiplayer</a:t>
             </a:r>
             <a:r>
-              <a:rPr lang="pt-BR" dirty="0" smtClean="0"/>
+              <a:rPr lang="pt-BR" dirty="0"/>
               <a:t>.</a:t>
             </a:r>
           </a:p>
           <a:p>
             <a:r>
-              <a:rPr lang="pt-BR" dirty="0" smtClean="0"/>
+              <a:rPr lang="pt-BR" dirty="0"/>
               <a:t>Concluiu se que para alcançar a performance, escalabilidade e segurança desejadas pelos criadores </a:t>
             </a:r>
             <a:r>
-              <a:rPr lang="pt-BR" dirty="0" err="1" smtClean="0"/>
+              <a:rPr lang="pt-BR" dirty="0" err="1"/>
               <a:t>Unity</a:t>
             </a:r>
             <a:r>
-              <a:rPr lang="pt-BR" dirty="0" smtClean="0"/>
+              <a:rPr lang="pt-BR" dirty="0"/>
               <a:t>, será necessário desenvolver uma nova tecnologia.</a:t>
             </a:r>
           </a:p>
           <a:p>
             <a:r>
-              <a:rPr lang="pt-BR" dirty="0" smtClean="0"/>
+              <a:rPr lang="pt-BR" dirty="0"/>
               <a:t>Incluindo redes leves e rápidas, além de um modelo de servidor de jogos dedicado. </a:t>
             </a:r>
-            <a:endParaRPr lang="pt-BR" dirty="0"/>
           </a:p>
         </p:txBody>
       </p:sp>
@@ -4001,14 +4545,262 @@
         </p:nvSpPr>
         <p:spPr/>
         <p:txBody>
+          <a:bodyPr/>
+          <a:lstStyle/>
+          <a:p>
+            <a:r>
+              <a:rPr lang="pt-BR" dirty="0"/>
+              <a:t>Network Manager</a:t>
+            </a:r>
+          </a:p>
+        </p:txBody>
+      </p:sp>
+      <p:sp>
+        <p:nvSpPr>
+          <p:cNvPr id="6" name="Espaço Reservado para Conteúdo 5"/>
+          <p:cNvSpPr>
+            <a:spLocks noGrp="1"/>
+          </p:cNvSpPr>
+          <p:nvPr>
+            <p:ph idx="1"/>
+          </p:nvPr>
+        </p:nvSpPr>
+        <p:spPr/>
+        <p:txBody>
+          <a:bodyPr>
+            <a:normAutofit fontScale="77500" lnSpcReduction="20000"/>
+          </a:bodyPr>
+          <a:lstStyle/>
+          <a:p>
+            <a:r>
+              <a:rPr lang="pt-BR" dirty="0"/>
+              <a:t>Componente para gerenciamento das propriedades de rede.</a:t>
+            </a:r>
+          </a:p>
+          <a:p>
+            <a:pPr algn="l"/>
+            <a:r>
+              <a:rPr lang="pt-BR" dirty="0"/>
+              <a:t>Suas propriedades incluem:</a:t>
+            </a:r>
+          </a:p>
+          <a:p>
+            <a:pPr marL="457200" indent="-457200" algn="l">
+              <a:buFont typeface="Arial" panose="020B0604020202020204" pitchFamily="34" charset="0"/>
+              <a:buChar char="•"/>
+            </a:pPr>
+            <a:r>
+              <a:rPr lang="pt-BR" dirty="0"/>
+              <a:t>Gerenciamento do estado do jogo;</a:t>
+            </a:r>
+          </a:p>
+          <a:p>
+            <a:pPr marL="457200" indent="-457200" algn="l">
+              <a:buFont typeface="Arial" panose="020B0604020202020204" pitchFamily="34" charset="0"/>
+              <a:buChar char="•"/>
+            </a:pPr>
+            <a:r>
+              <a:rPr lang="pt-BR" dirty="0"/>
+              <a:t>Gerenciamento de Spawn;</a:t>
+            </a:r>
+          </a:p>
+          <a:p>
+            <a:pPr marL="457200" indent="-457200" algn="l">
+              <a:buFont typeface="Arial" panose="020B0604020202020204" pitchFamily="34" charset="0"/>
+              <a:buChar char="•"/>
+            </a:pPr>
+            <a:r>
+              <a:rPr lang="pt-BR" dirty="0"/>
+              <a:t>Gerenciamento de Cenas;</a:t>
+            </a:r>
+          </a:p>
+          <a:p>
+            <a:pPr marL="457200" indent="-457200" algn="l">
+              <a:buFont typeface="Arial" panose="020B0604020202020204" pitchFamily="34" charset="0"/>
+              <a:buChar char="•"/>
+            </a:pPr>
+            <a:r>
+              <a:rPr lang="pt-BR" dirty="0"/>
+              <a:t>Informações de debug;</a:t>
+            </a:r>
+          </a:p>
+          <a:p>
+            <a:pPr marL="457200" indent="-457200" algn="l">
+              <a:buFont typeface="Arial" panose="020B0604020202020204" pitchFamily="34" charset="0"/>
+              <a:buChar char="•"/>
+            </a:pPr>
+            <a:r>
+              <a:rPr lang="pt-BR" dirty="0"/>
+              <a:t>Conexão entre jogadores; e</a:t>
+            </a:r>
+          </a:p>
+          <a:p>
+            <a:pPr marL="457200" indent="-457200" algn="l">
+              <a:buFont typeface="Arial" panose="020B0604020202020204" pitchFamily="34" charset="0"/>
+              <a:buChar char="•"/>
+            </a:pPr>
+            <a:r>
+              <a:rPr lang="pt-BR" dirty="0"/>
+              <a:t>Personalização. </a:t>
+            </a:r>
+          </a:p>
+        </p:txBody>
+      </p:sp>
+    </p:spTree>
+    <p:extLst>
+      <p:ext uri="{BB962C8B-B14F-4D97-AF65-F5344CB8AC3E}">
+        <p14:creationId xmlns:p14="http://schemas.microsoft.com/office/powerpoint/2010/main" val="3716219024"/>
+      </p:ext>
+    </p:extLst>
+  </p:cSld>
+  <p:clrMapOvr>
+    <a:masterClrMapping/>
+  </p:clrMapOvr>
+</p:sld>
+</file>
+
+<file path=ppt/slides/slide5.xml><?xml version="1.0" encoding="utf-8"?>
+<p:sld xmlns:a="http://schemas.openxmlformats.org/drawingml/2006/main" xmlns:r="http://schemas.openxmlformats.org/officeDocument/2006/relationships" xmlns:p="http://schemas.openxmlformats.org/presentationml/2006/main">
+  <p:cSld>
+    <p:spTree>
+      <p:nvGrpSpPr>
+        <p:cNvPr id="1" name=""/>
+        <p:cNvGrpSpPr/>
+        <p:nvPr/>
+      </p:nvGrpSpPr>
+      <p:grpSpPr>
+        <a:xfrm>
+          <a:off x="0" y="0"/>
+          <a:ext cx="0" cy="0"/>
+          <a:chOff x="0" y="0"/>
+          <a:chExt cx="0" cy="0"/>
+        </a:xfrm>
+      </p:grpSpPr>
+      <p:sp>
+        <p:nvSpPr>
+          <p:cNvPr id="5" name="Título 4"/>
+          <p:cNvSpPr>
+            <a:spLocks noGrp="1"/>
+          </p:cNvSpPr>
+          <p:nvPr>
+            <p:ph type="title"/>
+          </p:nvPr>
+        </p:nvSpPr>
+        <p:spPr/>
+        <p:txBody>
+          <a:bodyPr/>
+          <a:lstStyle/>
+          <a:p>
+            <a:r>
+              <a:rPr lang="pt-BR" dirty="0"/>
+              <a:t>Gerenciamento do estado do jogo</a:t>
+            </a:r>
+          </a:p>
+        </p:txBody>
+      </p:sp>
+      <p:sp>
+        <p:nvSpPr>
+          <p:cNvPr id="6" name="Espaço Reservado para Conteúdo 5"/>
+          <p:cNvSpPr>
+            <a:spLocks noGrp="1"/>
+          </p:cNvSpPr>
+          <p:nvPr>
+            <p:ph idx="1"/>
+          </p:nvPr>
+        </p:nvSpPr>
+        <p:spPr/>
+        <p:txBody>
           <a:bodyPr>
             <a:normAutofit/>
           </a:bodyPr>
           <a:lstStyle/>
           <a:p>
-            <a:r>
-              <a:rPr lang="pt-BR" dirty="0"/>
-              <a:t>Referências</a:t>
+            <a:pPr algn="l"/>
+            <a:r>
+              <a:rPr lang="pt-BR" dirty="0"/>
+              <a:t>Um jogo multiplayer em rede pode ser executado em 3 modos:</a:t>
+            </a:r>
+          </a:p>
+          <a:p>
+            <a:pPr marL="457200" indent="-457200" algn="l">
+              <a:buFont typeface="Arial" panose="020B0604020202020204" pitchFamily="34" charset="0"/>
+              <a:buChar char="•"/>
+            </a:pPr>
+            <a:r>
+              <a:rPr lang="pt-BR" dirty="0"/>
+              <a:t>Cliente;</a:t>
+            </a:r>
+          </a:p>
+          <a:p>
+            <a:pPr marL="457200" indent="-457200" algn="l">
+              <a:buFont typeface="Arial" panose="020B0604020202020204" pitchFamily="34" charset="0"/>
+              <a:buChar char="•"/>
+            </a:pPr>
+            <a:r>
+              <a:rPr lang="pt-BR" dirty="0"/>
+              <a:t>Servidor dedicado; e</a:t>
+            </a:r>
+          </a:p>
+          <a:p>
+            <a:pPr marL="457200" indent="-457200" algn="l">
+              <a:buFont typeface="Arial" panose="020B0604020202020204" pitchFamily="34" charset="0"/>
+              <a:buChar char="•"/>
+            </a:pPr>
+            <a:r>
+              <a:rPr lang="pt-BR" dirty="0"/>
+              <a:t>Host (cliente e servidor ao mesmo tempo).</a:t>
+            </a:r>
+          </a:p>
+        </p:txBody>
+      </p:sp>
+    </p:spTree>
+    <p:extLst>
+      <p:ext uri="{BB962C8B-B14F-4D97-AF65-F5344CB8AC3E}">
+        <p14:creationId xmlns:p14="http://schemas.microsoft.com/office/powerpoint/2010/main" val="3114258574"/>
+      </p:ext>
+    </p:extLst>
+  </p:cSld>
+  <p:clrMapOvr>
+    <a:masterClrMapping/>
+  </p:clrMapOvr>
+</p:sld>
+</file>
+
+<file path=ppt/slides/slide6.xml><?xml version="1.0" encoding="utf-8"?>
+<p:sld xmlns:a="http://schemas.openxmlformats.org/drawingml/2006/main" xmlns:r="http://schemas.openxmlformats.org/officeDocument/2006/relationships" xmlns:p="http://schemas.openxmlformats.org/presentationml/2006/main">
+  <p:cSld>
+    <p:spTree>
+      <p:nvGrpSpPr>
+        <p:cNvPr id="1" name=""/>
+        <p:cNvGrpSpPr/>
+        <p:nvPr/>
+      </p:nvGrpSpPr>
+      <p:grpSpPr>
+        <a:xfrm>
+          <a:off x="0" y="0"/>
+          <a:ext cx="0" cy="0"/>
+          <a:chOff x="0" y="0"/>
+          <a:chExt cx="0" cy="0"/>
+        </a:xfrm>
+      </p:grpSpPr>
+      <p:sp>
+        <p:nvSpPr>
+          <p:cNvPr id="5" name="Título 4"/>
+          <p:cNvSpPr>
+            <a:spLocks noGrp="1"/>
+          </p:cNvSpPr>
+          <p:nvPr>
+            <p:ph type="title"/>
+          </p:nvPr>
+        </p:nvSpPr>
+        <p:spPr/>
+        <p:txBody>
+          <a:bodyPr/>
+          <a:lstStyle/>
+          <a:p>
+            <a:r>
+              <a:rPr lang="pt-BR" dirty="0"/>
+              <a:t>Gerenciamento do estado do jogo</a:t>
             </a:r>
           </a:p>
         </p:txBody>
@@ -4023,147 +4815,499 @@
             <p:ph idx="1"/>
           </p:nvPr>
         </p:nvSpPr>
-        <p:spPr>
-          <a:xfrm>
-            <a:off x="317694" y="1291051"/>
-            <a:ext cx="11705493" cy="5254127"/>
-          </a:xfrm>
-        </p:spPr>
+        <p:spPr/>
         <p:txBody>
           <a:bodyPr>
             <a:normAutofit/>
           </a:bodyPr>
           <a:lstStyle/>
           <a:p>
-            <a:pPr marL="514350" indent="-514350" algn="l">
-              <a:buFont typeface="+mj-lt"/>
-              <a:buAutoNum type="arabicPeriod"/>
-            </a:pPr>
-            <a:r>
-              <a:rPr lang="en-US" dirty="0" smtClean="0"/>
-              <a:t>Glover, D. </a:t>
-            </a:r>
-            <a:r>
-              <a:rPr lang="en-US" b="1" dirty="0" err="1"/>
-              <a:t>UNet</a:t>
-            </a:r>
-            <a:r>
-              <a:rPr lang="en-US" b="1" dirty="0"/>
-              <a:t> Deprecation </a:t>
-            </a:r>
-            <a:r>
-              <a:rPr lang="en-US" b="1" dirty="0" smtClean="0"/>
-              <a:t>FAQ</a:t>
-            </a:r>
-            <a:r>
-              <a:rPr lang="en-US" dirty="0" smtClean="0"/>
-              <a:t>. </a:t>
-            </a:r>
-            <a:r>
-              <a:rPr lang="en-US" dirty="0" err="1" smtClean="0"/>
-              <a:t>Disponível</a:t>
-            </a:r>
-            <a:r>
-              <a:rPr lang="en-US" dirty="0" smtClean="0"/>
-              <a:t> </a:t>
-            </a:r>
-            <a:r>
-              <a:rPr lang="en-US" dirty="0" err="1" smtClean="0"/>
-              <a:t>em</a:t>
-            </a:r>
-            <a:r>
-              <a:rPr lang="en-US" dirty="0"/>
-              <a:t>: https://</a:t>
-            </a:r>
-            <a:r>
-              <a:rPr lang="en-US" dirty="0" smtClean="0"/>
-              <a:t>support.unity3d.com/hc/en-us/articles/360001252086-UNet-Deprecation-FAQ.</a:t>
-            </a:r>
-            <a:endParaRPr lang="en-US" dirty="0"/>
-          </a:p>
-          <a:p>
-            <a:pPr marL="514350" indent="-514350" algn="l">
-              <a:buFont typeface="+mj-lt"/>
-              <a:buAutoNum type="arabicPeriod"/>
-            </a:pPr>
-            <a:r>
-              <a:rPr lang="en-US" dirty="0"/>
-              <a:t>Unity </a:t>
-            </a:r>
-            <a:r>
-              <a:rPr lang="en-US" dirty="0" smtClean="0"/>
-              <a:t>Blog.</a:t>
-            </a:r>
-            <a:r>
-              <a:rPr lang="en-US" b="1" dirty="0" smtClean="0"/>
-              <a:t> Navigating </a:t>
-            </a:r>
-            <a:r>
-              <a:rPr lang="en-US" b="1" dirty="0"/>
-              <a:t>Unity’s multiplayer </a:t>
-            </a:r>
-            <a:r>
-              <a:rPr lang="en-US" b="1" dirty="0" err="1"/>
-              <a:t>Netcode</a:t>
-            </a:r>
-            <a:r>
-              <a:rPr lang="en-US" b="1" dirty="0"/>
-              <a:t> </a:t>
-            </a:r>
-            <a:r>
-              <a:rPr lang="en-US" b="1" dirty="0" smtClean="0"/>
-              <a:t>transition</a:t>
-            </a:r>
-            <a:r>
-              <a:rPr lang="en-US" dirty="0" smtClean="0"/>
-              <a:t>. </a:t>
-            </a:r>
-            <a:r>
-              <a:rPr lang="en-US" dirty="0" err="1"/>
-              <a:t>Disponível</a:t>
-            </a:r>
-            <a:r>
-              <a:rPr lang="en-US" dirty="0"/>
-              <a:t> </a:t>
-            </a:r>
-            <a:r>
-              <a:rPr lang="en-US" dirty="0" err="1"/>
-              <a:t>em</a:t>
-            </a:r>
-            <a:r>
-              <a:rPr lang="en-US" dirty="0" smtClean="0"/>
-              <a:t>: </a:t>
-            </a:r>
-            <a:r>
-              <a:rPr lang="pt-BR" dirty="0">
-                <a:hlinkClick r:id="rId2"/>
-              </a:rPr>
-              <a:t>https://blogs.unity3d.com/2019/06/13/navigating-unitys-multiplayer-netcode-transition</a:t>
-            </a:r>
-            <a:r>
-              <a:rPr lang="pt-BR" dirty="0" smtClean="0">
-                <a:hlinkClick r:id="rId2"/>
-              </a:rPr>
-              <a:t>/</a:t>
-            </a:r>
-            <a:r>
-              <a:rPr lang="pt-BR" dirty="0" smtClean="0"/>
-              <a:t>.</a:t>
-            </a:r>
-            <a:endParaRPr lang="pt-BR" dirty="0"/>
-          </a:p>
-          <a:p>
-            <a:endParaRPr lang="pt-BR" dirty="0"/>
-          </a:p>
-          <a:p>
-            <a:endParaRPr lang="pt-BR" dirty="0"/>
-          </a:p>
-        </p:txBody>
-      </p:sp>
+            <a:r>
+              <a:rPr lang="pt-BR" dirty="0"/>
+              <a:t>As propriedades </a:t>
+            </a:r>
+            <a:r>
+              <a:rPr lang="pt-BR" b="1" dirty="0"/>
+              <a:t>Network </a:t>
+            </a:r>
+            <a:r>
+              <a:rPr lang="pt-BR" b="1" dirty="0" err="1"/>
+              <a:t>Address</a:t>
+            </a:r>
+            <a:r>
+              <a:rPr lang="pt-BR" dirty="0"/>
+              <a:t> e </a:t>
+            </a:r>
+            <a:r>
+              <a:rPr lang="pt-BR" b="1" dirty="0"/>
+              <a:t>Network </a:t>
+            </a:r>
+            <a:r>
+              <a:rPr lang="pt-BR" b="1" dirty="0" err="1"/>
+              <a:t>Port</a:t>
+            </a:r>
+            <a:r>
+              <a:rPr lang="pt-BR" dirty="0"/>
+              <a:t> são sempre usadas.</a:t>
+            </a:r>
+          </a:p>
+          <a:p>
+            <a:r>
+              <a:rPr lang="pt-BR" dirty="0"/>
+              <a:t>No </a:t>
+            </a:r>
+            <a:r>
+              <a:rPr lang="pt-BR" b="1" dirty="0"/>
+              <a:t>modo cliente</a:t>
+            </a:r>
+            <a:r>
+              <a:rPr lang="pt-BR" dirty="0"/>
+              <a:t>, o jogo tentará se conectar ao endereço e porta especificados.</a:t>
+            </a:r>
+          </a:p>
+          <a:p>
+            <a:r>
+              <a:rPr lang="pt-BR" dirty="0"/>
+              <a:t>No </a:t>
+            </a:r>
+            <a:r>
+              <a:rPr lang="pt-BR" b="1" dirty="0"/>
+              <a:t>modo servidor</a:t>
+            </a:r>
+            <a:r>
+              <a:rPr lang="pt-BR" dirty="0"/>
+              <a:t> ou </a:t>
+            </a:r>
+            <a:r>
+              <a:rPr lang="pt-BR" b="1" dirty="0"/>
+              <a:t>host</a:t>
+            </a:r>
+            <a:r>
+              <a:rPr lang="pt-BR" dirty="0"/>
+              <a:t>, o jogo espera por conexões de entrada na porta especificada.</a:t>
+            </a:r>
+          </a:p>
+        </p:txBody>
+      </p:sp>
+      <p:pic>
+        <p:nvPicPr>
+          <p:cNvPr id="2" name="Picture 1">
+            <a:extLst>
+              <a:ext uri="{FF2B5EF4-FFF2-40B4-BE49-F238E27FC236}">
+                <a16:creationId xmlns:a16="http://schemas.microsoft.com/office/drawing/2014/main" id="{D50AEE73-AF39-4A3A-AD64-094CD4F4E784}"/>
+              </a:ext>
+            </a:extLst>
+          </p:cNvPr>
+          <p:cNvPicPr>
+            <a:picLocks noChangeAspect="1"/>
+          </p:cNvPicPr>
+          <p:nvPr/>
+        </p:nvPicPr>
+        <p:blipFill>
+          <a:blip r:embed="rId2"/>
+          <a:stretch>
+            <a:fillRect/>
+          </a:stretch>
+        </p:blipFill>
+        <p:spPr>
+          <a:xfrm>
+            <a:off x="4195981" y="4927435"/>
+            <a:ext cx="3800037" cy="1429911"/>
+          </a:xfrm>
+          <a:prstGeom prst="rect">
+            <a:avLst/>
+          </a:prstGeom>
+        </p:spPr>
+      </p:pic>
     </p:spTree>
     <p:extLst>
       <p:ext uri="{BB962C8B-B14F-4D97-AF65-F5344CB8AC3E}">
-        <p14:creationId xmlns:p14="http://schemas.microsoft.com/office/powerpoint/2010/main" val="4155669808"/>
+        <p14:creationId xmlns:p14="http://schemas.microsoft.com/office/powerpoint/2010/main" val="1942497310"/>
+      </p:ext>
+    </p:extLst>
+  </p:cSld>
+  <p:clrMapOvr>
+    <a:masterClrMapping/>
+  </p:clrMapOvr>
+</p:sld>
+</file>
+
+<file path=ppt/slides/slide7.xml><?xml version="1.0" encoding="utf-8"?>
+<p:sld xmlns:a="http://schemas.openxmlformats.org/drawingml/2006/main" xmlns:r="http://schemas.openxmlformats.org/officeDocument/2006/relationships" xmlns:p="http://schemas.openxmlformats.org/presentationml/2006/main">
+  <p:cSld>
+    <p:spTree>
+      <p:nvGrpSpPr>
+        <p:cNvPr id="1" name=""/>
+        <p:cNvGrpSpPr/>
+        <p:nvPr/>
+      </p:nvGrpSpPr>
+      <p:grpSpPr>
+        <a:xfrm>
+          <a:off x="0" y="0"/>
+          <a:ext cx="0" cy="0"/>
+          <a:chOff x="0" y="0"/>
+          <a:chExt cx="0" cy="0"/>
+        </a:xfrm>
+      </p:grpSpPr>
+      <p:sp>
+        <p:nvSpPr>
+          <p:cNvPr id="5" name="Título 4"/>
+          <p:cNvSpPr>
+            <a:spLocks noGrp="1"/>
+          </p:cNvSpPr>
+          <p:nvPr>
+            <p:ph type="title"/>
+          </p:nvPr>
+        </p:nvSpPr>
+        <p:spPr/>
+        <p:txBody>
+          <a:bodyPr/>
+          <a:lstStyle/>
+          <a:p>
+            <a:r>
+              <a:rPr lang="pt-BR" dirty="0"/>
+              <a:t>Gerenciamento de Spawn</a:t>
+            </a:r>
+          </a:p>
+        </p:txBody>
+      </p:sp>
+      <p:sp>
+        <p:nvSpPr>
+          <p:cNvPr id="6" name="Espaço Reservado para Conteúdo 5"/>
+          <p:cNvSpPr>
+            <a:spLocks noGrp="1"/>
+          </p:cNvSpPr>
+          <p:nvPr>
+            <p:ph idx="1"/>
+          </p:nvPr>
+        </p:nvSpPr>
+        <p:spPr/>
+        <p:txBody>
+          <a:bodyPr>
+            <a:normAutofit/>
+          </a:bodyPr>
+          <a:lstStyle/>
+          <a:p>
+            <a:r>
+              <a:rPr lang="pt-BR" dirty="0"/>
+              <a:t>Existe uma lista de </a:t>
+            </a:r>
+            <a:r>
+              <a:rPr lang="pt-BR" dirty="0" err="1"/>
+              <a:t>Prefabs</a:t>
+            </a:r>
+            <a:r>
+              <a:rPr lang="pt-BR" dirty="0"/>
+              <a:t> para que sejam declarados todos </a:t>
+            </a:r>
+            <a:r>
+              <a:rPr lang="pt-BR" dirty="0" err="1"/>
+              <a:t>GameObjects</a:t>
+            </a:r>
+            <a:r>
+              <a:rPr lang="pt-BR" dirty="0"/>
+              <a:t> que são gerados dinamicamente durante o jogo e um campo especial para o </a:t>
+            </a:r>
+            <a:r>
+              <a:rPr lang="pt-BR" dirty="0" err="1"/>
+              <a:t>Prefab</a:t>
+            </a:r>
+            <a:r>
+              <a:rPr lang="pt-BR" dirty="0"/>
+              <a:t> do player.</a:t>
+            </a:r>
+          </a:p>
+          <a:p>
+            <a:r>
+              <a:rPr lang="pt-BR" dirty="0"/>
+              <a:t>A posição na qual o player é gerado é escolhida, em uma lista pré-estabelecida, de modo aleatório ou cíclico.   </a:t>
+            </a:r>
+          </a:p>
+        </p:txBody>
+      </p:sp>
+      <p:pic>
+        <p:nvPicPr>
+          <p:cNvPr id="3" name="Picture 2">
+            <a:extLst>
+              <a:ext uri="{FF2B5EF4-FFF2-40B4-BE49-F238E27FC236}">
+                <a16:creationId xmlns:a16="http://schemas.microsoft.com/office/drawing/2014/main" id="{500352BE-B707-4E2C-A0FD-5050E201F1F4}"/>
+              </a:ext>
+            </a:extLst>
+          </p:cNvPr>
+          <p:cNvPicPr>
+            <a:picLocks noChangeAspect="1"/>
+          </p:cNvPicPr>
+          <p:nvPr/>
+        </p:nvPicPr>
+        <p:blipFill>
+          <a:blip r:embed="rId2"/>
+          <a:stretch>
+            <a:fillRect/>
+          </a:stretch>
+        </p:blipFill>
+        <p:spPr>
+          <a:xfrm>
+            <a:off x="3749682" y="4272197"/>
+            <a:ext cx="4692636" cy="1993692"/>
+          </a:xfrm>
+          <a:prstGeom prst="rect">
+            <a:avLst/>
+          </a:prstGeom>
+        </p:spPr>
+      </p:pic>
+    </p:spTree>
+    <p:extLst>
+      <p:ext uri="{BB962C8B-B14F-4D97-AF65-F5344CB8AC3E}">
+        <p14:creationId xmlns:p14="http://schemas.microsoft.com/office/powerpoint/2010/main" val="3774583535"/>
+      </p:ext>
+    </p:extLst>
+  </p:cSld>
+  <p:clrMapOvr>
+    <a:masterClrMapping/>
+  </p:clrMapOvr>
+</p:sld>
+</file>
+
+<file path=ppt/slides/slide8.xml><?xml version="1.0" encoding="utf-8"?>
+<p:sld xmlns:a="http://schemas.openxmlformats.org/drawingml/2006/main" xmlns:r="http://schemas.openxmlformats.org/officeDocument/2006/relationships" xmlns:p="http://schemas.openxmlformats.org/presentationml/2006/main">
+  <p:cSld>
+    <p:spTree>
+      <p:nvGrpSpPr>
+        <p:cNvPr id="1" name=""/>
+        <p:cNvGrpSpPr/>
+        <p:nvPr/>
+      </p:nvGrpSpPr>
+      <p:grpSpPr>
+        <a:xfrm>
+          <a:off x="0" y="0"/>
+          <a:ext cx="0" cy="0"/>
+          <a:chOff x="0" y="0"/>
+          <a:chExt cx="0" cy="0"/>
+        </a:xfrm>
+      </p:grpSpPr>
+      <p:sp>
+        <p:nvSpPr>
+          <p:cNvPr id="5" name="Título 4"/>
+          <p:cNvSpPr>
+            <a:spLocks noGrp="1"/>
+          </p:cNvSpPr>
+          <p:nvPr>
+            <p:ph type="title"/>
+          </p:nvPr>
+        </p:nvSpPr>
+        <p:spPr/>
+        <p:txBody>
+          <a:bodyPr/>
+          <a:lstStyle/>
+          <a:p>
+            <a:r>
+              <a:rPr lang="pt-BR" dirty="0"/>
+              <a:t>Network Manager HUD</a:t>
+            </a:r>
+          </a:p>
+        </p:txBody>
+      </p:sp>
+      <p:sp>
+        <p:nvSpPr>
+          <p:cNvPr id="6" name="Espaço Reservado para Conteúdo 5"/>
+          <p:cNvSpPr>
+            <a:spLocks noGrp="1"/>
+          </p:cNvSpPr>
+          <p:nvPr>
+            <p:ph idx="1"/>
+          </p:nvPr>
+        </p:nvSpPr>
+        <p:spPr/>
+        <p:txBody>
+          <a:bodyPr>
+            <a:normAutofit/>
+          </a:bodyPr>
+          <a:lstStyle/>
+          <a:p>
+            <a:r>
+              <a:rPr lang="pt-BR" dirty="0"/>
+              <a:t>Fornece funções básicas para que um pessoas possa iniciar o jogo hospedando uma instância ou encontrar uma instância existente para jogar. </a:t>
+            </a:r>
+          </a:p>
+        </p:txBody>
+      </p:sp>
+      <p:pic>
+        <p:nvPicPr>
+          <p:cNvPr id="2" name="Picture 1">
+            <a:extLst>
+              <a:ext uri="{FF2B5EF4-FFF2-40B4-BE49-F238E27FC236}">
+                <a16:creationId xmlns:a16="http://schemas.microsoft.com/office/drawing/2014/main" id="{754A0854-01A6-4F0A-837D-E8C04513512E}"/>
+              </a:ext>
+            </a:extLst>
+          </p:cNvPr>
+          <p:cNvPicPr>
+            <a:picLocks noChangeAspect="1"/>
+          </p:cNvPicPr>
+          <p:nvPr/>
+        </p:nvPicPr>
+        <p:blipFill>
+          <a:blip r:embed="rId2"/>
+          <a:stretch>
+            <a:fillRect/>
+          </a:stretch>
+        </p:blipFill>
+        <p:spPr>
+          <a:xfrm>
+            <a:off x="4296762" y="3401493"/>
+            <a:ext cx="3598475" cy="2165454"/>
+          </a:xfrm>
+          <a:prstGeom prst="rect">
+            <a:avLst/>
+          </a:prstGeom>
+        </p:spPr>
+      </p:pic>
+    </p:spTree>
+    <p:extLst>
+      <p:ext uri="{BB962C8B-B14F-4D97-AF65-F5344CB8AC3E}">
+        <p14:creationId xmlns:p14="http://schemas.microsoft.com/office/powerpoint/2010/main" val="2296660528"/>
+      </p:ext>
+    </p:extLst>
+  </p:cSld>
+  <p:clrMapOvr>
+    <a:masterClrMapping/>
+  </p:clrMapOvr>
+</p:sld>
+</file>
+
+<file path=ppt/slides/slide9.xml><?xml version="1.0" encoding="utf-8"?>
+<p:sld xmlns:a="http://schemas.openxmlformats.org/drawingml/2006/main" xmlns:r="http://schemas.openxmlformats.org/officeDocument/2006/relationships" xmlns:p="http://schemas.openxmlformats.org/presentationml/2006/main">
+  <p:cSld>
+    <p:spTree>
+      <p:nvGrpSpPr>
+        <p:cNvPr id="1" name=""/>
+        <p:cNvGrpSpPr/>
+        <p:nvPr/>
+      </p:nvGrpSpPr>
+      <p:grpSpPr>
+        <a:xfrm>
+          <a:off x="0" y="0"/>
+          <a:ext cx="0" cy="0"/>
+          <a:chOff x="0" y="0"/>
+          <a:chExt cx="0" cy="0"/>
+        </a:xfrm>
+      </p:grpSpPr>
+      <p:sp>
+        <p:nvSpPr>
+          <p:cNvPr id="5" name="Título 4"/>
+          <p:cNvSpPr>
+            <a:spLocks noGrp="1"/>
+          </p:cNvSpPr>
+          <p:nvPr>
+            <p:ph type="title"/>
+          </p:nvPr>
+        </p:nvSpPr>
+        <p:spPr/>
+        <p:txBody>
+          <a:bodyPr/>
+          <a:lstStyle/>
+          <a:p>
+            <a:r>
+              <a:rPr lang="pt-BR" dirty="0"/>
+              <a:t>Network Manager HUD</a:t>
+            </a:r>
+          </a:p>
+        </p:txBody>
+      </p:sp>
+      <p:sp>
+        <p:nvSpPr>
+          <p:cNvPr id="6" name="Espaço Reservado para Conteúdo 5"/>
+          <p:cNvSpPr>
+            <a:spLocks noGrp="1"/>
+          </p:cNvSpPr>
+          <p:nvPr>
+            <p:ph idx="1"/>
+          </p:nvPr>
+        </p:nvSpPr>
+        <p:spPr/>
+        <p:txBody>
+          <a:bodyPr>
+            <a:normAutofit/>
+          </a:bodyPr>
+          <a:lstStyle/>
+          <a:p>
+            <a:r>
+              <a:rPr lang="pt-BR" dirty="0"/>
+              <a:t>Ele tem 2 modos básicos: </a:t>
+            </a:r>
+            <a:r>
+              <a:rPr lang="pt-BR" b="1" dirty="0"/>
+              <a:t>LAN</a:t>
+            </a:r>
+            <a:r>
+              <a:rPr lang="pt-BR" dirty="0"/>
+              <a:t> e </a:t>
+            </a:r>
+            <a:r>
+              <a:rPr lang="pt-BR" b="1" dirty="0" err="1"/>
+              <a:t>Matchmaker</a:t>
+            </a:r>
+            <a:r>
+              <a:rPr lang="pt-BR" dirty="0"/>
+              <a:t>.</a:t>
+            </a:r>
+          </a:p>
+          <a:p>
+            <a:r>
+              <a:rPr lang="pt-BR" b="1" dirty="0"/>
+              <a:t>LAN</a:t>
+            </a:r>
+            <a:r>
+              <a:rPr lang="pt-BR" dirty="0"/>
+              <a:t> (modo padrão) para criar ou entrar em jogos hospedados em rede local e </a:t>
+            </a:r>
+            <a:r>
+              <a:rPr lang="pt-BR" b="1" dirty="0" err="1"/>
+              <a:t>Matchmaker</a:t>
+            </a:r>
+            <a:r>
+              <a:rPr lang="pt-BR" dirty="0"/>
+              <a:t> para criar, encontrar e entrar em jogos na internet.</a:t>
+            </a:r>
+          </a:p>
+          <a:p>
+            <a:endParaRPr lang="pt-BR" dirty="0"/>
+          </a:p>
+        </p:txBody>
+      </p:sp>
+      <p:pic>
+        <p:nvPicPr>
+          <p:cNvPr id="2" name="Picture 1">
+            <a:extLst>
+              <a:ext uri="{FF2B5EF4-FFF2-40B4-BE49-F238E27FC236}">
+                <a16:creationId xmlns:a16="http://schemas.microsoft.com/office/drawing/2014/main" id="{754A0854-01A6-4F0A-837D-E8C04513512E}"/>
+              </a:ext>
+            </a:extLst>
+          </p:cNvPr>
+          <p:cNvPicPr>
+            <a:picLocks noChangeAspect="1"/>
+          </p:cNvPicPr>
+          <p:nvPr/>
+        </p:nvPicPr>
+        <p:blipFill>
+          <a:blip r:embed="rId2"/>
+          <a:stretch>
+            <a:fillRect/>
+          </a:stretch>
+        </p:blipFill>
+        <p:spPr>
+          <a:xfrm>
+            <a:off x="4296762" y="3911157"/>
+            <a:ext cx="3598475" cy="2165454"/>
+          </a:xfrm>
+          <a:prstGeom prst="rect">
+            <a:avLst/>
+          </a:prstGeom>
+        </p:spPr>
+      </p:pic>
+    </p:spTree>
+    <p:extLst>
+      <p:ext uri="{BB962C8B-B14F-4D97-AF65-F5344CB8AC3E}">
+        <p14:creationId xmlns:p14="http://schemas.microsoft.com/office/powerpoint/2010/main" val="2315464144"/>
       </p:ext>
     </p:extLst>
   </p:cSld>

</xml_diff>

<commit_message>
adição dos slides: - Autoridade de Rede; - Propriedades de Contexto de Rede; - Network Transform; - Método OnStartLocalPlayer; e - Atributo Command.
</commit_message>
<xml_diff>
--- a/unity-multiplayer.pptx
+++ b/unity-multiplayer.pptx
@@ -5,7 +5,7 @@
     <p:sldMasterId id="2147483648" r:id="rId1"/>
   </p:sldMasterIdLst>
   <p:notesMasterIdLst>
-    <p:notesMasterId r:id="rId14"/>
+    <p:notesMasterId r:id="rId21"/>
   </p:notesMasterIdLst>
   <p:sldIdLst>
     <p:sldId id="256" r:id="rId2"/>
@@ -18,8 +18,15 @@
     <p:sldId id="355" r:id="rId9"/>
     <p:sldId id="360" r:id="rId10"/>
     <p:sldId id="361" r:id="rId11"/>
-    <p:sldId id="357" r:id="rId12"/>
-    <p:sldId id="352" r:id="rId13"/>
+    <p:sldId id="362" r:id="rId12"/>
+    <p:sldId id="363" r:id="rId13"/>
+    <p:sldId id="364" r:id="rId14"/>
+    <p:sldId id="365" r:id="rId15"/>
+    <p:sldId id="366" r:id="rId16"/>
+    <p:sldId id="367" r:id="rId17"/>
+    <p:sldId id="368" r:id="rId18"/>
+    <p:sldId id="357" r:id="rId19"/>
+    <p:sldId id="352" r:id="rId20"/>
   </p:sldIdLst>
   <p:sldSz cx="12192000" cy="6858000"/>
   <p:notesSz cx="6858000" cy="9144000"/>
@@ -208,7 +215,7 @@
           <a:p>
             <a:fld id="{94D3EB41-CF60-4C9F-BD83-AE56FA0945EB}" type="datetimeFigureOut">
               <a:rPr lang="pt-BR" smtClean="0"/>
-              <a:t>03/09/2019</a:t>
+              <a:t>10/09/2019</a:t>
             </a:fld>
             <a:endParaRPr lang="pt-BR"/>
           </a:p>
@@ -718,7 +725,7 @@
           <a:p>
             <a:fld id="{9642BF85-54FF-46CE-B398-87F998CFD60B}" type="datetimeFigureOut">
               <a:rPr lang="pt-BR" smtClean="0"/>
-              <a:t>03/09/2019</a:t>
+              <a:t>10/09/2019</a:t>
             </a:fld>
             <a:endParaRPr lang="pt-BR"/>
           </a:p>
@@ -886,7 +893,7 @@
           <a:p>
             <a:fld id="{9642BF85-54FF-46CE-B398-87F998CFD60B}" type="datetimeFigureOut">
               <a:rPr lang="pt-BR" smtClean="0"/>
-              <a:t>03/09/2019</a:t>
+              <a:t>10/09/2019</a:t>
             </a:fld>
             <a:endParaRPr lang="pt-BR"/>
           </a:p>
@@ -1064,7 +1071,7 @@
           <a:p>
             <a:fld id="{9642BF85-54FF-46CE-B398-87F998CFD60B}" type="datetimeFigureOut">
               <a:rPr lang="pt-BR" smtClean="0"/>
-              <a:t>03/09/2019</a:t>
+              <a:t>10/09/2019</a:t>
             </a:fld>
             <a:endParaRPr lang="pt-BR"/>
           </a:p>
@@ -1401,7 +1408,7 @@
           <a:p>
             <a:fld id="{9642BF85-54FF-46CE-B398-87F998CFD60B}" type="datetimeFigureOut">
               <a:rPr lang="pt-BR" smtClean="0"/>
-              <a:t>03/09/2019</a:t>
+              <a:t>10/09/2019</a:t>
             </a:fld>
             <a:endParaRPr lang="pt-BR"/>
           </a:p>
@@ -1672,7 +1679,7 @@
           <a:p>
             <a:fld id="{9642BF85-54FF-46CE-B398-87F998CFD60B}" type="datetimeFigureOut">
               <a:rPr lang="pt-BR" smtClean="0"/>
-              <a:t>03/09/2019</a:t>
+              <a:t>10/09/2019</a:t>
             </a:fld>
             <a:endParaRPr lang="pt-BR"/>
           </a:p>
@@ -1918,7 +1925,7 @@
           <a:p>
             <a:fld id="{9642BF85-54FF-46CE-B398-87F998CFD60B}" type="datetimeFigureOut">
               <a:rPr lang="pt-BR" smtClean="0"/>
-              <a:t>03/09/2019</a:t>
+              <a:t>10/09/2019</a:t>
             </a:fld>
             <a:endParaRPr lang="pt-BR"/>
           </a:p>
@@ -2282,7 +2289,7 @@
           <a:p>
             <a:fld id="{9642BF85-54FF-46CE-B398-87F998CFD60B}" type="datetimeFigureOut">
               <a:rPr lang="pt-BR" smtClean="0"/>
-              <a:t>03/09/2019</a:t>
+              <a:t>10/09/2019</a:t>
             </a:fld>
             <a:endParaRPr lang="pt-BR"/>
           </a:p>
@@ -2416,7 +2423,7 @@
           <a:p>
             <a:fld id="{9642BF85-54FF-46CE-B398-87F998CFD60B}" type="datetimeFigureOut">
               <a:rPr lang="pt-BR" smtClean="0"/>
-              <a:t>03/09/2019</a:t>
+              <a:t>10/09/2019</a:t>
             </a:fld>
             <a:endParaRPr lang="pt-BR"/>
           </a:p>
@@ -2511,7 +2518,7 @@
           <a:p>
             <a:fld id="{9642BF85-54FF-46CE-B398-87F998CFD60B}" type="datetimeFigureOut">
               <a:rPr lang="pt-BR" smtClean="0"/>
-              <a:t>03/09/2019</a:t>
+              <a:t>10/09/2019</a:t>
             </a:fld>
             <a:endParaRPr lang="pt-BR"/>
           </a:p>
@@ -2786,7 +2793,7 @@
           <a:p>
             <a:fld id="{9642BF85-54FF-46CE-B398-87F998CFD60B}" type="datetimeFigureOut">
               <a:rPr lang="pt-BR" smtClean="0"/>
-              <a:t>03/09/2019</a:t>
+              <a:t>10/09/2019</a:t>
             </a:fld>
             <a:endParaRPr lang="pt-BR"/>
           </a:p>
@@ -3038,7 +3045,7 @@
           <a:p>
             <a:fld id="{9642BF85-54FF-46CE-B398-87F998CFD60B}" type="datetimeFigureOut">
               <a:rPr lang="pt-BR" smtClean="0"/>
-              <a:t>03/09/2019</a:t>
+              <a:t>10/09/2019</a:t>
             </a:fld>
             <a:endParaRPr lang="pt-BR"/>
           </a:p>
@@ -3258,7 +3265,7 @@
           <a:p>
             <a:fld id="{9642BF85-54FF-46CE-B398-87F998CFD60B}" type="datetimeFigureOut">
               <a:rPr lang="pt-BR" smtClean="0"/>
-              <a:t>03/09/2019</a:t>
+              <a:t>10/09/2019</a:t>
             </a:fld>
             <a:endParaRPr lang="pt-BR"/>
           </a:p>
@@ -3893,7 +3900,7 @@
           <a:p>
             <a:r>
               <a:rPr lang="pt-BR" dirty="0"/>
-              <a:t>Notas</a:t>
+              <a:t>Autoridade de Rede</a:t>
             </a:r>
           </a:p>
         </p:txBody>
@@ -3917,44 +3924,37 @@
           <a:p>
             <a:r>
               <a:rPr lang="pt-BR" dirty="0"/>
-              <a:t>Deve haver apenas uma Network Manager ativo por cena.</a:t>
-            </a:r>
-            <a:r>
-              <a:rPr lang="en-US" dirty="0"/>
-              <a:t> </a:t>
-            </a:r>
-          </a:p>
-          <a:p>
-            <a:r>
-              <a:rPr lang="en-US" dirty="0"/>
-              <a:t>Do not place the Network Manager component on a networked </a:t>
-            </a:r>
-            <a:r>
-              <a:rPr lang="en-US" dirty="0" err="1"/>
+              <a:t>Servidores e clientes podem gerenciar o comportamento de </a:t>
+            </a:r>
+            <a:r>
+              <a:rPr lang="pt-BR" dirty="0" err="1"/>
+              <a:t>GameObjects</a:t>
+            </a:r>
+            <a:r>
+              <a:rPr lang="pt-BR" dirty="0"/>
+              <a:t>.</a:t>
+            </a:r>
+          </a:p>
+          <a:p>
+            <a:r>
+              <a:rPr lang="pt-BR" dirty="0"/>
+              <a:t>O conceito de “autoridade” refere-se a como e onde um </a:t>
+            </a:r>
+            <a:r>
+              <a:rPr lang="pt-BR" dirty="0" err="1"/>
               <a:t>GameObject</a:t>
             </a:r>
             <a:r>
-              <a:rPr lang="en-US" dirty="0"/>
-              <a:t> (one which has a </a:t>
-            </a:r>
-            <a:r>
-              <a:rPr lang="en-US" u="sng" dirty="0">
-                <a:hlinkClick r:id="rId2"/>
-              </a:rPr>
-              <a:t>Network Identity</a:t>
-            </a:r>
-            <a:r>
-              <a:rPr lang="en-US" dirty="0"/>
-              <a:t> component), because Unity disables these when the Scene loads.</a:t>
-            </a:r>
-            <a:endParaRPr lang="pt-BR" dirty="0"/>
+              <a:rPr lang="pt-BR" dirty="0"/>
+              <a:t> é gerenciado.</a:t>
+            </a:r>
           </a:p>
         </p:txBody>
       </p:sp>
     </p:spTree>
     <p:extLst>
       <p:ext uri="{BB962C8B-B14F-4D97-AF65-F5344CB8AC3E}">
-        <p14:creationId xmlns:p14="http://schemas.microsoft.com/office/powerpoint/2010/main" val="128422404"/>
+        <p14:creationId xmlns:p14="http://schemas.microsoft.com/office/powerpoint/2010/main" val="2460826874"/>
       </p:ext>
     </p:extLst>
   </p:cSld>
@@ -3993,6 +3993,810 @@
         </p:nvSpPr>
         <p:spPr/>
         <p:txBody>
+          <a:bodyPr/>
+          <a:lstStyle/>
+          <a:p>
+            <a:r>
+              <a:rPr lang="pt-BR" dirty="0"/>
+              <a:t>Autoridade de Rede</a:t>
+            </a:r>
+          </a:p>
+        </p:txBody>
+      </p:sp>
+      <p:sp>
+        <p:nvSpPr>
+          <p:cNvPr id="6" name="Espaço Reservado para Conteúdo 5"/>
+          <p:cNvSpPr>
+            <a:spLocks noGrp="1"/>
+          </p:cNvSpPr>
+          <p:nvPr>
+            <p:ph idx="1"/>
+          </p:nvPr>
+        </p:nvSpPr>
+        <p:spPr/>
+        <p:txBody>
+          <a:bodyPr>
+            <a:normAutofit/>
+          </a:bodyPr>
+          <a:lstStyle/>
+          <a:p>
+            <a:r>
+              <a:rPr lang="pt-BR" b="1" dirty="0"/>
+              <a:t>Server </a:t>
+            </a:r>
+            <a:r>
+              <a:rPr lang="pt-BR" b="1" dirty="0" err="1"/>
+              <a:t>Authority</a:t>
+            </a:r>
+            <a:r>
+              <a:rPr lang="pt-BR" dirty="0"/>
+              <a:t>: estado padrão de autoridade em jogos em rede no </a:t>
+            </a:r>
+            <a:r>
+              <a:rPr lang="pt-BR" dirty="0" err="1"/>
+              <a:t>Unity</a:t>
+            </a:r>
+            <a:r>
+              <a:rPr lang="pt-BR" dirty="0"/>
+              <a:t> que usam o HLAPI.</a:t>
+            </a:r>
+          </a:p>
+          <a:p>
+            <a:r>
+              <a:rPr lang="pt-BR" dirty="0"/>
+              <a:t>Isso significa que, por padrão, o servidor gerencia o controle sobre todos os </a:t>
+            </a:r>
+            <a:r>
+              <a:rPr lang="pt-BR" dirty="0" err="1"/>
+              <a:t>GameObjects</a:t>
+            </a:r>
+            <a:r>
+              <a:rPr lang="pt-BR" dirty="0"/>
+              <a:t> que não são players.</a:t>
+            </a:r>
+          </a:p>
+        </p:txBody>
+      </p:sp>
+    </p:spTree>
+    <p:extLst>
+      <p:ext uri="{BB962C8B-B14F-4D97-AF65-F5344CB8AC3E}">
+        <p14:creationId xmlns:p14="http://schemas.microsoft.com/office/powerpoint/2010/main" val="2423304971"/>
+      </p:ext>
+    </p:extLst>
+  </p:cSld>
+  <p:clrMapOvr>
+    <a:masterClrMapping/>
+  </p:clrMapOvr>
+</p:sld>
+</file>
+
+<file path=ppt/slides/slide13.xml><?xml version="1.0" encoding="utf-8"?>
+<p:sld xmlns:a="http://schemas.openxmlformats.org/drawingml/2006/main" xmlns:r="http://schemas.openxmlformats.org/officeDocument/2006/relationships" xmlns:p="http://schemas.openxmlformats.org/presentationml/2006/main">
+  <p:cSld>
+    <p:spTree>
+      <p:nvGrpSpPr>
+        <p:cNvPr id="1" name=""/>
+        <p:cNvGrpSpPr/>
+        <p:nvPr/>
+      </p:nvGrpSpPr>
+      <p:grpSpPr>
+        <a:xfrm>
+          <a:off x="0" y="0"/>
+          <a:ext cx="0" cy="0"/>
+          <a:chOff x="0" y="0"/>
+          <a:chExt cx="0" cy="0"/>
+        </a:xfrm>
+      </p:grpSpPr>
+      <p:sp>
+        <p:nvSpPr>
+          <p:cNvPr id="5" name="Título 4"/>
+          <p:cNvSpPr>
+            <a:spLocks noGrp="1"/>
+          </p:cNvSpPr>
+          <p:nvPr>
+            <p:ph type="title"/>
+          </p:nvPr>
+        </p:nvSpPr>
+        <p:spPr/>
+        <p:txBody>
+          <a:bodyPr/>
+          <a:lstStyle/>
+          <a:p>
+            <a:r>
+              <a:rPr lang="pt-BR" dirty="0"/>
+              <a:t>Autoridade de Rede</a:t>
+            </a:r>
+          </a:p>
+        </p:txBody>
+      </p:sp>
+      <p:sp>
+        <p:nvSpPr>
+          <p:cNvPr id="6" name="Espaço Reservado para Conteúdo 5"/>
+          <p:cNvSpPr>
+            <a:spLocks noGrp="1"/>
+          </p:cNvSpPr>
+          <p:nvPr>
+            <p:ph idx="1"/>
+          </p:nvPr>
+        </p:nvSpPr>
+        <p:spPr/>
+        <p:txBody>
+          <a:bodyPr>
+            <a:normAutofit/>
+          </a:bodyPr>
+          <a:lstStyle/>
+          <a:p>
+            <a:r>
+              <a:rPr lang="pt-BR" b="1" dirty="0"/>
+              <a:t>Local </a:t>
+            </a:r>
+            <a:r>
+              <a:rPr lang="pt-BR" b="1" dirty="0" err="1"/>
+              <a:t>Authority</a:t>
+            </a:r>
+            <a:r>
+              <a:rPr lang="pt-BR" dirty="0"/>
+              <a:t>: ou </a:t>
+            </a:r>
+            <a:r>
+              <a:rPr lang="pt-BR" b="1" dirty="0" err="1"/>
+              <a:t>Client</a:t>
+            </a:r>
+            <a:r>
+              <a:rPr lang="pt-BR" b="1" dirty="0"/>
+              <a:t> </a:t>
+            </a:r>
+            <a:r>
+              <a:rPr lang="pt-BR" b="1" dirty="0" err="1"/>
+              <a:t>Authority</a:t>
+            </a:r>
+            <a:r>
+              <a:rPr lang="pt-BR" dirty="0"/>
+              <a:t>, significa que o cliente local tem autoridade sobre um determinado </a:t>
+            </a:r>
+            <a:r>
+              <a:rPr lang="pt-BR" dirty="0" err="1"/>
+              <a:t>GameObject</a:t>
+            </a:r>
+            <a:r>
+              <a:rPr lang="pt-BR" dirty="0"/>
+              <a:t> em rede.</a:t>
+            </a:r>
+          </a:p>
+        </p:txBody>
+      </p:sp>
+    </p:spTree>
+    <p:extLst>
+      <p:ext uri="{BB962C8B-B14F-4D97-AF65-F5344CB8AC3E}">
+        <p14:creationId xmlns:p14="http://schemas.microsoft.com/office/powerpoint/2010/main" val="3234672836"/>
+      </p:ext>
+    </p:extLst>
+  </p:cSld>
+  <p:clrMapOvr>
+    <a:masterClrMapping/>
+  </p:clrMapOvr>
+</p:sld>
+</file>
+
+<file path=ppt/slides/slide14.xml><?xml version="1.0" encoding="utf-8"?>
+<p:sld xmlns:a="http://schemas.openxmlformats.org/drawingml/2006/main" xmlns:r="http://schemas.openxmlformats.org/officeDocument/2006/relationships" xmlns:p="http://schemas.openxmlformats.org/presentationml/2006/main">
+  <p:cSld>
+    <p:spTree>
+      <p:nvGrpSpPr>
+        <p:cNvPr id="1" name=""/>
+        <p:cNvGrpSpPr/>
+        <p:nvPr/>
+      </p:nvGrpSpPr>
+      <p:grpSpPr>
+        <a:xfrm>
+          <a:off x="0" y="0"/>
+          <a:ext cx="0" cy="0"/>
+          <a:chOff x="0" y="0"/>
+          <a:chExt cx="0" cy="0"/>
+        </a:xfrm>
+      </p:grpSpPr>
+      <p:sp>
+        <p:nvSpPr>
+          <p:cNvPr id="5" name="Título 4"/>
+          <p:cNvSpPr>
+            <a:spLocks noGrp="1"/>
+          </p:cNvSpPr>
+          <p:nvPr>
+            <p:ph type="title"/>
+          </p:nvPr>
+        </p:nvSpPr>
+        <p:spPr/>
+        <p:txBody>
+          <a:bodyPr/>
+          <a:lstStyle/>
+          <a:p>
+            <a:r>
+              <a:rPr lang="pt-BR" dirty="0"/>
+              <a:t>Propriedades de Contexto de Rede</a:t>
+            </a:r>
+          </a:p>
+        </p:txBody>
+      </p:sp>
+      <p:sp>
+        <p:nvSpPr>
+          <p:cNvPr id="6" name="Espaço Reservado para Conteúdo 5"/>
+          <p:cNvSpPr>
+            <a:spLocks noGrp="1"/>
+          </p:cNvSpPr>
+          <p:nvPr>
+            <p:ph idx="1"/>
+          </p:nvPr>
+        </p:nvSpPr>
+        <p:spPr/>
+        <p:txBody>
+          <a:bodyPr>
+            <a:normAutofit fontScale="92500"/>
+          </a:bodyPr>
+          <a:lstStyle/>
+          <a:p>
+            <a:r>
+              <a:rPr lang="pt-BR" dirty="0"/>
+              <a:t>A classe </a:t>
+            </a:r>
+            <a:r>
+              <a:rPr lang="pt-BR" b="1" dirty="0" err="1"/>
+              <a:t>NetworkBehaviour</a:t>
+            </a:r>
+            <a:r>
+              <a:rPr lang="pt-BR" dirty="0"/>
+              <a:t> contem propriedades que permitem saber qual é o contexto de um </a:t>
+            </a:r>
+            <a:r>
+              <a:rPr lang="pt-BR" dirty="0" err="1"/>
+              <a:t>GameObject</a:t>
+            </a:r>
+            <a:r>
+              <a:rPr lang="pt-BR" dirty="0"/>
+              <a:t> em rede:</a:t>
+            </a:r>
+          </a:p>
+          <a:p>
+            <a:pPr marL="457200" indent="-457200" algn="l">
+              <a:buFont typeface="Arial" panose="020B0604020202020204" pitchFamily="34" charset="0"/>
+              <a:buChar char="•"/>
+            </a:pPr>
+            <a:r>
+              <a:rPr lang="pt-BR" b="1" dirty="0" err="1"/>
+              <a:t>isServer</a:t>
+            </a:r>
+            <a:r>
+              <a:rPr lang="pt-BR" dirty="0"/>
+              <a:t>: verdadeiro se está no servidor (ou host);</a:t>
+            </a:r>
+          </a:p>
+          <a:p>
+            <a:pPr marL="457200" indent="-457200" algn="l">
+              <a:buFont typeface="Arial" panose="020B0604020202020204" pitchFamily="34" charset="0"/>
+              <a:buChar char="•"/>
+            </a:pPr>
+            <a:r>
+              <a:rPr lang="pt-BR" b="1" dirty="0" err="1"/>
+              <a:t>isClient</a:t>
+            </a:r>
+            <a:r>
+              <a:rPr lang="pt-BR" dirty="0"/>
+              <a:t>: verdadeiro se está no cliente e foi criado pelo servidor;</a:t>
+            </a:r>
+          </a:p>
+          <a:p>
+            <a:pPr marL="457200" indent="-457200" algn="l">
+              <a:buFont typeface="Arial" panose="020B0604020202020204" pitchFamily="34" charset="0"/>
+              <a:buChar char="•"/>
+            </a:pPr>
+            <a:r>
+              <a:rPr lang="pt-BR" b="1" dirty="0" err="1"/>
+              <a:t>isLocalPlayer</a:t>
+            </a:r>
+            <a:r>
+              <a:rPr lang="pt-BR" dirty="0"/>
+              <a:t>: verdadeiro se é um player para este cliente;</a:t>
+            </a:r>
+          </a:p>
+          <a:p>
+            <a:pPr marL="457200" indent="-457200" algn="l">
+              <a:buFont typeface="Arial" panose="020B0604020202020204" pitchFamily="34" charset="0"/>
+              <a:buChar char="•"/>
+            </a:pPr>
+            <a:r>
+              <a:rPr lang="pt-BR" b="1" dirty="0" err="1"/>
+              <a:t>hasAuthority</a:t>
+            </a:r>
+            <a:r>
+              <a:rPr lang="pt-BR" dirty="0"/>
+              <a:t>: verdadeiro se é propriedade de um processo local.</a:t>
+            </a:r>
+          </a:p>
+        </p:txBody>
+      </p:sp>
+    </p:spTree>
+    <p:extLst>
+      <p:ext uri="{BB962C8B-B14F-4D97-AF65-F5344CB8AC3E}">
+        <p14:creationId xmlns:p14="http://schemas.microsoft.com/office/powerpoint/2010/main" val="671996002"/>
+      </p:ext>
+    </p:extLst>
+  </p:cSld>
+  <p:clrMapOvr>
+    <a:masterClrMapping/>
+  </p:clrMapOvr>
+</p:sld>
+</file>
+
+<file path=ppt/slides/slide15.xml><?xml version="1.0" encoding="utf-8"?>
+<p:sld xmlns:a="http://schemas.openxmlformats.org/drawingml/2006/main" xmlns:r="http://schemas.openxmlformats.org/officeDocument/2006/relationships" xmlns:p="http://schemas.openxmlformats.org/presentationml/2006/main">
+  <p:cSld>
+    <p:spTree>
+      <p:nvGrpSpPr>
+        <p:cNvPr id="1" name=""/>
+        <p:cNvGrpSpPr/>
+        <p:nvPr/>
+      </p:nvGrpSpPr>
+      <p:grpSpPr>
+        <a:xfrm>
+          <a:off x="0" y="0"/>
+          <a:ext cx="0" cy="0"/>
+          <a:chOff x="0" y="0"/>
+          <a:chExt cx="0" cy="0"/>
+        </a:xfrm>
+      </p:grpSpPr>
+      <p:sp>
+        <p:nvSpPr>
+          <p:cNvPr id="5" name="Título 4"/>
+          <p:cNvSpPr>
+            <a:spLocks noGrp="1"/>
+          </p:cNvSpPr>
+          <p:nvPr>
+            <p:ph type="title"/>
+          </p:nvPr>
+        </p:nvSpPr>
+        <p:spPr/>
+        <p:txBody>
+          <a:bodyPr/>
+          <a:lstStyle/>
+          <a:p>
+            <a:r>
+              <a:rPr lang="pt-BR" dirty="0"/>
+              <a:t>Network </a:t>
+            </a:r>
+            <a:r>
+              <a:rPr lang="pt-BR" dirty="0" err="1"/>
+              <a:t>Transform</a:t>
+            </a:r>
+            <a:endParaRPr lang="pt-BR" dirty="0"/>
+          </a:p>
+        </p:txBody>
+      </p:sp>
+      <p:sp>
+        <p:nvSpPr>
+          <p:cNvPr id="6" name="Espaço Reservado para Conteúdo 5"/>
+          <p:cNvSpPr>
+            <a:spLocks noGrp="1"/>
+          </p:cNvSpPr>
+          <p:nvPr>
+            <p:ph idx="1"/>
+          </p:nvPr>
+        </p:nvSpPr>
+        <p:spPr/>
+        <p:txBody>
+          <a:bodyPr>
+            <a:normAutofit/>
+          </a:bodyPr>
+          <a:lstStyle/>
+          <a:p>
+            <a:r>
+              <a:rPr lang="pt-BR" dirty="0"/>
+              <a:t>O componente Network </a:t>
+            </a:r>
+            <a:r>
+              <a:rPr lang="pt-BR" dirty="0" err="1"/>
+              <a:t>Transform</a:t>
+            </a:r>
+            <a:r>
+              <a:rPr lang="pt-BR" dirty="0"/>
+              <a:t> sincroniza o movimento e rotação de </a:t>
+            </a:r>
+            <a:r>
+              <a:rPr lang="pt-BR" dirty="0" err="1"/>
+              <a:t>GameObjects</a:t>
+            </a:r>
+            <a:r>
+              <a:rPr lang="pt-BR" dirty="0"/>
+              <a:t> pela rede.</a:t>
+            </a:r>
+          </a:p>
+          <a:p>
+            <a:r>
+              <a:rPr lang="pt-BR" dirty="0"/>
+              <a:t>Note que ele sincroniza apenas </a:t>
+            </a:r>
+            <a:r>
+              <a:rPr lang="pt-BR" dirty="0" err="1"/>
+              <a:t>GameObjects</a:t>
+            </a:r>
+            <a:r>
+              <a:rPr lang="pt-BR" dirty="0"/>
+              <a:t> instanciados em rede.</a:t>
+            </a:r>
+          </a:p>
+        </p:txBody>
+      </p:sp>
+    </p:spTree>
+    <p:extLst>
+      <p:ext uri="{BB962C8B-B14F-4D97-AF65-F5344CB8AC3E}">
+        <p14:creationId xmlns:p14="http://schemas.microsoft.com/office/powerpoint/2010/main" val="1334119966"/>
+      </p:ext>
+    </p:extLst>
+  </p:cSld>
+  <p:clrMapOvr>
+    <a:masterClrMapping/>
+  </p:clrMapOvr>
+</p:sld>
+</file>
+
+<file path=ppt/slides/slide16.xml><?xml version="1.0" encoding="utf-8"?>
+<p:sld xmlns:a="http://schemas.openxmlformats.org/drawingml/2006/main" xmlns:r="http://schemas.openxmlformats.org/officeDocument/2006/relationships" xmlns:p="http://schemas.openxmlformats.org/presentationml/2006/main">
+  <p:cSld>
+    <p:spTree>
+      <p:nvGrpSpPr>
+        <p:cNvPr id="1" name=""/>
+        <p:cNvGrpSpPr/>
+        <p:nvPr/>
+      </p:nvGrpSpPr>
+      <p:grpSpPr>
+        <a:xfrm>
+          <a:off x="0" y="0"/>
+          <a:ext cx="0" cy="0"/>
+          <a:chOff x="0" y="0"/>
+          <a:chExt cx="0" cy="0"/>
+        </a:xfrm>
+      </p:grpSpPr>
+      <p:sp>
+        <p:nvSpPr>
+          <p:cNvPr id="5" name="Título 4"/>
+          <p:cNvSpPr>
+            <a:spLocks noGrp="1"/>
+          </p:cNvSpPr>
+          <p:nvPr>
+            <p:ph type="title"/>
+          </p:nvPr>
+        </p:nvSpPr>
+        <p:spPr/>
+        <p:txBody>
+          <a:bodyPr/>
+          <a:lstStyle/>
+          <a:p>
+            <a:r>
+              <a:rPr lang="pt-BR" dirty="0"/>
+              <a:t>Método </a:t>
+            </a:r>
+            <a:r>
+              <a:rPr lang="pt-BR" dirty="0" err="1"/>
+              <a:t>OnStartLocalPlayer</a:t>
+            </a:r>
+            <a:endParaRPr lang="pt-BR" dirty="0"/>
+          </a:p>
+        </p:txBody>
+      </p:sp>
+      <p:sp>
+        <p:nvSpPr>
+          <p:cNvPr id="6" name="Espaço Reservado para Conteúdo 5"/>
+          <p:cNvSpPr>
+            <a:spLocks noGrp="1"/>
+          </p:cNvSpPr>
+          <p:nvPr>
+            <p:ph idx="1"/>
+          </p:nvPr>
+        </p:nvSpPr>
+        <p:spPr/>
+        <p:txBody>
+          <a:bodyPr>
+            <a:normAutofit/>
+          </a:bodyPr>
+          <a:lstStyle/>
+          <a:p>
+            <a:r>
+              <a:rPr lang="pt-BR" dirty="0"/>
+              <a:t>É chamado quando o objeto player local é configurado.</a:t>
+            </a:r>
+          </a:p>
+          <a:p>
+            <a:r>
+              <a:rPr lang="pt-BR" dirty="0"/>
+              <a:t>Ele é chamado depois do método </a:t>
+            </a:r>
+            <a:r>
+              <a:rPr lang="pt-BR" dirty="0" err="1"/>
+              <a:t>OnStartClient</a:t>
+            </a:r>
+            <a:r>
+              <a:rPr lang="pt-BR" dirty="0"/>
+              <a:t>, disparado pelo servidor.</a:t>
+            </a:r>
+          </a:p>
+          <a:p>
+            <a:r>
+              <a:rPr lang="pt-BR" dirty="0"/>
+              <a:t>Este é o local apropriado para ativar componentes ou funcionalidades que devem ser ativadas apenas para o player local, tais como câmeras e entradas de dados. </a:t>
+            </a:r>
+          </a:p>
+        </p:txBody>
+      </p:sp>
+    </p:spTree>
+    <p:extLst>
+      <p:ext uri="{BB962C8B-B14F-4D97-AF65-F5344CB8AC3E}">
+        <p14:creationId xmlns:p14="http://schemas.microsoft.com/office/powerpoint/2010/main" val="3912292623"/>
+      </p:ext>
+    </p:extLst>
+  </p:cSld>
+  <p:clrMapOvr>
+    <a:masterClrMapping/>
+  </p:clrMapOvr>
+</p:sld>
+</file>
+
+<file path=ppt/slides/slide17.xml><?xml version="1.0" encoding="utf-8"?>
+<p:sld xmlns:a="http://schemas.openxmlformats.org/drawingml/2006/main" xmlns:r="http://schemas.openxmlformats.org/officeDocument/2006/relationships" xmlns:p="http://schemas.openxmlformats.org/presentationml/2006/main">
+  <p:cSld>
+    <p:spTree>
+      <p:nvGrpSpPr>
+        <p:cNvPr id="1" name=""/>
+        <p:cNvGrpSpPr/>
+        <p:nvPr/>
+      </p:nvGrpSpPr>
+      <p:grpSpPr>
+        <a:xfrm>
+          <a:off x="0" y="0"/>
+          <a:ext cx="0" cy="0"/>
+          <a:chOff x="0" y="0"/>
+          <a:chExt cx="0" cy="0"/>
+        </a:xfrm>
+      </p:grpSpPr>
+      <p:sp>
+        <p:nvSpPr>
+          <p:cNvPr id="5" name="Título 4"/>
+          <p:cNvSpPr>
+            <a:spLocks noGrp="1"/>
+          </p:cNvSpPr>
+          <p:nvPr>
+            <p:ph type="title"/>
+          </p:nvPr>
+        </p:nvSpPr>
+        <p:spPr/>
+        <p:txBody>
+          <a:bodyPr/>
+          <a:lstStyle/>
+          <a:p>
+            <a:r>
+              <a:rPr lang="pt-BR" dirty="0"/>
+              <a:t>Atributo </a:t>
+            </a:r>
+            <a:r>
+              <a:rPr lang="pt-BR" dirty="0" err="1"/>
+              <a:t>Command</a:t>
+            </a:r>
+            <a:endParaRPr lang="pt-BR" dirty="0"/>
+          </a:p>
+        </p:txBody>
+      </p:sp>
+      <p:sp>
+        <p:nvSpPr>
+          <p:cNvPr id="6" name="Espaço Reservado para Conteúdo 5"/>
+          <p:cNvSpPr>
+            <a:spLocks noGrp="1"/>
+          </p:cNvSpPr>
+          <p:nvPr>
+            <p:ph idx="1"/>
+          </p:nvPr>
+        </p:nvSpPr>
+        <p:spPr/>
+        <p:txBody>
+          <a:bodyPr>
+            <a:normAutofit lnSpcReduction="10000"/>
+          </a:bodyPr>
+          <a:lstStyle/>
+          <a:p>
+            <a:r>
+              <a:rPr lang="pt-BR" dirty="0"/>
+              <a:t>Este atributo pode ser colocado em métodos da classe </a:t>
+            </a:r>
+            <a:r>
+              <a:rPr lang="pt-BR" b="1" dirty="0" err="1"/>
+              <a:t>NetworkBehaviour</a:t>
+            </a:r>
+            <a:r>
+              <a:rPr lang="pt-BR" dirty="0"/>
+              <a:t> para permitir que sejam invocados no servidor por meio de uma mensagem enviada por um cliente.</a:t>
+            </a:r>
+          </a:p>
+          <a:p>
+            <a:r>
+              <a:rPr lang="pt-BR" dirty="0"/>
+              <a:t>Métodos </a:t>
+            </a:r>
+            <a:r>
+              <a:rPr lang="pt-BR" b="1" dirty="0"/>
+              <a:t>[</a:t>
+            </a:r>
+            <a:r>
+              <a:rPr lang="pt-BR" b="1" dirty="0" err="1"/>
+              <a:t>Command</a:t>
+            </a:r>
+            <a:r>
+              <a:rPr lang="pt-BR" b="1" dirty="0"/>
+              <a:t>]</a:t>
+            </a:r>
+            <a:r>
+              <a:rPr lang="pt-BR" dirty="0"/>
+              <a:t> são invocadas no objeto player associado a conexão. Os argumentos do comando chamado são serializados na rede e o método no servidor é invocado com os mesmos valores. </a:t>
+            </a:r>
+          </a:p>
+          <a:p>
+            <a:r>
+              <a:rPr lang="pt-BR" dirty="0"/>
+              <a:t>O nome destes métodos devem iniciar com o prefixo “</a:t>
+            </a:r>
+            <a:r>
+              <a:rPr lang="pt-BR" b="1" dirty="0" err="1"/>
+              <a:t>Cmd</a:t>
+            </a:r>
+            <a:r>
+              <a:rPr lang="pt-BR" dirty="0"/>
+              <a:t>”. </a:t>
+            </a:r>
+          </a:p>
+        </p:txBody>
+      </p:sp>
+    </p:spTree>
+    <p:extLst>
+      <p:ext uri="{BB962C8B-B14F-4D97-AF65-F5344CB8AC3E}">
+        <p14:creationId xmlns:p14="http://schemas.microsoft.com/office/powerpoint/2010/main" val="2849734184"/>
+      </p:ext>
+    </p:extLst>
+  </p:cSld>
+  <p:clrMapOvr>
+    <a:masterClrMapping/>
+  </p:clrMapOvr>
+</p:sld>
+</file>
+
+<file path=ppt/slides/slide18.xml><?xml version="1.0" encoding="utf-8"?>
+<p:sld xmlns:a="http://schemas.openxmlformats.org/drawingml/2006/main" xmlns:r="http://schemas.openxmlformats.org/officeDocument/2006/relationships" xmlns:p="http://schemas.openxmlformats.org/presentationml/2006/main">
+  <p:cSld>
+    <p:spTree>
+      <p:nvGrpSpPr>
+        <p:cNvPr id="1" name=""/>
+        <p:cNvGrpSpPr/>
+        <p:nvPr/>
+      </p:nvGrpSpPr>
+      <p:grpSpPr>
+        <a:xfrm>
+          <a:off x="0" y="0"/>
+          <a:ext cx="0" cy="0"/>
+          <a:chOff x="0" y="0"/>
+          <a:chExt cx="0" cy="0"/>
+        </a:xfrm>
+      </p:grpSpPr>
+      <p:sp>
+        <p:nvSpPr>
+          <p:cNvPr id="5" name="Título 4"/>
+          <p:cNvSpPr>
+            <a:spLocks noGrp="1"/>
+          </p:cNvSpPr>
+          <p:nvPr>
+            <p:ph type="title"/>
+          </p:nvPr>
+        </p:nvSpPr>
+        <p:spPr/>
+        <p:txBody>
+          <a:bodyPr/>
+          <a:lstStyle/>
+          <a:p>
+            <a:r>
+              <a:rPr lang="pt-BR" dirty="0"/>
+              <a:t>Notas</a:t>
+            </a:r>
+          </a:p>
+        </p:txBody>
+      </p:sp>
+      <p:sp>
+        <p:nvSpPr>
+          <p:cNvPr id="6" name="Espaço Reservado para Conteúdo 5"/>
+          <p:cNvSpPr>
+            <a:spLocks noGrp="1"/>
+          </p:cNvSpPr>
+          <p:nvPr>
+            <p:ph idx="1"/>
+          </p:nvPr>
+        </p:nvSpPr>
+        <p:spPr/>
+        <p:txBody>
+          <a:bodyPr>
+            <a:normAutofit/>
+          </a:bodyPr>
+          <a:lstStyle/>
+          <a:p>
+            <a:r>
+              <a:rPr lang="pt-BR" dirty="0"/>
+              <a:t>Deve haver apenas uma Network Manager ativo por cena.</a:t>
+            </a:r>
+            <a:r>
+              <a:rPr lang="en-US" dirty="0"/>
+              <a:t> </a:t>
+            </a:r>
+          </a:p>
+          <a:p>
+            <a:r>
+              <a:rPr lang="en-US" dirty="0"/>
+              <a:t>Do not place the Network Manager component on a networked </a:t>
+            </a:r>
+            <a:r>
+              <a:rPr lang="en-US" dirty="0" err="1"/>
+              <a:t>GameObject</a:t>
+            </a:r>
+            <a:r>
+              <a:rPr lang="en-US" dirty="0"/>
+              <a:t> (one which has a </a:t>
+            </a:r>
+            <a:r>
+              <a:rPr lang="en-US" u="sng" dirty="0">
+                <a:hlinkClick r:id="rId2"/>
+              </a:rPr>
+              <a:t>Network Identity</a:t>
+            </a:r>
+            <a:r>
+              <a:rPr lang="en-US" dirty="0"/>
+              <a:t> component), because Unity disables these when the Scene loads.</a:t>
+            </a:r>
+            <a:endParaRPr lang="pt-BR" dirty="0"/>
+          </a:p>
+        </p:txBody>
+      </p:sp>
+    </p:spTree>
+    <p:extLst>
+      <p:ext uri="{BB962C8B-B14F-4D97-AF65-F5344CB8AC3E}">
+        <p14:creationId xmlns:p14="http://schemas.microsoft.com/office/powerpoint/2010/main" val="128422404"/>
+      </p:ext>
+    </p:extLst>
+  </p:cSld>
+  <p:clrMapOvr>
+    <a:masterClrMapping/>
+  </p:clrMapOvr>
+</p:sld>
+</file>
+
+<file path=ppt/slides/slide19.xml><?xml version="1.0" encoding="utf-8"?>
+<p:sld xmlns:a="http://schemas.openxmlformats.org/drawingml/2006/main" xmlns:r="http://schemas.openxmlformats.org/officeDocument/2006/relationships" xmlns:p="http://schemas.openxmlformats.org/presentationml/2006/main">
+  <p:cSld>
+    <p:spTree>
+      <p:nvGrpSpPr>
+        <p:cNvPr id="1" name=""/>
+        <p:cNvGrpSpPr/>
+        <p:nvPr/>
+      </p:nvGrpSpPr>
+      <p:grpSpPr>
+        <a:xfrm>
+          <a:off x="0" y="0"/>
+          <a:ext cx="0" cy="0"/>
+          <a:chOff x="0" y="0"/>
+          <a:chExt cx="0" cy="0"/>
+        </a:xfrm>
+      </p:grpSpPr>
+      <p:sp>
+        <p:nvSpPr>
+          <p:cNvPr id="5" name="Título 4"/>
+          <p:cNvSpPr>
+            <a:spLocks noGrp="1"/>
+          </p:cNvSpPr>
+          <p:nvPr>
+            <p:ph type="title"/>
+          </p:nvPr>
+        </p:nvSpPr>
+        <p:spPr/>
+        <p:txBody>
           <a:bodyPr>
             <a:normAutofit/>
           </a:bodyPr>
@@ -4023,7 +4827,7 @@
         </p:spPr>
         <p:txBody>
           <a:bodyPr>
-            <a:normAutofit fontScale="92500" lnSpcReduction="20000"/>
+            <a:normAutofit fontScale="70000" lnSpcReduction="20000"/>
           </a:bodyPr>
           <a:lstStyle/>
           <a:p>
@@ -4266,6 +5070,104 @@
               </a:rPr>
               <a:t>https://docs.unity3d.com/Manual/UNetManager.html</a:t>
             </a:r>
+            <a:r>
+              <a:rPr lang="en-US" dirty="0"/>
+              <a:t>.</a:t>
+            </a:r>
+          </a:p>
+          <a:p>
+            <a:pPr marL="514350" indent="-514350" algn="l">
+              <a:buFont typeface="+mj-lt"/>
+              <a:buAutoNum type="arabicPeriod"/>
+            </a:pPr>
+            <a:r>
+              <a:rPr lang="en-US" dirty="0"/>
+              <a:t>Unity. </a:t>
+            </a:r>
+            <a:r>
+              <a:rPr lang="en-US" b="1" dirty="0"/>
+              <a:t>Network Authority</a:t>
+            </a:r>
+            <a:r>
+              <a:rPr lang="en-US" dirty="0"/>
+              <a:t>. Documentation. </a:t>
+            </a:r>
+            <a:r>
+              <a:rPr lang="en-US" dirty="0" err="1"/>
+              <a:t>Disponível</a:t>
+            </a:r>
+            <a:r>
+              <a:rPr lang="en-US" dirty="0"/>
+              <a:t> </a:t>
+            </a:r>
+            <a:r>
+              <a:rPr lang="en-US" dirty="0" err="1"/>
+              <a:t>em</a:t>
+            </a:r>
+            <a:r>
+              <a:rPr lang="en-US" dirty="0"/>
+              <a:t>: </a:t>
+            </a:r>
+            <a:r>
+              <a:rPr lang="en-US" dirty="0">
+                <a:hlinkClick r:id="rId6"/>
+              </a:rPr>
+              <a:t>https://docs.unity3d.com/Manual/UNetAuthority.html</a:t>
+            </a:r>
+            <a:r>
+              <a:rPr lang="en-US" dirty="0"/>
+              <a:t>.</a:t>
+            </a:r>
+          </a:p>
+          <a:p>
+            <a:pPr marL="514350" indent="-514350" algn="l">
+              <a:buFont typeface="+mj-lt"/>
+              <a:buAutoNum type="arabicPeriod"/>
+            </a:pPr>
+            <a:r>
+              <a:rPr lang="en-US" dirty="0"/>
+              <a:t>Unity. </a:t>
+            </a:r>
+            <a:r>
+              <a:rPr lang="en-US" b="1" dirty="0"/>
+              <a:t>Network Transform</a:t>
+            </a:r>
+            <a:r>
+              <a:rPr lang="en-US" dirty="0"/>
+              <a:t>. Documentation. </a:t>
+            </a:r>
+            <a:r>
+              <a:rPr lang="en-US" dirty="0" err="1"/>
+              <a:t>Disponível</a:t>
+            </a:r>
+            <a:r>
+              <a:rPr lang="en-US" dirty="0"/>
+              <a:t> </a:t>
+            </a:r>
+            <a:r>
+              <a:rPr lang="en-US" dirty="0" err="1"/>
+              <a:t>em</a:t>
+            </a:r>
+            <a:r>
+              <a:rPr lang="en-US" dirty="0"/>
+              <a:t>: </a:t>
+            </a:r>
+            <a:r>
+              <a:rPr lang="en-US" dirty="0">
+                <a:hlinkClick r:id="rId7"/>
+              </a:rPr>
+              <a:t>https://docs.unity3d.com/Manual/class-NetworkTransform.html</a:t>
+            </a:r>
+            <a:r>
+              <a:rPr lang="en-US" dirty="0"/>
+              <a:t>.</a:t>
+            </a:r>
+          </a:p>
+          <a:p>
+            <a:pPr marL="514350" indent="-514350" algn="l">
+              <a:buFont typeface="+mj-lt"/>
+              <a:buAutoNum type="arabicPeriod"/>
+            </a:pPr>
             <a:endParaRPr lang="en-US" dirty="0"/>
           </a:p>
           <a:p>
@@ -4366,15 +5268,23 @@
           <a:p>
             <a:r>
               <a:rPr lang="pt-BR" dirty="0"/>
-              <a:t>Conjunto de ferramentas e serviços </a:t>
+              <a:t>Conjunto de ferramentas e serviços multiplayer para desenvolvedores </a:t>
             </a:r>
             <a:r>
               <a:rPr lang="pt-BR" dirty="0" err="1"/>
-              <a:t>multiplayer</a:t>
-            </a:r>
-            <a:r>
-              <a:rPr lang="pt-BR" dirty="0"/>
-              <a:t> para desenvolvedores </a:t>
+              <a:t>Unity</a:t>
+            </a:r>
+            <a:r>
+              <a:rPr lang="pt-BR" dirty="0"/>
+              <a:t> que atualmente usa o sistema HLAPI (High </a:t>
+            </a:r>
+            <a:r>
+              <a:rPr lang="pt-BR" dirty="0" err="1"/>
+              <a:t>Level</a:t>
+            </a:r>
+            <a:r>
+              <a:rPr lang="pt-BR" dirty="0"/>
+              <a:t> API), um sistema para construir recursos multiplayer jogos no </a:t>
             </a:r>
             <a:r>
               <a:rPr lang="pt-BR" dirty="0" err="1"/>

</xml_diff>

<commit_message>
adição de slides sobre SyncVars
</commit_message>
<xml_diff>
--- a/unity-multiplayer.pptx
+++ b/unity-multiplayer.pptx
@@ -5,7 +5,7 @@
     <p:sldMasterId id="2147483648" r:id="rId1"/>
   </p:sldMasterIdLst>
   <p:notesMasterIdLst>
-    <p:notesMasterId r:id="rId21"/>
+    <p:notesMasterId r:id="rId24"/>
   </p:notesMasterIdLst>
   <p:sldIdLst>
     <p:sldId id="256" r:id="rId2"/>
@@ -25,8 +25,11 @@
     <p:sldId id="366" r:id="rId16"/>
     <p:sldId id="367" r:id="rId17"/>
     <p:sldId id="368" r:id="rId18"/>
-    <p:sldId id="357" r:id="rId19"/>
-    <p:sldId id="352" r:id="rId20"/>
+    <p:sldId id="369" r:id="rId19"/>
+    <p:sldId id="370" r:id="rId20"/>
+    <p:sldId id="371" r:id="rId21"/>
+    <p:sldId id="357" r:id="rId22"/>
+    <p:sldId id="352" r:id="rId23"/>
   </p:sldIdLst>
   <p:sldSz cx="12192000" cy="6858000"/>
   <p:notesSz cx="6858000" cy="9144000"/>
@@ -373,7 +376,7 @@
           <a:p>
             <a:fld id="{020F486D-935E-4125-8FD7-C735663CC7DE}" type="slidenum">
               <a:rPr lang="pt-BR" smtClean="0"/>
-              <a:t>‹#›</a:t>
+              <a:t>‹nº›</a:t>
             </a:fld>
             <a:endParaRPr lang="pt-BR"/>
           </a:p>
@@ -767,7 +770,7 @@
           <a:p>
             <a:fld id="{29185252-FBA3-417A-8652-C405B89605D8}" type="slidenum">
               <a:rPr lang="pt-BR" smtClean="0"/>
-              <a:t>‹#›</a:t>
+              <a:t>‹nº›</a:t>
             </a:fld>
             <a:endParaRPr lang="pt-BR"/>
           </a:p>
@@ -935,7 +938,7 @@
           <a:p>
             <a:fld id="{29185252-FBA3-417A-8652-C405B89605D8}" type="slidenum">
               <a:rPr lang="pt-BR" smtClean="0"/>
-              <a:t>‹#›</a:t>
+              <a:t>‹nº›</a:t>
             </a:fld>
             <a:endParaRPr lang="pt-BR"/>
           </a:p>
@@ -1113,7 +1116,7 @@
           <a:p>
             <a:fld id="{29185252-FBA3-417A-8652-C405B89605D8}" type="slidenum">
               <a:rPr lang="pt-BR" smtClean="0"/>
-              <a:t>‹#›</a:t>
+              <a:t>‹nº›</a:t>
             </a:fld>
             <a:endParaRPr lang="pt-BR"/>
           </a:p>
@@ -1450,7 +1453,7 @@
           <a:p>
             <a:fld id="{29185252-FBA3-417A-8652-C405B89605D8}" type="slidenum">
               <a:rPr lang="pt-BR" smtClean="0"/>
-              <a:t>‹#›</a:t>
+              <a:t>‹nº›</a:t>
             </a:fld>
             <a:endParaRPr lang="pt-BR"/>
           </a:p>
@@ -1721,7 +1724,7 @@
           <a:p>
             <a:fld id="{29185252-FBA3-417A-8652-C405B89605D8}" type="slidenum">
               <a:rPr lang="pt-BR" smtClean="0"/>
-              <a:t>‹#›</a:t>
+              <a:t>‹nº›</a:t>
             </a:fld>
             <a:endParaRPr lang="pt-BR"/>
           </a:p>
@@ -1967,7 +1970,7 @@
           <a:p>
             <a:fld id="{29185252-FBA3-417A-8652-C405B89605D8}" type="slidenum">
               <a:rPr lang="pt-BR" smtClean="0"/>
-              <a:t>‹#›</a:t>
+              <a:t>‹nº›</a:t>
             </a:fld>
             <a:endParaRPr lang="pt-BR"/>
           </a:p>
@@ -2331,7 +2334,7 @@
           <a:p>
             <a:fld id="{29185252-FBA3-417A-8652-C405B89605D8}" type="slidenum">
               <a:rPr lang="pt-BR" smtClean="0"/>
-              <a:t>‹#›</a:t>
+              <a:t>‹nº›</a:t>
             </a:fld>
             <a:endParaRPr lang="pt-BR"/>
           </a:p>
@@ -2465,7 +2468,7 @@
           <a:p>
             <a:fld id="{29185252-FBA3-417A-8652-C405B89605D8}" type="slidenum">
               <a:rPr lang="pt-BR" smtClean="0"/>
-              <a:t>‹#›</a:t>
+              <a:t>‹nº›</a:t>
             </a:fld>
             <a:endParaRPr lang="pt-BR"/>
           </a:p>
@@ -2560,7 +2563,7 @@
           <a:p>
             <a:fld id="{29185252-FBA3-417A-8652-C405B89605D8}" type="slidenum">
               <a:rPr lang="pt-BR" smtClean="0"/>
-              <a:t>‹#›</a:t>
+              <a:t>‹nº›</a:t>
             </a:fld>
             <a:endParaRPr lang="pt-BR"/>
           </a:p>
@@ -2835,7 +2838,7 @@
           <a:p>
             <a:fld id="{29185252-FBA3-417A-8652-C405B89605D8}" type="slidenum">
               <a:rPr lang="pt-BR" smtClean="0"/>
-              <a:t>‹#›</a:t>
+              <a:t>‹nº›</a:t>
             </a:fld>
             <a:endParaRPr lang="pt-BR"/>
           </a:p>
@@ -3087,7 +3090,7 @@
           <a:p>
             <a:fld id="{29185252-FBA3-417A-8652-C405B89605D8}" type="slidenum">
               <a:rPr lang="pt-BR" smtClean="0"/>
-              <a:t>‹#›</a:t>
+              <a:t>‹nº›</a:t>
             </a:fld>
             <a:endParaRPr lang="pt-BR"/>
           </a:p>
@@ -3343,7 +3346,7 @@
           <a:p>
             <a:fld id="{29185252-FBA3-417A-8652-C405B89605D8}" type="slidenum">
               <a:rPr lang="pt-BR" smtClean="0"/>
-              <a:t>‹#›</a:t>
+              <a:t>‹nº›</a:t>
             </a:fld>
             <a:endParaRPr lang="pt-BR"/>
           </a:p>
@@ -4682,7 +4685,7 @@
       </p:grpSpPr>
       <p:sp>
         <p:nvSpPr>
-          <p:cNvPr id="5" name="Título 4"/>
+          <p:cNvPr id="2" name="Título 1"/>
           <p:cNvSpPr>
             <a:spLocks noGrp="1"/>
           </p:cNvSpPr>
@@ -4696,15 +4699,16 @@
           <a:lstStyle/>
           <a:p>
             <a:r>
-              <a:rPr lang="pt-BR" dirty="0"/>
-              <a:t>Notas</a:t>
-            </a:r>
-          </a:p>
-        </p:txBody>
-      </p:sp>
-      <p:sp>
-        <p:nvSpPr>
-          <p:cNvPr id="6" name="Espaço Reservado para Conteúdo 5"/>
+              <a:rPr lang="pt-BR" dirty="0" smtClean="0"/>
+              <a:t>Sincronização de Estado</a:t>
+            </a:r>
+            <a:endParaRPr lang="pt-BR" dirty="0"/>
+          </a:p>
+        </p:txBody>
+      </p:sp>
+      <p:sp>
+        <p:nvSpPr>
+          <p:cNvPr id="3" name="Espaço Reservado para Conteúdo 2"/>
           <p:cNvSpPr>
             <a:spLocks noGrp="1"/>
           </p:cNvSpPr>
@@ -4715,41 +4719,49 @@
         <p:spPr/>
         <p:txBody>
           <a:bodyPr>
-            <a:normAutofit/>
+            <a:normAutofit lnSpcReduction="10000"/>
           </a:bodyPr>
           <a:lstStyle/>
           <a:p>
             <a:r>
-              <a:rPr lang="pt-BR" dirty="0"/>
-              <a:t>Deve haver apenas uma Network Manager ativo por cena.</a:t>
-            </a:r>
-            <a:r>
-              <a:rPr lang="en-US" dirty="0"/>
-              <a:t> </a:t>
-            </a:r>
-          </a:p>
-          <a:p>
-            <a:r>
-              <a:rPr lang="en-US" dirty="0"/>
-              <a:t>Do not place the Network Manager component on a networked </a:t>
-            </a:r>
-            <a:r>
-              <a:rPr lang="en-US" dirty="0" err="1"/>
-              <a:t>GameObject</a:t>
-            </a:r>
-            <a:r>
-              <a:rPr lang="en-US" dirty="0"/>
-              <a:t> (one which has a </a:t>
-            </a:r>
-            <a:r>
-              <a:rPr lang="en-US" u="sng" dirty="0">
-                <a:hlinkClick r:id="rId2"/>
-              </a:rPr>
-              <a:t>Network Identity</a:t>
-            </a:r>
-            <a:r>
-              <a:rPr lang="en-US" dirty="0"/>
-              <a:t> component), because Unity disables these when the Scene loads.</a:t>
+              <a:rPr lang="pt-BR" dirty="0" smtClean="0"/>
+              <a:t>Refere-se a sincronização de valores tais como inteiros, decimais, texto e booleanos em scripts dos </a:t>
+            </a:r>
+            <a:r>
+              <a:rPr lang="pt-BR" dirty="0" err="1" smtClean="0"/>
+              <a:t>GameObjects</a:t>
+            </a:r>
+            <a:r>
+              <a:rPr lang="pt-BR" dirty="0" smtClean="0"/>
+              <a:t> em rede.</a:t>
+            </a:r>
+          </a:p>
+          <a:p>
+            <a:r>
+              <a:rPr lang="pt-BR" dirty="0" smtClean="0"/>
+              <a:t>A sincronização de estado é feita </a:t>
+            </a:r>
+            <a:r>
+              <a:rPr lang="pt-BR" b="1" dirty="0" smtClean="0"/>
+              <a:t>do servidor para os clientes remotos</a:t>
+            </a:r>
+            <a:r>
+              <a:rPr lang="pt-BR" dirty="0" smtClean="0"/>
+              <a:t>.</a:t>
+            </a:r>
+          </a:p>
+          <a:p>
+            <a:r>
+              <a:rPr lang="pt-BR" dirty="0" smtClean="0"/>
+              <a:t>Os dados não são sincronizados na direção oposta – dos clientes remotos para o servidor. Para isso é necessário usar </a:t>
+            </a:r>
+            <a:r>
+              <a:rPr lang="pt-BR" b="1" dirty="0" err="1" smtClean="0"/>
+              <a:t>Commands</a:t>
+            </a:r>
+            <a:r>
+              <a:rPr lang="pt-BR" dirty="0" smtClean="0"/>
+              <a:t>.</a:t>
             </a:r>
             <a:endParaRPr lang="pt-BR" dirty="0"/>
           </a:p>
@@ -4758,7 +4770,7 @@
     </p:spTree>
     <p:extLst>
       <p:ext uri="{BB962C8B-B14F-4D97-AF65-F5344CB8AC3E}">
-        <p14:creationId xmlns:p14="http://schemas.microsoft.com/office/powerpoint/2010/main" val="128422404"/>
+        <p14:creationId xmlns:p14="http://schemas.microsoft.com/office/powerpoint/2010/main" val="1974983137"/>
       </p:ext>
     </p:extLst>
   </p:cSld>
@@ -4787,12 +4799,39 @@
       </p:grpSpPr>
       <p:sp>
         <p:nvSpPr>
-          <p:cNvPr id="5" name="Título 4"/>
+          <p:cNvPr id="2" name="Título 1"/>
           <p:cNvSpPr>
             <a:spLocks noGrp="1"/>
           </p:cNvSpPr>
           <p:nvPr>
             <p:ph type="title"/>
+          </p:nvPr>
+        </p:nvSpPr>
+        <p:spPr/>
+        <p:txBody>
+          <a:bodyPr/>
+          <a:lstStyle/>
+          <a:p>
+            <a:r>
+              <a:rPr lang="pt-BR" dirty="0" smtClean="0"/>
+              <a:t>Sincronização de Estado - </a:t>
+            </a:r>
+            <a:r>
+              <a:rPr lang="pt-BR" dirty="0" err="1" smtClean="0"/>
+              <a:t>SyncVars</a:t>
+            </a:r>
+            <a:endParaRPr lang="pt-BR" dirty="0"/>
+          </a:p>
+        </p:txBody>
+      </p:sp>
+      <p:sp>
+        <p:nvSpPr>
+          <p:cNvPr id="3" name="Espaço Reservado para Conteúdo 2"/>
+          <p:cNvSpPr>
+            <a:spLocks noGrp="1"/>
+          </p:cNvSpPr>
+          <p:nvPr>
+            <p:ph idx="1"/>
           </p:nvPr>
         </p:nvSpPr>
         <p:spPr/>
@@ -4803,384 +4842,43 @@
           <a:lstStyle/>
           <a:p>
             <a:r>
-              <a:rPr lang="pt-BR" dirty="0"/>
-              <a:t>Referências</a:t>
-            </a:r>
-          </a:p>
-        </p:txBody>
-      </p:sp>
-      <p:sp>
-        <p:nvSpPr>
-          <p:cNvPr id="6" name="Espaço Reservado para Conteúdo 5"/>
-          <p:cNvSpPr>
-            <a:spLocks noGrp="1"/>
-          </p:cNvSpPr>
-          <p:nvPr>
-            <p:ph idx="1"/>
-          </p:nvPr>
-        </p:nvSpPr>
-        <p:spPr>
-          <a:xfrm>
-            <a:off x="317694" y="1291051"/>
-            <a:ext cx="11705493" cy="5254127"/>
-          </a:xfrm>
-        </p:spPr>
-        <p:txBody>
-          <a:bodyPr>
-            <a:normAutofit fontScale="70000" lnSpcReduction="20000"/>
-          </a:bodyPr>
-          <a:lstStyle/>
-          <a:p>
-            <a:pPr marL="514350" indent="-514350" algn="l">
-              <a:buFont typeface="+mj-lt"/>
-              <a:buAutoNum type="arabicPeriod"/>
-            </a:pPr>
-            <a:r>
-              <a:rPr lang="en-US" dirty="0"/>
-              <a:t>Glover, D. </a:t>
-            </a:r>
-            <a:r>
-              <a:rPr lang="en-US" b="1" dirty="0" err="1"/>
-              <a:t>UNet</a:t>
-            </a:r>
-            <a:r>
-              <a:rPr lang="en-US" b="1" dirty="0"/>
-              <a:t> Deprecation FAQ</a:t>
-            </a:r>
-            <a:r>
-              <a:rPr lang="en-US" dirty="0"/>
-              <a:t>. </a:t>
-            </a:r>
-            <a:r>
-              <a:rPr lang="en-US" dirty="0" err="1"/>
-              <a:t>Disponível</a:t>
-            </a:r>
-            <a:r>
-              <a:rPr lang="en-US" dirty="0"/>
-              <a:t> </a:t>
-            </a:r>
-            <a:r>
-              <a:rPr lang="en-US" dirty="0" err="1"/>
-              <a:t>em</a:t>
-            </a:r>
-            <a:r>
-              <a:rPr lang="en-US" dirty="0"/>
-              <a:t>: </a:t>
-            </a:r>
-            <a:r>
-              <a:rPr lang="en-US" dirty="0">
-                <a:hlinkClick r:id="rId2"/>
-              </a:rPr>
-              <a:t>https://support.unity3d.com/hc/en-us/articles/360001252086-UNet-Deprecation-FAQ</a:t>
-            </a:r>
-            <a:r>
-              <a:rPr lang="en-US" dirty="0"/>
-              <a:t>.</a:t>
-            </a:r>
-          </a:p>
-          <a:p>
-            <a:pPr marL="514350" indent="-514350" algn="l">
-              <a:buFont typeface="+mj-lt"/>
-              <a:buAutoNum type="arabicPeriod"/>
-            </a:pPr>
-            <a:r>
-              <a:rPr lang="en-US" dirty="0"/>
-              <a:t>Unity Blog.</a:t>
-            </a:r>
-            <a:r>
-              <a:rPr lang="en-US" b="1" dirty="0"/>
-              <a:t> Navigating Unity’s multiplayer </a:t>
-            </a:r>
-            <a:r>
-              <a:rPr lang="en-US" b="1" dirty="0" err="1"/>
-              <a:t>Netcode</a:t>
-            </a:r>
-            <a:r>
-              <a:rPr lang="en-US" b="1" dirty="0"/>
-              <a:t> transition</a:t>
-            </a:r>
-            <a:r>
-              <a:rPr lang="en-US" dirty="0"/>
-              <a:t>. </a:t>
-            </a:r>
-            <a:r>
-              <a:rPr lang="en-US" dirty="0" err="1"/>
-              <a:t>Disponível</a:t>
-            </a:r>
-            <a:r>
-              <a:rPr lang="en-US" dirty="0"/>
-              <a:t> </a:t>
-            </a:r>
-            <a:r>
-              <a:rPr lang="en-US" dirty="0" err="1"/>
-              <a:t>em</a:t>
-            </a:r>
-            <a:r>
-              <a:rPr lang="en-US" dirty="0"/>
-              <a:t>: </a:t>
-            </a:r>
-            <a:r>
-              <a:rPr lang="pt-BR" dirty="0">
-                <a:hlinkClick r:id="rId3"/>
-              </a:rPr>
-              <a:t>https://blogs.unity3d.com/2019/06/13/</a:t>
-            </a:r>
-            <a:r>
-              <a:rPr lang="pt-BR" dirty="0" err="1">
-                <a:hlinkClick r:id="rId3"/>
-              </a:rPr>
-              <a:t>navigating</a:t>
-            </a:r>
-            <a:r>
-              <a:rPr lang="pt-BR" dirty="0">
-                <a:hlinkClick r:id="rId3"/>
-              </a:rPr>
-              <a:t>-</a:t>
-            </a:r>
-            <a:r>
-              <a:rPr lang="pt-BR" dirty="0" err="1">
-                <a:hlinkClick r:id="rId3"/>
-              </a:rPr>
-              <a:t>unitys</a:t>
-            </a:r>
-            <a:r>
-              <a:rPr lang="pt-BR" dirty="0">
-                <a:hlinkClick r:id="rId3"/>
-              </a:rPr>
-              <a:t>-multiplayer-</a:t>
-            </a:r>
-            <a:r>
-              <a:rPr lang="pt-BR" dirty="0" err="1">
-                <a:hlinkClick r:id="rId3"/>
-              </a:rPr>
-              <a:t>netcode</a:t>
-            </a:r>
-            <a:r>
-              <a:rPr lang="pt-BR" dirty="0">
-                <a:hlinkClick r:id="rId3"/>
-              </a:rPr>
-              <a:t>-</a:t>
-            </a:r>
-            <a:r>
-              <a:rPr lang="pt-BR" dirty="0" err="1">
-                <a:hlinkClick r:id="rId3"/>
-              </a:rPr>
-              <a:t>transition</a:t>
-            </a:r>
-            <a:r>
-              <a:rPr lang="pt-BR" dirty="0">
-                <a:hlinkClick r:id="rId3"/>
-              </a:rPr>
-              <a:t>/</a:t>
-            </a:r>
-            <a:r>
-              <a:rPr lang="pt-BR" dirty="0"/>
-              <a:t>.</a:t>
-            </a:r>
-          </a:p>
-          <a:p>
-            <a:pPr marL="514350" indent="-514350" algn="l">
-              <a:buFont typeface="+mj-lt"/>
-              <a:buAutoNum type="arabicPeriod"/>
-            </a:pPr>
-            <a:r>
-              <a:rPr lang="pt-BR" dirty="0" err="1"/>
-              <a:t>Unity</a:t>
-            </a:r>
-            <a:r>
-              <a:rPr lang="pt-BR" dirty="0"/>
-              <a:t>. </a:t>
-            </a:r>
-            <a:r>
-              <a:rPr lang="pt-BR" b="1" dirty="0"/>
-              <a:t>Networking HLAPI System </a:t>
-            </a:r>
-            <a:r>
-              <a:rPr lang="pt-BR" b="1" dirty="0" err="1"/>
-              <a:t>Concepts</a:t>
-            </a:r>
-            <a:r>
-              <a:rPr lang="pt-BR" dirty="0"/>
-              <a:t>. </a:t>
-            </a:r>
-            <a:r>
-              <a:rPr lang="pt-BR" dirty="0" err="1"/>
-              <a:t>Documentation</a:t>
-            </a:r>
-            <a:r>
-              <a:rPr lang="pt-BR" dirty="0"/>
-              <a:t>. Disponível em: </a:t>
-            </a:r>
-            <a:r>
-              <a:rPr lang="en-US" dirty="0">
-                <a:hlinkClick r:id="rId4"/>
-              </a:rPr>
-              <a:t>https://docs.unity3d.com/Manual/UNetConcepts.html</a:t>
-            </a:r>
-            <a:r>
-              <a:rPr lang="en-US" dirty="0"/>
-              <a:t>.</a:t>
-            </a:r>
-            <a:endParaRPr lang="pt-BR" dirty="0"/>
-          </a:p>
-          <a:p>
-            <a:pPr marL="514350" indent="-514350" algn="l">
-              <a:buFont typeface="+mj-lt"/>
-              <a:buAutoNum type="arabicPeriod"/>
-            </a:pPr>
-            <a:r>
-              <a:rPr lang="pt-BR" dirty="0" err="1"/>
-              <a:t>Unity</a:t>
-            </a:r>
-            <a:r>
-              <a:rPr lang="pt-BR" dirty="0"/>
-              <a:t>. </a:t>
-            </a:r>
-            <a:r>
-              <a:rPr lang="pt-BR" b="1" dirty="0" err="1"/>
-              <a:t>Using</a:t>
-            </a:r>
-            <a:r>
-              <a:rPr lang="pt-BR" b="1" dirty="0"/>
-              <a:t> </a:t>
-            </a:r>
-            <a:r>
-              <a:rPr lang="pt-BR" b="1" dirty="0" err="1"/>
-              <a:t>the</a:t>
-            </a:r>
-            <a:r>
-              <a:rPr lang="pt-BR" b="1" dirty="0"/>
-              <a:t> Network Manager</a:t>
-            </a:r>
-            <a:r>
-              <a:rPr lang="pt-BR" dirty="0"/>
-              <a:t>. </a:t>
-            </a:r>
-            <a:r>
-              <a:rPr lang="pt-BR" dirty="0" err="1"/>
-              <a:t>Documentation</a:t>
-            </a:r>
-            <a:r>
-              <a:rPr lang="pt-BR" dirty="0"/>
-              <a:t>. Disponível em: </a:t>
-            </a:r>
-            <a:r>
-              <a:rPr lang="en-US" dirty="0">
-                <a:hlinkClick r:id="rId5"/>
-              </a:rPr>
-              <a:t>https://docs.unity3d.com/Manual/UNetManager.html</a:t>
-            </a:r>
-            <a:r>
-              <a:rPr lang="en-US" dirty="0"/>
-              <a:t>.</a:t>
-            </a:r>
-          </a:p>
-          <a:p>
-            <a:pPr marL="514350" indent="-514350" algn="l">
-              <a:buFont typeface="+mj-lt"/>
-              <a:buAutoNum type="arabicPeriod"/>
-            </a:pPr>
-            <a:r>
-              <a:rPr lang="en-US" dirty="0"/>
-              <a:t>Unity. </a:t>
-            </a:r>
-            <a:r>
-              <a:rPr lang="en-US" b="1" dirty="0"/>
-              <a:t>Network Authority</a:t>
-            </a:r>
-            <a:r>
-              <a:rPr lang="en-US" dirty="0"/>
-              <a:t>. Documentation. </a:t>
-            </a:r>
-            <a:r>
-              <a:rPr lang="en-US" dirty="0" err="1"/>
-              <a:t>Disponível</a:t>
-            </a:r>
-            <a:r>
-              <a:rPr lang="en-US" dirty="0"/>
-              <a:t> </a:t>
-            </a:r>
-            <a:r>
-              <a:rPr lang="en-US" dirty="0" err="1"/>
-              <a:t>em</a:t>
-            </a:r>
-            <a:r>
-              <a:rPr lang="en-US" dirty="0"/>
-              <a:t>: </a:t>
-            </a:r>
-            <a:r>
-              <a:rPr lang="en-US" dirty="0">
-                <a:hlinkClick r:id="rId6"/>
-              </a:rPr>
-              <a:t>https://docs.unity3d.com/Manual/UNetAuthority.html</a:t>
-            </a:r>
-            <a:r>
-              <a:rPr lang="en-US" dirty="0"/>
-              <a:t>.</a:t>
-            </a:r>
-          </a:p>
-          <a:p>
-            <a:pPr marL="514350" indent="-514350" algn="l">
-              <a:buFont typeface="+mj-lt"/>
-              <a:buAutoNum type="arabicPeriod"/>
-            </a:pPr>
-            <a:r>
-              <a:rPr lang="en-US" dirty="0"/>
-              <a:t>Unity. </a:t>
-            </a:r>
-            <a:r>
-              <a:rPr lang="en-US" b="1" dirty="0"/>
-              <a:t>Network Transform</a:t>
-            </a:r>
-            <a:r>
-              <a:rPr lang="en-US" dirty="0"/>
-              <a:t>. Documentation. </a:t>
-            </a:r>
-            <a:r>
-              <a:rPr lang="en-US" dirty="0" err="1"/>
-              <a:t>Disponível</a:t>
-            </a:r>
-            <a:r>
-              <a:rPr lang="en-US" dirty="0"/>
-              <a:t> </a:t>
-            </a:r>
-            <a:r>
-              <a:rPr lang="en-US" dirty="0" err="1"/>
-              <a:t>em</a:t>
-            </a:r>
-            <a:r>
-              <a:rPr lang="en-US" dirty="0"/>
-              <a:t>: </a:t>
-            </a:r>
-            <a:r>
-              <a:rPr lang="en-US" dirty="0">
-                <a:hlinkClick r:id="rId7"/>
-              </a:rPr>
-              <a:t>https://docs.unity3d.com/Manual/class-NetworkTransform.html</a:t>
-            </a:r>
-            <a:r>
-              <a:rPr lang="en-US" dirty="0"/>
-              <a:t>.</a:t>
-            </a:r>
-          </a:p>
-          <a:p>
-            <a:pPr marL="514350" indent="-514350" algn="l">
-              <a:buFont typeface="+mj-lt"/>
-              <a:buAutoNum type="arabicPeriod"/>
-            </a:pPr>
-            <a:endParaRPr lang="en-US" dirty="0"/>
-          </a:p>
-          <a:p>
-            <a:pPr marL="514350" indent="-514350" algn="l">
-              <a:buFont typeface="+mj-lt"/>
-              <a:buAutoNum type="arabicPeriod"/>
-            </a:pPr>
-            <a:endParaRPr lang="pt-BR" dirty="0"/>
-          </a:p>
-          <a:p>
-            <a:endParaRPr lang="pt-BR" dirty="0"/>
-          </a:p>
-          <a:p>
+              <a:rPr lang="pt-BR" dirty="0" err="1" smtClean="0"/>
+              <a:t>SyncVars</a:t>
+            </a:r>
+            <a:r>
+              <a:rPr lang="pt-BR" dirty="0" smtClean="0"/>
+              <a:t> são variáveis de script herdadas de </a:t>
+            </a:r>
+            <a:r>
+              <a:rPr lang="pt-BR" b="1" dirty="0" err="1" smtClean="0"/>
+              <a:t>NetworkBehaviour</a:t>
+            </a:r>
+            <a:r>
+              <a:rPr lang="pt-BR" dirty="0" smtClean="0"/>
+              <a:t> que são sincronizadas do servidor para os clientes.</a:t>
+            </a:r>
+          </a:p>
+          <a:p>
+            <a:r>
+              <a:rPr lang="pt-BR" dirty="0" smtClean="0"/>
+              <a:t>Quando um </a:t>
+            </a:r>
+            <a:r>
+              <a:rPr lang="pt-BR" dirty="0" err="1" smtClean="0"/>
+              <a:t>GameObject</a:t>
+            </a:r>
+            <a:r>
+              <a:rPr lang="pt-BR" dirty="0" smtClean="0"/>
+              <a:t> é instanciado, ou um novo jogador entra no jogo em andamento, eles recebem o estado mais recente de todas as </a:t>
+            </a:r>
+            <a:r>
+              <a:rPr lang="pt-BR" dirty="0" err="1" smtClean="0"/>
+              <a:t>SyncVars</a:t>
+            </a:r>
+            <a:r>
+              <a:rPr lang="pt-BR" dirty="0" smtClean="0"/>
+              <a:t> dos objetos em rede que são visíveis a eles.</a:t>
+            </a:r>
             <a:endParaRPr lang="pt-BR" dirty="0"/>
           </a:p>
         </p:txBody>
@@ -5188,7 +4886,7 @@
     </p:spTree>
     <p:extLst>
       <p:ext uri="{BB962C8B-B14F-4D97-AF65-F5344CB8AC3E}">
-        <p14:creationId xmlns:p14="http://schemas.microsoft.com/office/powerpoint/2010/main" val="4155669808"/>
+        <p14:creationId xmlns:p14="http://schemas.microsoft.com/office/powerpoint/2010/main" val="1030447914"/>
       </p:ext>
     </p:extLst>
   </p:cSld>
@@ -5301,6 +4999,674 @@
     <p:extLst>
       <p:ext uri="{BB962C8B-B14F-4D97-AF65-F5344CB8AC3E}">
         <p14:creationId xmlns:p14="http://schemas.microsoft.com/office/powerpoint/2010/main" val="205696864"/>
+      </p:ext>
+    </p:extLst>
+  </p:cSld>
+  <p:clrMapOvr>
+    <a:masterClrMapping/>
+  </p:clrMapOvr>
+</p:sld>
+</file>
+
+<file path=ppt/slides/slide20.xml><?xml version="1.0" encoding="utf-8"?>
+<p:sld xmlns:a="http://schemas.openxmlformats.org/drawingml/2006/main" xmlns:r="http://schemas.openxmlformats.org/officeDocument/2006/relationships" xmlns:p="http://schemas.openxmlformats.org/presentationml/2006/main">
+  <p:cSld>
+    <p:spTree>
+      <p:nvGrpSpPr>
+        <p:cNvPr id="1" name=""/>
+        <p:cNvGrpSpPr/>
+        <p:nvPr/>
+      </p:nvGrpSpPr>
+      <p:grpSpPr>
+        <a:xfrm>
+          <a:off x="0" y="0"/>
+          <a:ext cx="0" cy="0"/>
+          <a:chOff x="0" y="0"/>
+          <a:chExt cx="0" cy="0"/>
+        </a:xfrm>
+      </p:grpSpPr>
+      <p:sp>
+        <p:nvSpPr>
+          <p:cNvPr id="2" name="Título 1"/>
+          <p:cNvSpPr>
+            <a:spLocks noGrp="1"/>
+          </p:cNvSpPr>
+          <p:nvPr>
+            <p:ph type="title"/>
+          </p:nvPr>
+        </p:nvSpPr>
+        <p:spPr/>
+        <p:txBody>
+          <a:bodyPr/>
+          <a:lstStyle/>
+          <a:p>
+            <a:r>
+              <a:rPr lang="pt-BR" dirty="0" smtClean="0"/>
+              <a:t>Sincronização de Estado - </a:t>
+            </a:r>
+            <a:r>
+              <a:rPr lang="pt-BR" dirty="0" err="1" smtClean="0"/>
+              <a:t>SyncVars</a:t>
+            </a:r>
+            <a:endParaRPr lang="pt-BR" dirty="0"/>
+          </a:p>
+        </p:txBody>
+      </p:sp>
+      <p:sp>
+        <p:nvSpPr>
+          <p:cNvPr id="3" name="Espaço Reservado para Conteúdo 2"/>
+          <p:cNvSpPr>
+            <a:spLocks noGrp="1"/>
+          </p:cNvSpPr>
+          <p:nvPr>
+            <p:ph idx="1"/>
+          </p:nvPr>
+        </p:nvSpPr>
+        <p:spPr/>
+        <p:txBody>
+          <a:bodyPr>
+            <a:normAutofit/>
+          </a:bodyPr>
+          <a:lstStyle/>
+          <a:p>
+            <a:r>
+              <a:rPr lang="pt-BR" dirty="0" smtClean="0"/>
+              <a:t>.</a:t>
+            </a:r>
+            <a:endParaRPr lang="pt-BR" dirty="0"/>
+          </a:p>
+        </p:txBody>
+      </p:sp>
+    </p:spTree>
+    <p:extLst>
+      <p:ext uri="{BB962C8B-B14F-4D97-AF65-F5344CB8AC3E}">
+        <p14:creationId xmlns:p14="http://schemas.microsoft.com/office/powerpoint/2010/main" val="47902966"/>
+      </p:ext>
+    </p:extLst>
+  </p:cSld>
+  <p:clrMapOvr>
+    <a:masterClrMapping/>
+  </p:clrMapOvr>
+</p:sld>
+</file>
+
+<file path=ppt/slides/slide21.xml><?xml version="1.0" encoding="utf-8"?>
+<p:sld xmlns:a="http://schemas.openxmlformats.org/drawingml/2006/main" xmlns:r="http://schemas.openxmlformats.org/officeDocument/2006/relationships" xmlns:p="http://schemas.openxmlformats.org/presentationml/2006/main">
+  <p:cSld>
+    <p:spTree>
+      <p:nvGrpSpPr>
+        <p:cNvPr id="1" name=""/>
+        <p:cNvGrpSpPr/>
+        <p:nvPr/>
+      </p:nvGrpSpPr>
+      <p:grpSpPr>
+        <a:xfrm>
+          <a:off x="0" y="0"/>
+          <a:ext cx="0" cy="0"/>
+          <a:chOff x="0" y="0"/>
+          <a:chExt cx="0" cy="0"/>
+        </a:xfrm>
+      </p:grpSpPr>
+      <p:sp>
+        <p:nvSpPr>
+          <p:cNvPr id="5" name="Título 4"/>
+          <p:cNvSpPr>
+            <a:spLocks noGrp="1"/>
+          </p:cNvSpPr>
+          <p:nvPr>
+            <p:ph type="title"/>
+          </p:nvPr>
+        </p:nvSpPr>
+        <p:spPr/>
+        <p:txBody>
+          <a:bodyPr/>
+          <a:lstStyle/>
+          <a:p>
+            <a:r>
+              <a:rPr lang="pt-BR" dirty="0"/>
+              <a:t>Notas</a:t>
+            </a:r>
+          </a:p>
+        </p:txBody>
+      </p:sp>
+      <p:sp>
+        <p:nvSpPr>
+          <p:cNvPr id="6" name="Espaço Reservado para Conteúdo 5"/>
+          <p:cNvSpPr>
+            <a:spLocks noGrp="1"/>
+          </p:cNvSpPr>
+          <p:nvPr>
+            <p:ph idx="1"/>
+          </p:nvPr>
+        </p:nvSpPr>
+        <p:spPr/>
+        <p:txBody>
+          <a:bodyPr>
+            <a:normAutofit/>
+          </a:bodyPr>
+          <a:lstStyle/>
+          <a:p>
+            <a:r>
+              <a:rPr lang="pt-BR" dirty="0"/>
+              <a:t>Deve haver apenas uma Network Manager ativo por cena.</a:t>
+            </a:r>
+            <a:r>
+              <a:rPr lang="en-US" dirty="0"/>
+              <a:t> </a:t>
+            </a:r>
+          </a:p>
+          <a:p>
+            <a:r>
+              <a:rPr lang="en-US" dirty="0"/>
+              <a:t>Do not place the Network Manager component on a networked </a:t>
+            </a:r>
+            <a:r>
+              <a:rPr lang="en-US" dirty="0" err="1"/>
+              <a:t>GameObject</a:t>
+            </a:r>
+            <a:r>
+              <a:rPr lang="en-US" dirty="0"/>
+              <a:t> (one which has a </a:t>
+            </a:r>
+            <a:r>
+              <a:rPr lang="en-US" u="sng" dirty="0">
+                <a:hlinkClick r:id="rId2"/>
+              </a:rPr>
+              <a:t>Network Identity</a:t>
+            </a:r>
+            <a:r>
+              <a:rPr lang="en-US" dirty="0"/>
+              <a:t> component), because Unity disables these when the Scene loads.</a:t>
+            </a:r>
+            <a:endParaRPr lang="pt-BR" dirty="0"/>
+          </a:p>
+        </p:txBody>
+      </p:sp>
+    </p:spTree>
+    <p:extLst>
+      <p:ext uri="{BB962C8B-B14F-4D97-AF65-F5344CB8AC3E}">
+        <p14:creationId xmlns:p14="http://schemas.microsoft.com/office/powerpoint/2010/main" val="128422404"/>
+      </p:ext>
+    </p:extLst>
+  </p:cSld>
+  <p:clrMapOvr>
+    <a:masterClrMapping/>
+  </p:clrMapOvr>
+</p:sld>
+</file>
+
+<file path=ppt/slides/slide22.xml><?xml version="1.0" encoding="utf-8"?>
+<p:sld xmlns:a="http://schemas.openxmlformats.org/drawingml/2006/main" xmlns:r="http://schemas.openxmlformats.org/officeDocument/2006/relationships" xmlns:p="http://schemas.openxmlformats.org/presentationml/2006/main">
+  <p:cSld>
+    <p:spTree>
+      <p:nvGrpSpPr>
+        <p:cNvPr id="1" name=""/>
+        <p:cNvGrpSpPr/>
+        <p:nvPr/>
+      </p:nvGrpSpPr>
+      <p:grpSpPr>
+        <a:xfrm>
+          <a:off x="0" y="0"/>
+          <a:ext cx="0" cy="0"/>
+          <a:chOff x="0" y="0"/>
+          <a:chExt cx="0" cy="0"/>
+        </a:xfrm>
+      </p:grpSpPr>
+      <p:sp>
+        <p:nvSpPr>
+          <p:cNvPr id="5" name="Título 4"/>
+          <p:cNvSpPr>
+            <a:spLocks noGrp="1"/>
+          </p:cNvSpPr>
+          <p:nvPr>
+            <p:ph type="title"/>
+          </p:nvPr>
+        </p:nvSpPr>
+        <p:spPr/>
+        <p:txBody>
+          <a:bodyPr>
+            <a:normAutofit/>
+          </a:bodyPr>
+          <a:lstStyle/>
+          <a:p>
+            <a:r>
+              <a:rPr lang="pt-BR" dirty="0"/>
+              <a:t>Referências</a:t>
+            </a:r>
+          </a:p>
+        </p:txBody>
+      </p:sp>
+      <p:sp>
+        <p:nvSpPr>
+          <p:cNvPr id="6" name="Espaço Reservado para Conteúdo 5"/>
+          <p:cNvSpPr>
+            <a:spLocks noGrp="1"/>
+          </p:cNvSpPr>
+          <p:nvPr>
+            <p:ph idx="1"/>
+          </p:nvPr>
+        </p:nvSpPr>
+        <p:spPr>
+          <a:xfrm>
+            <a:off x="317694" y="1291051"/>
+            <a:ext cx="11705493" cy="5254127"/>
+          </a:xfrm>
+        </p:spPr>
+        <p:txBody>
+          <a:bodyPr>
+            <a:normAutofit fontScale="62500" lnSpcReduction="20000"/>
+          </a:bodyPr>
+          <a:lstStyle/>
+          <a:p>
+            <a:pPr marL="514350" indent="-514350" algn="l">
+              <a:buFont typeface="+mj-lt"/>
+              <a:buAutoNum type="arabicPeriod"/>
+            </a:pPr>
+            <a:r>
+              <a:rPr lang="en-US" dirty="0"/>
+              <a:t>Glover, D. </a:t>
+            </a:r>
+            <a:r>
+              <a:rPr lang="en-US" b="1" dirty="0" err="1"/>
+              <a:t>UNet</a:t>
+            </a:r>
+            <a:r>
+              <a:rPr lang="en-US" b="1" dirty="0"/>
+              <a:t> Deprecation FAQ</a:t>
+            </a:r>
+            <a:r>
+              <a:rPr lang="en-US" dirty="0"/>
+              <a:t>. </a:t>
+            </a:r>
+            <a:r>
+              <a:rPr lang="en-US" dirty="0" err="1"/>
+              <a:t>Disponível</a:t>
+            </a:r>
+            <a:r>
+              <a:rPr lang="en-US" dirty="0"/>
+              <a:t> </a:t>
+            </a:r>
+            <a:r>
+              <a:rPr lang="en-US" dirty="0" err="1"/>
+              <a:t>em</a:t>
+            </a:r>
+            <a:r>
+              <a:rPr lang="en-US" dirty="0"/>
+              <a:t>: </a:t>
+            </a:r>
+            <a:r>
+              <a:rPr lang="en-US" dirty="0">
+                <a:hlinkClick r:id="rId2"/>
+              </a:rPr>
+              <a:t>https://support.unity3d.com/hc/en-us/articles/360001252086-UNet-Deprecation-FAQ</a:t>
+            </a:r>
+            <a:r>
+              <a:rPr lang="en-US" dirty="0"/>
+              <a:t>.</a:t>
+            </a:r>
+          </a:p>
+          <a:p>
+            <a:pPr marL="514350" indent="-514350" algn="l">
+              <a:buFont typeface="+mj-lt"/>
+              <a:buAutoNum type="arabicPeriod"/>
+            </a:pPr>
+            <a:r>
+              <a:rPr lang="en-US" dirty="0"/>
+              <a:t>Unity Blog.</a:t>
+            </a:r>
+            <a:r>
+              <a:rPr lang="en-US" b="1" dirty="0"/>
+              <a:t> Navigating Unity’s multiplayer </a:t>
+            </a:r>
+            <a:r>
+              <a:rPr lang="en-US" b="1" dirty="0" err="1"/>
+              <a:t>Netcode</a:t>
+            </a:r>
+            <a:r>
+              <a:rPr lang="en-US" b="1" dirty="0"/>
+              <a:t> transition</a:t>
+            </a:r>
+            <a:r>
+              <a:rPr lang="en-US" dirty="0"/>
+              <a:t>. </a:t>
+            </a:r>
+            <a:r>
+              <a:rPr lang="en-US" dirty="0" err="1"/>
+              <a:t>Disponível</a:t>
+            </a:r>
+            <a:r>
+              <a:rPr lang="en-US" dirty="0"/>
+              <a:t> </a:t>
+            </a:r>
+            <a:r>
+              <a:rPr lang="en-US" dirty="0" err="1"/>
+              <a:t>em</a:t>
+            </a:r>
+            <a:r>
+              <a:rPr lang="en-US" dirty="0"/>
+              <a:t>: </a:t>
+            </a:r>
+            <a:r>
+              <a:rPr lang="pt-BR" dirty="0">
+                <a:hlinkClick r:id="rId3"/>
+              </a:rPr>
+              <a:t>https://blogs.unity3d.com/2019/06/13/</a:t>
+            </a:r>
+            <a:r>
+              <a:rPr lang="pt-BR" dirty="0" err="1">
+                <a:hlinkClick r:id="rId3"/>
+              </a:rPr>
+              <a:t>navigating</a:t>
+            </a:r>
+            <a:r>
+              <a:rPr lang="pt-BR" dirty="0">
+                <a:hlinkClick r:id="rId3"/>
+              </a:rPr>
+              <a:t>-</a:t>
+            </a:r>
+            <a:r>
+              <a:rPr lang="pt-BR" dirty="0" err="1">
+                <a:hlinkClick r:id="rId3"/>
+              </a:rPr>
+              <a:t>unitys</a:t>
+            </a:r>
+            <a:r>
+              <a:rPr lang="pt-BR" dirty="0">
+                <a:hlinkClick r:id="rId3"/>
+              </a:rPr>
+              <a:t>-multiplayer-</a:t>
+            </a:r>
+            <a:r>
+              <a:rPr lang="pt-BR" dirty="0" err="1">
+                <a:hlinkClick r:id="rId3"/>
+              </a:rPr>
+              <a:t>netcode</a:t>
+            </a:r>
+            <a:r>
+              <a:rPr lang="pt-BR" dirty="0">
+                <a:hlinkClick r:id="rId3"/>
+              </a:rPr>
+              <a:t>-</a:t>
+            </a:r>
+            <a:r>
+              <a:rPr lang="pt-BR" dirty="0" err="1">
+                <a:hlinkClick r:id="rId3"/>
+              </a:rPr>
+              <a:t>transition</a:t>
+            </a:r>
+            <a:r>
+              <a:rPr lang="pt-BR" dirty="0">
+                <a:hlinkClick r:id="rId3"/>
+              </a:rPr>
+              <a:t>/</a:t>
+            </a:r>
+            <a:r>
+              <a:rPr lang="pt-BR" dirty="0"/>
+              <a:t>.</a:t>
+            </a:r>
+          </a:p>
+          <a:p>
+            <a:pPr marL="514350" indent="-514350" algn="l">
+              <a:buFont typeface="+mj-lt"/>
+              <a:buAutoNum type="arabicPeriod"/>
+            </a:pPr>
+            <a:r>
+              <a:rPr lang="pt-BR" dirty="0" err="1"/>
+              <a:t>Unity</a:t>
+            </a:r>
+            <a:r>
+              <a:rPr lang="pt-BR" dirty="0"/>
+              <a:t>. </a:t>
+            </a:r>
+            <a:r>
+              <a:rPr lang="pt-BR" b="1" dirty="0"/>
+              <a:t>Networking HLAPI System </a:t>
+            </a:r>
+            <a:r>
+              <a:rPr lang="pt-BR" b="1" dirty="0" err="1"/>
+              <a:t>Concepts</a:t>
+            </a:r>
+            <a:r>
+              <a:rPr lang="pt-BR" dirty="0"/>
+              <a:t>. </a:t>
+            </a:r>
+            <a:r>
+              <a:rPr lang="pt-BR" dirty="0" err="1"/>
+              <a:t>Documentation</a:t>
+            </a:r>
+            <a:r>
+              <a:rPr lang="pt-BR" dirty="0"/>
+              <a:t>. Disponível em: </a:t>
+            </a:r>
+            <a:r>
+              <a:rPr lang="en-US" dirty="0">
+                <a:hlinkClick r:id="rId4"/>
+              </a:rPr>
+              <a:t>https://docs.unity3d.com/Manual/UNetConcepts.html</a:t>
+            </a:r>
+            <a:r>
+              <a:rPr lang="en-US" dirty="0"/>
+              <a:t>.</a:t>
+            </a:r>
+            <a:endParaRPr lang="pt-BR" dirty="0"/>
+          </a:p>
+          <a:p>
+            <a:pPr marL="514350" indent="-514350" algn="l">
+              <a:buFont typeface="+mj-lt"/>
+              <a:buAutoNum type="arabicPeriod"/>
+            </a:pPr>
+            <a:r>
+              <a:rPr lang="pt-BR" dirty="0" err="1"/>
+              <a:t>Unity</a:t>
+            </a:r>
+            <a:r>
+              <a:rPr lang="pt-BR" dirty="0"/>
+              <a:t>. </a:t>
+            </a:r>
+            <a:r>
+              <a:rPr lang="pt-BR" b="1" dirty="0" err="1"/>
+              <a:t>Using</a:t>
+            </a:r>
+            <a:r>
+              <a:rPr lang="pt-BR" b="1" dirty="0"/>
+              <a:t> </a:t>
+            </a:r>
+            <a:r>
+              <a:rPr lang="pt-BR" b="1" dirty="0" err="1"/>
+              <a:t>the</a:t>
+            </a:r>
+            <a:r>
+              <a:rPr lang="pt-BR" b="1" dirty="0"/>
+              <a:t> Network Manager</a:t>
+            </a:r>
+            <a:r>
+              <a:rPr lang="pt-BR" dirty="0"/>
+              <a:t>. </a:t>
+            </a:r>
+            <a:r>
+              <a:rPr lang="pt-BR" dirty="0" err="1"/>
+              <a:t>Documentation</a:t>
+            </a:r>
+            <a:r>
+              <a:rPr lang="pt-BR" dirty="0"/>
+              <a:t>. Disponível em: </a:t>
+            </a:r>
+            <a:r>
+              <a:rPr lang="en-US" dirty="0">
+                <a:hlinkClick r:id="rId5"/>
+              </a:rPr>
+              <a:t>https://docs.unity3d.com/Manual/UNetManager.html</a:t>
+            </a:r>
+            <a:r>
+              <a:rPr lang="en-US" dirty="0"/>
+              <a:t>.</a:t>
+            </a:r>
+          </a:p>
+          <a:p>
+            <a:pPr marL="514350" indent="-514350" algn="l">
+              <a:buFont typeface="+mj-lt"/>
+              <a:buAutoNum type="arabicPeriod"/>
+            </a:pPr>
+            <a:r>
+              <a:rPr lang="en-US" dirty="0"/>
+              <a:t>Unity. </a:t>
+            </a:r>
+            <a:r>
+              <a:rPr lang="en-US" b="1" dirty="0"/>
+              <a:t>Network Authority</a:t>
+            </a:r>
+            <a:r>
+              <a:rPr lang="en-US" dirty="0"/>
+              <a:t>. Documentation. </a:t>
+            </a:r>
+            <a:r>
+              <a:rPr lang="en-US" dirty="0" err="1"/>
+              <a:t>Disponível</a:t>
+            </a:r>
+            <a:r>
+              <a:rPr lang="en-US" dirty="0"/>
+              <a:t> </a:t>
+            </a:r>
+            <a:r>
+              <a:rPr lang="en-US" dirty="0" err="1"/>
+              <a:t>em</a:t>
+            </a:r>
+            <a:r>
+              <a:rPr lang="en-US" dirty="0"/>
+              <a:t>: </a:t>
+            </a:r>
+            <a:r>
+              <a:rPr lang="en-US" dirty="0">
+                <a:hlinkClick r:id="rId6"/>
+              </a:rPr>
+              <a:t>https://docs.unity3d.com/Manual/UNetAuthority.html</a:t>
+            </a:r>
+            <a:r>
+              <a:rPr lang="en-US" dirty="0"/>
+              <a:t>.</a:t>
+            </a:r>
+          </a:p>
+          <a:p>
+            <a:pPr marL="514350" indent="-514350" algn="l">
+              <a:buFont typeface="+mj-lt"/>
+              <a:buAutoNum type="arabicPeriod"/>
+            </a:pPr>
+            <a:r>
+              <a:rPr lang="en-US" dirty="0"/>
+              <a:t>Unity. </a:t>
+            </a:r>
+            <a:r>
+              <a:rPr lang="en-US" b="1" dirty="0"/>
+              <a:t>Network Transform</a:t>
+            </a:r>
+            <a:r>
+              <a:rPr lang="en-US" dirty="0"/>
+              <a:t>. Documentation. </a:t>
+            </a:r>
+            <a:r>
+              <a:rPr lang="en-US" dirty="0" err="1"/>
+              <a:t>Disponível</a:t>
+            </a:r>
+            <a:r>
+              <a:rPr lang="en-US" dirty="0"/>
+              <a:t> </a:t>
+            </a:r>
+            <a:r>
+              <a:rPr lang="en-US" dirty="0" err="1"/>
+              <a:t>em</a:t>
+            </a:r>
+            <a:r>
+              <a:rPr lang="en-US" dirty="0"/>
+              <a:t>: </a:t>
+            </a:r>
+            <a:r>
+              <a:rPr lang="en-US" dirty="0">
+                <a:hlinkClick r:id="rId7"/>
+              </a:rPr>
+              <a:t>https://docs.unity3d.com/Manual/class-NetworkTransform.html</a:t>
+            </a:r>
+            <a:r>
+              <a:rPr lang="en-US" dirty="0" smtClean="0"/>
+              <a:t>.</a:t>
+            </a:r>
+          </a:p>
+          <a:p>
+            <a:pPr marL="514350" indent="-514350" algn="l">
+              <a:buFont typeface="+mj-lt"/>
+              <a:buAutoNum type="arabicPeriod"/>
+            </a:pPr>
+            <a:r>
+              <a:rPr lang="en-US" dirty="0" smtClean="0"/>
+              <a:t>Unity. </a:t>
+            </a:r>
+            <a:r>
+              <a:rPr lang="en-US" b="1" dirty="0" smtClean="0"/>
+              <a:t>State Synchronization</a:t>
+            </a:r>
+            <a:r>
+              <a:rPr lang="en-US" dirty="0" smtClean="0"/>
+              <a:t>. Documentation. </a:t>
+            </a:r>
+            <a:r>
+              <a:rPr lang="en-US" dirty="0" err="1" smtClean="0"/>
+              <a:t>Disponível</a:t>
+            </a:r>
+            <a:r>
+              <a:rPr lang="en-US" dirty="0" smtClean="0"/>
+              <a:t> </a:t>
+            </a:r>
+            <a:r>
+              <a:rPr lang="en-US" dirty="0" err="1" smtClean="0"/>
+              <a:t>em</a:t>
+            </a:r>
+            <a:r>
+              <a:rPr lang="en-US" dirty="0" smtClean="0"/>
+              <a:t>: </a:t>
+            </a:r>
+            <a:r>
+              <a:rPr lang="pt-BR" dirty="0">
+                <a:hlinkClick r:id="rId8"/>
+              </a:rPr>
+              <a:t>https://</a:t>
+            </a:r>
+            <a:r>
+              <a:rPr lang="pt-BR" dirty="0" smtClean="0">
+                <a:hlinkClick r:id="rId8"/>
+              </a:rPr>
+              <a:t>docs.unity3d.com/Manual/UNetStateSync.html</a:t>
+            </a:r>
+            <a:r>
+              <a:rPr lang="pt-BR" dirty="0" smtClean="0"/>
+              <a:t>.</a:t>
+            </a:r>
+            <a:endParaRPr lang="en-US" dirty="0"/>
+          </a:p>
+          <a:p>
+            <a:pPr marL="514350" indent="-514350" algn="l">
+              <a:buFont typeface="+mj-lt"/>
+              <a:buAutoNum type="arabicPeriod"/>
+            </a:pPr>
+            <a:endParaRPr lang="en-US" dirty="0"/>
+          </a:p>
+          <a:p>
+            <a:pPr marL="514350" indent="-514350" algn="l">
+              <a:buFont typeface="+mj-lt"/>
+              <a:buAutoNum type="arabicPeriod"/>
+            </a:pPr>
+            <a:endParaRPr lang="pt-BR" dirty="0"/>
+          </a:p>
+          <a:p>
+            <a:endParaRPr lang="pt-BR" dirty="0"/>
+          </a:p>
+          <a:p>
+            <a:endParaRPr lang="pt-BR" dirty="0"/>
+          </a:p>
+        </p:txBody>
+      </p:sp>
+    </p:spTree>
+    <p:extLst>
+      <p:ext uri="{BB962C8B-B14F-4D97-AF65-F5344CB8AC3E}">
+        <p14:creationId xmlns:p14="http://schemas.microsoft.com/office/powerpoint/2010/main" val="4155669808"/>
       </p:ext>
     </p:extLst>
   </p:cSld>

</xml_diff>

<commit_message>
adição dos slides: - Sincronização de Estado - SyncVars; e - Atributo ClientRPC
</commit_message>
<xml_diff>
--- a/unity-multiplayer.pptx
+++ b/unity-multiplayer.pptx
@@ -5,7 +5,7 @@
     <p:sldMasterId id="2147483648" r:id="rId1"/>
   </p:sldMasterIdLst>
   <p:notesMasterIdLst>
-    <p:notesMasterId r:id="rId24"/>
+    <p:notesMasterId r:id="rId26"/>
   </p:notesMasterIdLst>
   <p:sldIdLst>
     <p:sldId id="256" r:id="rId2"/>
@@ -28,8 +28,10 @@
     <p:sldId id="369" r:id="rId19"/>
     <p:sldId id="370" r:id="rId20"/>
     <p:sldId id="371" r:id="rId21"/>
-    <p:sldId id="357" r:id="rId22"/>
-    <p:sldId id="352" r:id="rId23"/>
+    <p:sldId id="372" r:id="rId22"/>
+    <p:sldId id="373" r:id="rId23"/>
+    <p:sldId id="357" r:id="rId24"/>
+    <p:sldId id="352" r:id="rId25"/>
   </p:sldIdLst>
   <p:sldSz cx="12192000" cy="6858000"/>
   <p:notesSz cx="6858000" cy="9144000"/>
@@ -218,7 +220,7 @@
           <a:p>
             <a:fld id="{94D3EB41-CF60-4C9F-BD83-AE56FA0945EB}" type="datetimeFigureOut">
               <a:rPr lang="pt-BR" smtClean="0"/>
-              <a:t>10/09/2019</a:t>
+              <a:t>11/09/2019</a:t>
             </a:fld>
             <a:endParaRPr lang="pt-BR"/>
           </a:p>
@@ -376,7 +378,7 @@
           <a:p>
             <a:fld id="{020F486D-935E-4125-8FD7-C735663CC7DE}" type="slidenum">
               <a:rPr lang="pt-BR" smtClean="0"/>
-              <a:t>‹nº›</a:t>
+              <a:t>‹#›</a:t>
             </a:fld>
             <a:endParaRPr lang="pt-BR"/>
           </a:p>
@@ -728,7 +730,7 @@
           <a:p>
             <a:fld id="{9642BF85-54FF-46CE-B398-87F998CFD60B}" type="datetimeFigureOut">
               <a:rPr lang="pt-BR" smtClean="0"/>
-              <a:t>10/09/2019</a:t>
+              <a:t>11/09/2019</a:t>
             </a:fld>
             <a:endParaRPr lang="pt-BR"/>
           </a:p>
@@ -770,7 +772,7 @@
           <a:p>
             <a:fld id="{29185252-FBA3-417A-8652-C405B89605D8}" type="slidenum">
               <a:rPr lang="pt-BR" smtClean="0"/>
-              <a:t>‹nº›</a:t>
+              <a:t>‹#›</a:t>
             </a:fld>
             <a:endParaRPr lang="pt-BR"/>
           </a:p>
@@ -896,7 +898,7 @@
           <a:p>
             <a:fld id="{9642BF85-54FF-46CE-B398-87F998CFD60B}" type="datetimeFigureOut">
               <a:rPr lang="pt-BR" smtClean="0"/>
-              <a:t>10/09/2019</a:t>
+              <a:t>11/09/2019</a:t>
             </a:fld>
             <a:endParaRPr lang="pt-BR"/>
           </a:p>
@@ -938,7 +940,7 @@
           <a:p>
             <a:fld id="{29185252-FBA3-417A-8652-C405B89605D8}" type="slidenum">
               <a:rPr lang="pt-BR" smtClean="0"/>
-              <a:t>‹nº›</a:t>
+              <a:t>‹#›</a:t>
             </a:fld>
             <a:endParaRPr lang="pt-BR"/>
           </a:p>
@@ -1074,7 +1076,7 @@
           <a:p>
             <a:fld id="{9642BF85-54FF-46CE-B398-87F998CFD60B}" type="datetimeFigureOut">
               <a:rPr lang="pt-BR" smtClean="0"/>
-              <a:t>10/09/2019</a:t>
+              <a:t>11/09/2019</a:t>
             </a:fld>
             <a:endParaRPr lang="pt-BR"/>
           </a:p>
@@ -1116,7 +1118,7 @@
           <a:p>
             <a:fld id="{29185252-FBA3-417A-8652-C405B89605D8}" type="slidenum">
               <a:rPr lang="pt-BR" smtClean="0"/>
-              <a:t>‹nº›</a:t>
+              <a:t>‹#›</a:t>
             </a:fld>
             <a:endParaRPr lang="pt-BR"/>
           </a:p>
@@ -1411,7 +1413,7 @@
           <a:p>
             <a:fld id="{9642BF85-54FF-46CE-B398-87F998CFD60B}" type="datetimeFigureOut">
               <a:rPr lang="pt-BR" smtClean="0"/>
-              <a:t>10/09/2019</a:t>
+              <a:t>11/09/2019</a:t>
             </a:fld>
             <a:endParaRPr lang="pt-BR"/>
           </a:p>
@@ -1453,7 +1455,7 @@
           <a:p>
             <a:fld id="{29185252-FBA3-417A-8652-C405B89605D8}" type="slidenum">
               <a:rPr lang="pt-BR" smtClean="0"/>
-              <a:t>‹nº›</a:t>
+              <a:t>‹#›</a:t>
             </a:fld>
             <a:endParaRPr lang="pt-BR"/>
           </a:p>
@@ -1682,7 +1684,7 @@
           <a:p>
             <a:fld id="{9642BF85-54FF-46CE-B398-87F998CFD60B}" type="datetimeFigureOut">
               <a:rPr lang="pt-BR" smtClean="0"/>
-              <a:t>10/09/2019</a:t>
+              <a:t>11/09/2019</a:t>
             </a:fld>
             <a:endParaRPr lang="pt-BR"/>
           </a:p>
@@ -1724,7 +1726,7 @@
           <a:p>
             <a:fld id="{29185252-FBA3-417A-8652-C405B89605D8}" type="slidenum">
               <a:rPr lang="pt-BR" smtClean="0"/>
-              <a:t>‹nº›</a:t>
+              <a:t>‹#›</a:t>
             </a:fld>
             <a:endParaRPr lang="pt-BR"/>
           </a:p>
@@ -1928,7 +1930,7 @@
           <a:p>
             <a:fld id="{9642BF85-54FF-46CE-B398-87F998CFD60B}" type="datetimeFigureOut">
               <a:rPr lang="pt-BR" smtClean="0"/>
-              <a:t>10/09/2019</a:t>
+              <a:t>11/09/2019</a:t>
             </a:fld>
             <a:endParaRPr lang="pt-BR"/>
           </a:p>
@@ -1970,7 +1972,7 @@
           <a:p>
             <a:fld id="{29185252-FBA3-417A-8652-C405B89605D8}" type="slidenum">
               <a:rPr lang="pt-BR" smtClean="0"/>
-              <a:t>‹nº›</a:t>
+              <a:t>‹#›</a:t>
             </a:fld>
             <a:endParaRPr lang="pt-BR"/>
           </a:p>
@@ -2292,7 +2294,7 @@
           <a:p>
             <a:fld id="{9642BF85-54FF-46CE-B398-87F998CFD60B}" type="datetimeFigureOut">
               <a:rPr lang="pt-BR" smtClean="0"/>
-              <a:t>10/09/2019</a:t>
+              <a:t>11/09/2019</a:t>
             </a:fld>
             <a:endParaRPr lang="pt-BR"/>
           </a:p>
@@ -2334,7 +2336,7 @@
           <a:p>
             <a:fld id="{29185252-FBA3-417A-8652-C405B89605D8}" type="slidenum">
               <a:rPr lang="pt-BR" smtClean="0"/>
-              <a:t>‹nº›</a:t>
+              <a:t>‹#›</a:t>
             </a:fld>
             <a:endParaRPr lang="pt-BR"/>
           </a:p>
@@ -2426,7 +2428,7 @@
           <a:p>
             <a:fld id="{9642BF85-54FF-46CE-B398-87F998CFD60B}" type="datetimeFigureOut">
               <a:rPr lang="pt-BR" smtClean="0"/>
-              <a:t>10/09/2019</a:t>
+              <a:t>11/09/2019</a:t>
             </a:fld>
             <a:endParaRPr lang="pt-BR"/>
           </a:p>
@@ -2468,7 +2470,7 @@
           <a:p>
             <a:fld id="{29185252-FBA3-417A-8652-C405B89605D8}" type="slidenum">
               <a:rPr lang="pt-BR" smtClean="0"/>
-              <a:t>‹nº›</a:t>
+              <a:t>‹#›</a:t>
             </a:fld>
             <a:endParaRPr lang="pt-BR"/>
           </a:p>
@@ -2521,7 +2523,7 @@
           <a:p>
             <a:fld id="{9642BF85-54FF-46CE-B398-87F998CFD60B}" type="datetimeFigureOut">
               <a:rPr lang="pt-BR" smtClean="0"/>
-              <a:t>10/09/2019</a:t>
+              <a:t>11/09/2019</a:t>
             </a:fld>
             <a:endParaRPr lang="pt-BR"/>
           </a:p>
@@ -2563,7 +2565,7 @@
           <a:p>
             <a:fld id="{29185252-FBA3-417A-8652-C405B89605D8}" type="slidenum">
               <a:rPr lang="pt-BR" smtClean="0"/>
-              <a:t>‹nº›</a:t>
+              <a:t>‹#›</a:t>
             </a:fld>
             <a:endParaRPr lang="pt-BR"/>
           </a:p>
@@ -2796,7 +2798,7 @@
           <a:p>
             <a:fld id="{9642BF85-54FF-46CE-B398-87F998CFD60B}" type="datetimeFigureOut">
               <a:rPr lang="pt-BR" smtClean="0"/>
-              <a:t>10/09/2019</a:t>
+              <a:t>11/09/2019</a:t>
             </a:fld>
             <a:endParaRPr lang="pt-BR"/>
           </a:p>
@@ -2838,7 +2840,7 @@
           <a:p>
             <a:fld id="{29185252-FBA3-417A-8652-C405B89605D8}" type="slidenum">
               <a:rPr lang="pt-BR" smtClean="0"/>
-              <a:t>‹nº›</a:t>
+              <a:t>‹#›</a:t>
             </a:fld>
             <a:endParaRPr lang="pt-BR"/>
           </a:p>
@@ -3048,7 +3050,7 @@
           <a:p>
             <a:fld id="{9642BF85-54FF-46CE-B398-87F998CFD60B}" type="datetimeFigureOut">
               <a:rPr lang="pt-BR" smtClean="0"/>
-              <a:t>10/09/2019</a:t>
+              <a:t>11/09/2019</a:t>
             </a:fld>
             <a:endParaRPr lang="pt-BR"/>
           </a:p>
@@ -3090,7 +3092,7 @@
           <a:p>
             <a:fld id="{29185252-FBA3-417A-8652-C405B89605D8}" type="slidenum">
               <a:rPr lang="pt-BR" smtClean="0"/>
-              <a:t>‹nº›</a:t>
+              <a:t>‹#›</a:t>
             </a:fld>
             <a:endParaRPr lang="pt-BR"/>
           </a:p>
@@ -3268,7 +3270,7 @@
           <a:p>
             <a:fld id="{9642BF85-54FF-46CE-B398-87F998CFD60B}" type="datetimeFigureOut">
               <a:rPr lang="pt-BR" smtClean="0"/>
-              <a:t>10/09/2019</a:t>
+              <a:t>11/09/2019</a:t>
             </a:fld>
             <a:endParaRPr lang="pt-BR"/>
           </a:p>
@@ -3346,7 +3348,7 @@
           <a:p>
             <a:fld id="{29185252-FBA3-417A-8652-C405B89605D8}" type="slidenum">
               <a:rPr lang="pt-BR" smtClean="0"/>
-              <a:t>‹nº›</a:t>
+              <a:t>‹#›</a:t>
             </a:fld>
             <a:endParaRPr lang="pt-BR"/>
           </a:p>
@@ -4699,10 +4701,9 @@
           <a:lstStyle/>
           <a:p>
             <a:r>
-              <a:rPr lang="pt-BR" dirty="0" smtClean="0"/>
+              <a:rPr lang="pt-BR" dirty="0"/>
               <a:t>Sincronização de Estado</a:t>
             </a:r>
-            <a:endParaRPr lang="pt-BR" dirty="0"/>
           </a:p>
         </p:txBody>
       </p:sp>
@@ -4724,46 +4725,45 @@
           <a:lstStyle/>
           <a:p>
             <a:r>
-              <a:rPr lang="pt-BR" dirty="0" smtClean="0"/>
+              <a:rPr lang="pt-BR" dirty="0"/>
               <a:t>Refere-se a sincronização de valores tais como inteiros, decimais, texto e booleanos em scripts dos </a:t>
             </a:r>
             <a:r>
-              <a:rPr lang="pt-BR" dirty="0" err="1" smtClean="0"/>
+              <a:rPr lang="pt-BR" dirty="0" err="1"/>
               <a:t>GameObjects</a:t>
             </a:r>
             <a:r>
-              <a:rPr lang="pt-BR" dirty="0" smtClean="0"/>
+              <a:rPr lang="pt-BR" dirty="0"/>
               <a:t> em rede.</a:t>
             </a:r>
           </a:p>
           <a:p>
             <a:r>
-              <a:rPr lang="pt-BR" dirty="0" smtClean="0"/>
+              <a:rPr lang="pt-BR" dirty="0"/>
               <a:t>A sincronização de estado é feita </a:t>
             </a:r>
             <a:r>
-              <a:rPr lang="pt-BR" b="1" dirty="0" smtClean="0"/>
+              <a:rPr lang="pt-BR" b="1" dirty="0"/>
               <a:t>do servidor para os clientes remotos</a:t>
             </a:r>
             <a:r>
-              <a:rPr lang="pt-BR" dirty="0" smtClean="0"/>
+              <a:rPr lang="pt-BR" dirty="0"/>
               <a:t>.</a:t>
             </a:r>
           </a:p>
           <a:p>
             <a:r>
-              <a:rPr lang="pt-BR" dirty="0" smtClean="0"/>
+              <a:rPr lang="pt-BR" dirty="0"/>
               <a:t>Os dados não são sincronizados na direção oposta – dos clientes remotos para o servidor. Para isso é necessário usar </a:t>
             </a:r>
             <a:r>
-              <a:rPr lang="pt-BR" b="1" dirty="0" err="1" smtClean="0"/>
+              <a:rPr lang="pt-BR" b="1" dirty="0" err="1"/>
               <a:t>Commands</a:t>
             </a:r>
             <a:r>
-              <a:rPr lang="pt-BR" dirty="0" smtClean="0"/>
+              <a:rPr lang="pt-BR" dirty="0"/>
               <a:t>.</a:t>
             </a:r>
-            <a:endParaRPr lang="pt-BR" dirty="0"/>
           </a:p>
         </p:txBody>
       </p:sp>
@@ -4813,11 +4813,11 @@
           <a:lstStyle/>
           <a:p>
             <a:r>
-              <a:rPr lang="pt-BR" dirty="0" smtClean="0"/>
+              <a:rPr lang="pt-BR" dirty="0"/>
               <a:t>Sincronização de Estado - </a:t>
             </a:r>
             <a:r>
-              <a:rPr lang="pt-BR" dirty="0" err="1" smtClean="0"/>
+              <a:rPr lang="pt-BR" dirty="0" err="1"/>
               <a:t>SyncVars</a:t>
             </a:r>
             <a:endParaRPr lang="pt-BR" dirty="0"/>
@@ -4842,44 +4842,43 @@
           <a:lstStyle/>
           <a:p>
             <a:r>
-              <a:rPr lang="pt-BR" dirty="0" err="1" smtClean="0"/>
+              <a:rPr lang="pt-BR" dirty="0" err="1"/>
               <a:t>SyncVars</a:t>
             </a:r>
             <a:r>
-              <a:rPr lang="pt-BR" dirty="0" smtClean="0"/>
+              <a:rPr lang="pt-BR" dirty="0"/>
               <a:t> são variáveis de script herdadas de </a:t>
             </a:r>
             <a:r>
-              <a:rPr lang="pt-BR" b="1" dirty="0" err="1" smtClean="0"/>
+              <a:rPr lang="pt-BR" b="1" dirty="0" err="1"/>
               <a:t>NetworkBehaviour</a:t>
             </a:r>
             <a:r>
-              <a:rPr lang="pt-BR" dirty="0" smtClean="0"/>
+              <a:rPr lang="pt-BR" dirty="0"/>
               <a:t> que são sincronizadas do servidor para os clientes.</a:t>
             </a:r>
           </a:p>
           <a:p>
             <a:r>
-              <a:rPr lang="pt-BR" dirty="0" smtClean="0"/>
+              <a:rPr lang="pt-BR" dirty="0"/>
               <a:t>Quando um </a:t>
             </a:r>
             <a:r>
-              <a:rPr lang="pt-BR" dirty="0" err="1" smtClean="0"/>
+              <a:rPr lang="pt-BR" dirty="0" err="1"/>
               <a:t>GameObject</a:t>
             </a:r>
             <a:r>
-              <a:rPr lang="pt-BR" dirty="0" smtClean="0"/>
+              <a:rPr lang="pt-BR" dirty="0"/>
               <a:t> é instanciado, ou um novo jogador entra no jogo em andamento, eles recebem o estado mais recente de todas as </a:t>
             </a:r>
             <a:r>
-              <a:rPr lang="pt-BR" dirty="0" err="1" smtClean="0"/>
+              <a:rPr lang="pt-BR" dirty="0" err="1"/>
               <a:t>SyncVars</a:t>
             </a:r>
             <a:r>
-              <a:rPr lang="pt-BR" dirty="0" smtClean="0"/>
+              <a:rPr lang="pt-BR" dirty="0"/>
               <a:t> dos objetos em rede que são visíveis a eles.</a:t>
             </a:r>
-            <a:endParaRPr lang="pt-BR" dirty="0"/>
           </a:p>
         </p:txBody>
       </p:sp>
@@ -5041,11 +5040,11 @@
           <a:lstStyle/>
           <a:p>
             <a:r>
-              <a:rPr lang="pt-BR" dirty="0" smtClean="0"/>
+              <a:rPr lang="pt-BR" dirty="0"/>
               <a:t>Sincronização de Estado - </a:t>
             </a:r>
             <a:r>
-              <a:rPr lang="pt-BR" dirty="0" err="1" smtClean="0"/>
+              <a:rPr lang="pt-BR" dirty="0" err="1"/>
               <a:t>SyncVars</a:t>
             </a:r>
             <a:endParaRPr lang="pt-BR" dirty="0"/>
@@ -5070,10 +5069,39 @@
           <a:lstStyle/>
           <a:p>
             <a:r>
-              <a:rPr lang="pt-BR" dirty="0" smtClean="0"/>
-              <a:t>.</a:t>
-            </a:r>
-            <a:endParaRPr lang="pt-BR" dirty="0"/>
+              <a:rPr lang="pt-BR" dirty="0"/>
+              <a:t>É necessário usar o atributo [</a:t>
+            </a:r>
+            <a:r>
+              <a:rPr lang="pt-BR" dirty="0" err="1"/>
+              <a:t>SyncVar</a:t>
+            </a:r>
+            <a:r>
+              <a:rPr lang="pt-BR" dirty="0"/>
+              <a:t>] para especificar quais variáveis no script você quer sincronizar.</a:t>
+            </a:r>
+          </a:p>
+          <a:p>
+            <a:r>
+              <a:rPr lang="pt-BR" dirty="0"/>
+              <a:t>O servidor envia atualizações </a:t>
+            </a:r>
+            <a:r>
+              <a:rPr lang="pt-BR" dirty="0" err="1"/>
+              <a:t>SyncVar</a:t>
+            </a:r>
+            <a:r>
+              <a:rPr lang="pt-BR" dirty="0"/>
+              <a:t> automaticamente quando o valor de uma variável </a:t>
+            </a:r>
+            <a:r>
+              <a:rPr lang="pt-BR" dirty="0" err="1"/>
+              <a:t>SyncVar</a:t>
+            </a:r>
+            <a:r>
+              <a:rPr lang="pt-BR" dirty="0"/>
+              <a:t> é alterado.</a:t>
+            </a:r>
           </a:p>
         </p:txBody>
       </p:sp>
@@ -5109,7 +5137,7 @@
       </p:grpSpPr>
       <p:sp>
         <p:nvSpPr>
-          <p:cNvPr id="5" name="Título 4"/>
+          <p:cNvPr id="2" name="Título 1"/>
           <p:cNvSpPr>
             <a:spLocks noGrp="1"/>
           </p:cNvSpPr>
@@ -5124,14 +5152,19 @@
           <a:p>
             <a:r>
               <a:rPr lang="pt-BR" dirty="0"/>
-              <a:t>Notas</a:t>
-            </a:r>
-          </a:p>
-        </p:txBody>
-      </p:sp>
-      <p:sp>
-        <p:nvSpPr>
-          <p:cNvPr id="6" name="Espaço Reservado para Conteúdo 5"/>
+              <a:t>Sincronização de Estado - </a:t>
+            </a:r>
+            <a:r>
+              <a:rPr lang="pt-BR" dirty="0" err="1"/>
+              <a:t>SyncVars</a:t>
+            </a:r>
+            <a:endParaRPr lang="pt-BR" dirty="0"/>
+          </a:p>
+        </p:txBody>
+      </p:sp>
+      <p:sp>
+        <p:nvSpPr>
+          <p:cNvPr id="3" name="Espaço Reservado para Conteúdo 2"/>
           <p:cNvSpPr>
             <a:spLocks noGrp="1"/>
           </p:cNvSpPr>
@@ -5148,44 +5181,65 @@
           <a:p>
             <a:r>
               <a:rPr lang="pt-BR" dirty="0"/>
-              <a:t>Deve haver apenas uma Network Manager ativo por cena.</a:t>
-            </a:r>
-            <a:r>
-              <a:rPr lang="en-US" dirty="0"/>
-              <a:t> </a:t>
-            </a:r>
-          </a:p>
-          <a:p>
-            <a:r>
-              <a:rPr lang="en-US" dirty="0"/>
-              <a:t>Do not place the Network Manager component on a networked </a:t>
-            </a:r>
-            <a:r>
-              <a:rPr lang="en-US" dirty="0" err="1"/>
-              <a:t>GameObject</a:t>
-            </a:r>
-            <a:r>
-              <a:rPr lang="en-US" dirty="0"/>
-              <a:t> (one which has a </a:t>
-            </a:r>
-            <a:r>
-              <a:rPr lang="en-US" u="sng" dirty="0">
-                <a:hlinkClick r:id="rId2"/>
-              </a:rPr>
-              <a:t>Network Identity</a:t>
-            </a:r>
-            <a:r>
-              <a:rPr lang="en-US" dirty="0"/>
-              <a:t> component), because Unity disables these when the Scene loads.</a:t>
-            </a:r>
-            <a:endParaRPr lang="pt-BR" dirty="0"/>
+              <a:t>O atributo </a:t>
+            </a:r>
+            <a:r>
+              <a:rPr lang="pt-BR" b="1" dirty="0" err="1"/>
+              <a:t>hook</a:t>
+            </a:r>
+            <a:r>
+              <a:rPr lang="pt-BR" dirty="0"/>
+              <a:t> pode ser usado para especificar um método a ser chamado quando a variável </a:t>
+            </a:r>
+            <a:r>
+              <a:rPr lang="pt-BR" b="1" dirty="0" err="1"/>
+              <a:t>sync</a:t>
+            </a:r>
+            <a:r>
+              <a:rPr lang="pt-BR" dirty="0"/>
+              <a:t> mudar de valor no cliente:</a:t>
+            </a:r>
+          </a:p>
+          <a:p>
+            <a:r>
+              <a:rPr lang="pt-BR" b="1" dirty="0"/>
+              <a:t>[</a:t>
+            </a:r>
+            <a:r>
+              <a:rPr lang="pt-BR" b="1" dirty="0" err="1"/>
+              <a:t>SyncVar</a:t>
+            </a:r>
+            <a:r>
+              <a:rPr lang="pt-BR" b="1" dirty="0"/>
+              <a:t> (</a:t>
+            </a:r>
+            <a:r>
+              <a:rPr lang="pt-BR" b="1" dirty="0" err="1"/>
+              <a:t>hook</a:t>
+            </a:r>
+            <a:r>
+              <a:rPr lang="pt-BR" b="1" dirty="0"/>
+              <a:t> = “</a:t>
+            </a:r>
+            <a:r>
+              <a:rPr lang="pt-BR" b="1" i="1" dirty="0"/>
+              <a:t>nome-do-</a:t>
+            </a:r>
+            <a:r>
+              <a:rPr lang="pt-BR" b="1" i="1" dirty="0" err="1"/>
+              <a:t>metodo</a:t>
+            </a:r>
+            <a:r>
+              <a:rPr lang="pt-BR" b="1" dirty="0"/>
+              <a:t>”)]</a:t>
+            </a:r>
           </a:p>
         </p:txBody>
       </p:sp>
     </p:spTree>
     <p:extLst>
       <p:ext uri="{BB962C8B-B14F-4D97-AF65-F5344CB8AC3E}">
-        <p14:creationId xmlns:p14="http://schemas.microsoft.com/office/powerpoint/2010/main" val="128422404"/>
+        <p14:creationId xmlns:p14="http://schemas.microsoft.com/office/powerpoint/2010/main" val="3758710000"/>
       </p:ext>
     </p:extLst>
   </p:cSld>
@@ -5214,6 +5268,261 @@
       </p:grpSpPr>
       <p:sp>
         <p:nvSpPr>
+          <p:cNvPr id="2" name="Título 1"/>
+          <p:cNvSpPr>
+            <a:spLocks noGrp="1"/>
+          </p:cNvSpPr>
+          <p:nvPr>
+            <p:ph type="title"/>
+          </p:nvPr>
+        </p:nvSpPr>
+        <p:spPr/>
+        <p:txBody>
+          <a:bodyPr/>
+          <a:lstStyle/>
+          <a:p>
+            <a:r>
+              <a:rPr lang="pt-BR" dirty="0"/>
+              <a:t>Atributo </a:t>
+            </a:r>
+            <a:r>
+              <a:rPr lang="pt-BR" dirty="0" err="1"/>
+              <a:t>ClientRPC</a:t>
+            </a:r>
+            <a:endParaRPr lang="pt-BR" dirty="0"/>
+          </a:p>
+        </p:txBody>
+      </p:sp>
+      <p:sp>
+        <p:nvSpPr>
+          <p:cNvPr id="3" name="Espaço Reservado para Conteúdo 2"/>
+          <p:cNvSpPr>
+            <a:spLocks noGrp="1"/>
+          </p:cNvSpPr>
+          <p:nvPr>
+            <p:ph idx="1"/>
+          </p:nvPr>
+        </p:nvSpPr>
+        <p:spPr/>
+        <p:txBody>
+          <a:bodyPr>
+            <a:normAutofit lnSpcReduction="10000"/>
+          </a:bodyPr>
+          <a:lstStyle/>
+          <a:p>
+            <a:r>
+              <a:rPr lang="pt-BR" dirty="0"/>
+              <a:t>Este atributo pode ser colocado em métodos da classe </a:t>
+            </a:r>
+            <a:r>
+              <a:rPr lang="pt-BR" b="1" dirty="0" err="1"/>
+              <a:t>NetworkBehaviour</a:t>
+            </a:r>
+            <a:r>
+              <a:rPr lang="pt-BR" dirty="0"/>
+              <a:t> para permitir que sejam invocados no clientes a partir de um servidor.</a:t>
+            </a:r>
+          </a:p>
+          <a:p>
+            <a:r>
+              <a:rPr lang="pt-BR" dirty="0"/>
+              <a:t>Métodos </a:t>
+            </a:r>
+            <a:r>
+              <a:rPr lang="pt-BR" b="1" dirty="0"/>
+              <a:t>[</a:t>
+            </a:r>
+            <a:r>
+              <a:rPr lang="pt-BR" b="1" dirty="0" err="1"/>
+              <a:t>ClientRPC</a:t>
+            </a:r>
+            <a:r>
+              <a:rPr lang="pt-BR" b="1" dirty="0"/>
+              <a:t>]</a:t>
+            </a:r>
+            <a:r>
+              <a:rPr lang="pt-BR" dirty="0"/>
+              <a:t> são chamados por scripts em servidores </a:t>
+            </a:r>
+            <a:r>
+              <a:rPr lang="pt-BR" dirty="0" err="1"/>
+              <a:t>Unity</a:t>
+            </a:r>
+            <a:r>
+              <a:rPr lang="pt-BR" dirty="0"/>
+              <a:t> Multiplayer, que são invocadas nos </a:t>
+            </a:r>
+            <a:r>
+              <a:rPr lang="pt-BR" dirty="0" err="1"/>
+              <a:t>GameObjects</a:t>
+            </a:r>
+            <a:r>
+              <a:rPr lang="pt-BR" dirty="0"/>
+              <a:t> correspondentes nos clientes conectados ao servidor.</a:t>
+            </a:r>
+          </a:p>
+          <a:p>
+            <a:r>
+              <a:rPr lang="pt-BR" dirty="0"/>
+              <a:t>O nome destes métodos devem iniciar com o prefixo “</a:t>
+            </a:r>
+            <a:r>
+              <a:rPr lang="pt-BR" b="1" dirty="0" err="1"/>
+              <a:t>Rpc</a:t>
+            </a:r>
+            <a:r>
+              <a:rPr lang="pt-BR" dirty="0"/>
+              <a:t>” </a:t>
+            </a:r>
+            <a:r>
+              <a:rPr lang="pt-BR"/>
+              <a:t>e eles não </a:t>
+            </a:r>
+            <a:r>
+              <a:rPr lang="pt-BR" dirty="0"/>
+              <a:t>podem ser estáticos.</a:t>
+            </a:r>
+            <a:endParaRPr lang="pt-BR" b="1" dirty="0"/>
+          </a:p>
+        </p:txBody>
+      </p:sp>
+    </p:spTree>
+    <p:extLst>
+      <p:ext uri="{BB962C8B-B14F-4D97-AF65-F5344CB8AC3E}">
+        <p14:creationId xmlns:p14="http://schemas.microsoft.com/office/powerpoint/2010/main" val="615486480"/>
+      </p:ext>
+    </p:extLst>
+  </p:cSld>
+  <p:clrMapOvr>
+    <a:masterClrMapping/>
+  </p:clrMapOvr>
+</p:sld>
+</file>
+
+<file path=ppt/slides/slide23.xml><?xml version="1.0" encoding="utf-8"?>
+<p:sld xmlns:a="http://schemas.openxmlformats.org/drawingml/2006/main" xmlns:r="http://schemas.openxmlformats.org/officeDocument/2006/relationships" xmlns:p="http://schemas.openxmlformats.org/presentationml/2006/main">
+  <p:cSld>
+    <p:spTree>
+      <p:nvGrpSpPr>
+        <p:cNvPr id="1" name=""/>
+        <p:cNvGrpSpPr/>
+        <p:nvPr/>
+      </p:nvGrpSpPr>
+      <p:grpSpPr>
+        <a:xfrm>
+          <a:off x="0" y="0"/>
+          <a:ext cx="0" cy="0"/>
+          <a:chOff x="0" y="0"/>
+          <a:chExt cx="0" cy="0"/>
+        </a:xfrm>
+      </p:grpSpPr>
+      <p:sp>
+        <p:nvSpPr>
+          <p:cNvPr id="5" name="Título 4"/>
+          <p:cNvSpPr>
+            <a:spLocks noGrp="1"/>
+          </p:cNvSpPr>
+          <p:nvPr>
+            <p:ph type="title"/>
+          </p:nvPr>
+        </p:nvSpPr>
+        <p:spPr/>
+        <p:txBody>
+          <a:bodyPr/>
+          <a:lstStyle/>
+          <a:p>
+            <a:r>
+              <a:rPr lang="pt-BR" dirty="0"/>
+              <a:t>Notas</a:t>
+            </a:r>
+          </a:p>
+        </p:txBody>
+      </p:sp>
+      <p:sp>
+        <p:nvSpPr>
+          <p:cNvPr id="6" name="Espaço Reservado para Conteúdo 5"/>
+          <p:cNvSpPr>
+            <a:spLocks noGrp="1"/>
+          </p:cNvSpPr>
+          <p:nvPr>
+            <p:ph idx="1"/>
+          </p:nvPr>
+        </p:nvSpPr>
+        <p:spPr/>
+        <p:txBody>
+          <a:bodyPr>
+            <a:normAutofit/>
+          </a:bodyPr>
+          <a:lstStyle/>
+          <a:p>
+            <a:r>
+              <a:rPr lang="pt-BR" dirty="0"/>
+              <a:t>Deve haver apenas uma Network Manager ativo por cena.</a:t>
+            </a:r>
+            <a:r>
+              <a:rPr lang="en-US" dirty="0"/>
+              <a:t> </a:t>
+            </a:r>
+          </a:p>
+          <a:p>
+            <a:r>
+              <a:rPr lang="en-US" dirty="0"/>
+              <a:t>Do not place the Network Manager component on a networked </a:t>
+            </a:r>
+            <a:r>
+              <a:rPr lang="en-US" dirty="0" err="1"/>
+              <a:t>GameObject</a:t>
+            </a:r>
+            <a:r>
+              <a:rPr lang="en-US" dirty="0"/>
+              <a:t> (one which has a </a:t>
+            </a:r>
+            <a:r>
+              <a:rPr lang="en-US" u="sng" dirty="0">
+                <a:hlinkClick r:id="rId2"/>
+              </a:rPr>
+              <a:t>Network Identity</a:t>
+            </a:r>
+            <a:r>
+              <a:rPr lang="en-US" dirty="0"/>
+              <a:t> component), because Unity disables these when the Scene loads.</a:t>
+            </a:r>
+            <a:endParaRPr lang="pt-BR" dirty="0"/>
+          </a:p>
+        </p:txBody>
+      </p:sp>
+    </p:spTree>
+    <p:extLst>
+      <p:ext uri="{BB962C8B-B14F-4D97-AF65-F5344CB8AC3E}">
+        <p14:creationId xmlns:p14="http://schemas.microsoft.com/office/powerpoint/2010/main" val="128422404"/>
+      </p:ext>
+    </p:extLst>
+  </p:cSld>
+  <p:clrMapOvr>
+    <a:masterClrMapping/>
+  </p:clrMapOvr>
+</p:sld>
+</file>
+
+<file path=ppt/slides/slide24.xml><?xml version="1.0" encoding="utf-8"?>
+<p:sld xmlns:a="http://schemas.openxmlformats.org/drawingml/2006/main" xmlns:r="http://schemas.openxmlformats.org/officeDocument/2006/relationships" xmlns:p="http://schemas.openxmlformats.org/presentationml/2006/main">
+  <p:cSld>
+    <p:spTree>
+      <p:nvGrpSpPr>
+        <p:cNvPr id="1" name=""/>
+        <p:cNvGrpSpPr/>
+        <p:nvPr/>
+      </p:nvGrpSpPr>
+      <p:grpSpPr>
+        <a:xfrm>
+          <a:off x="0" y="0"/>
+          <a:ext cx="0" cy="0"/>
+          <a:chOff x="0" y="0"/>
+          <a:chExt cx="0" cy="0"/>
+        </a:xfrm>
+      </p:grpSpPr>
+      <p:sp>
+        <p:nvSpPr>
           <p:cNvPr id="5" name="Título 4"/>
           <p:cNvSpPr>
             <a:spLocks noGrp="1"/>
@@ -5586,7 +5895,7 @@
               <a:t>https://docs.unity3d.com/Manual/class-NetworkTransform.html</a:t>
             </a:r>
             <a:r>
-              <a:rPr lang="en-US" dirty="0" smtClean="0"/>
+              <a:rPr lang="en-US" dirty="0"/>
               <a:t>.</a:t>
             </a:r>
           </a:p>
@@ -5596,47 +5905,41 @@
               <a:buAutoNum type="arabicPeriod"/>
             </a:pPr>
             <a:r>
-              <a:rPr lang="en-US" dirty="0" smtClean="0"/>
+              <a:rPr lang="en-US" dirty="0"/>
               <a:t>Unity. </a:t>
             </a:r>
             <a:r>
-              <a:rPr lang="en-US" b="1" dirty="0" smtClean="0"/>
+              <a:rPr lang="en-US" b="1" dirty="0"/>
               <a:t>State Synchronization</a:t>
             </a:r>
             <a:r>
-              <a:rPr lang="en-US" dirty="0" smtClean="0"/>
+              <a:rPr lang="en-US" dirty="0"/>
               <a:t>. Documentation. </a:t>
             </a:r>
             <a:r>
-              <a:rPr lang="en-US" dirty="0" err="1" smtClean="0"/>
+              <a:rPr lang="en-US" dirty="0" err="1"/>
               <a:t>Disponível</a:t>
             </a:r>
             <a:r>
-              <a:rPr lang="en-US" dirty="0" smtClean="0"/>
+              <a:rPr lang="en-US" dirty="0"/>
               <a:t> </a:t>
             </a:r>
             <a:r>
-              <a:rPr lang="en-US" dirty="0" err="1" smtClean="0"/>
+              <a:rPr lang="en-US" dirty="0" err="1"/>
               <a:t>em</a:t>
             </a:r>
             <a:r>
-              <a:rPr lang="en-US" dirty="0" smtClean="0"/>
+              <a:rPr lang="en-US" dirty="0"/>
               <a:t>: </a:t>
             </a:r>
             <a:r>
               <a:rPr lang="pt-BR" dirty="0">
                 <a:hlinkClick r:id="rId8"/>
               </a:rPr>
-              <a:t>https://</a:t>
-            </a:r>
-            <a:r>
-              <a:rPr lang="pt-BR" dirty="0" smtClean="0">
-                <a:hlinkClick r:id="rId8"/>
-              </a:rPr>
-              <a:t>docs.unity3d.com/Manual/UNetStateSync.html</a:t>
-            </a:r>
-            <a:r>
-              <a:rPr lang="pt-BR" dirty="0" smtClean="0"/>
+              <a:t>https://docs.unity3d.com/Manual/UNetStateSync.html</a:t>
+            </a:r>
+            <a:r>
+              <a:rPr lang="pt-BR" dirty="0"/>
               <a:t>.</a:t>
             </a:r>
             <a:endParaRPr lang="en-US" dirty="0"/>

</xml_diff>

<commit_message>
Adição de um slide para explicar o método OnStartServer; e adição de detalhes nos slides sobre Local Authority e Server Authority.
</commit_message>
<xml_diff>
--- a/unity-multiplayer.pptx
+++ b/unity-multiplayer.pptx
@@ -5,7 +5,7 @@
     <p:sldMasterId id="2147483648" r:id="rId1"/>
   </p:sldMasterIdLst>
   <p:notesMasterIdLst>
-    <p:notesMasterId r:id="rId26"/>
+    <p:notesMasterId r:id="rId27"/>
   </p:notesMasterIdLst>
   <p:sldIdLst>
     <p:sldId id="256" r:id="rId2"/>
@@ -24,14 +24,15 @@
     <p:sldId id="365" r:id="rId15"/>
     <p:sldId id="366" r:id="rId16"/>
     <p:sldId id="367" r:id="rId17"/>
-    <p:sldId id="368" r:id="rId18"/>
-    <p:sldId id="369" r:id="rId19"/>
-    <p:sldId id="370" r:id="rId20"/>
-    <p:sldId id="371" r:id="rId21"/>
-    <p:sldId id="372" r:id="rId22"/>
-    <p:sldId id="373" r:id="rId23"/>
-    <p:sldId id="357" r:id="rId24"/>
-    <p:sldId id="352" r:id="rId25"/>
+    <p:sldId id="374" r:id="rId18"/>
+    <p:sldId id="368" r:id="rId19"/>
+    <p:sldId id="369" r:id="rId20"/>
+    <p:sldId id="370" r:id="rId21"/>
+    <p:sldId id="371" r:id="rId22"/>
+    <p:sldId id="372" r:id="rId23"/>
+    <p:sldId id="373" r:id="rId24"/>
+    <p:sldId id="357" r:id="rId25"/>
+    <p:sldId id="352" r:id="rId26"/>
   </p:sldIdLst>
   <p:sldSz cx="12192000" cy="6858000"/>
   <p:notesSz cx="6858000" cy="9144000"/>
@@ -220,7 +221,7 @@
           <a:p>
             <a:fld id="{94D3EB41-CF60-4C9F-BD83-AE56FA0945EB}" type="datetimeFigureOut">
               <a:rPr lang="pt-BR" smtClean="0"/>
-              <a:t>11/09/2019</a:t>
+              <a:t>12/09/2019</a:t>
             </a:fld>
             <a:endParaRPr lang="pt-BR"/>
           </a:p>
@@ -730,7 +731,7 @@
           <a:p>
             <a:fld id="{9642BF85-54FF-46CE-B398-87F998CFD60B}" type="datetimeFigureOut">
               <a:rPr lang="pt-BR" smtClean="0"/>
-              <a:t>11/09/2019</a:t>
+              <a:t>12/09/2019</a:t>
             </a:fld>
             <a:endParaRPr lang="pt-BR"/>
           </a:p>
@@ -898,7 +899,7 @@
           <a:p>
             <a:fld id="{9642BF85-54FF-46CE-B398-87F998CFD60B}" type="datetimeFigureOut">
               <a:rPr lang="pt-BR" smtClean="0"/>
-              <a:t>11/09/2019</a:t>
+              <a:t>12/09/2019</a:t>
             </a:fld>
             <a:endParaRPr lang="pt-BR"/>
           </a:p>
@@ -1076,7 +1077,7 @@
           <a:p>
             <a:fld id="{9642BF85-54FF-46CE-B398-87F998CFD60B}" type="datetimeFigureOut">
               <a:rPr lang="pt-BR" smtClean="0"/>
-              <a:t>11/09/2019</a:t>
+              <a:t>12/09/2019</a:t>
             </a:fld>
             <a:endParaRPr lang="pt-BR"/>
           </a:p>
@@ -1413,7 +1414,7 @@
           <a:p>
             <a:fld id="{9642BF85-54FF-46CE-B398-87F998CFD60B}" type="datetimeFigureOut">
               <a:rPr lang="pt-BR" smtClean="0"/>
-              <a:t>11/09/2019</a:t>
+              <a:t>12/09/2019</a:t>
             </a:fld>
             <a:endParaRPr lang="pt-BR"/>
           </a:p>
@@ -1684,7 +1685,7 @@
           <a:p>
             <a:fld id="{9642BF85-54FF-46CE-B398-87F998CFD60B}" type="datetimeFigureOut">
               <a:rPr lang="pt-BR" smtClean="0"/>
-              <a:t>11/09/2019</a:t>
+              <a:t>12/09/2019</a:t>
             </a:fld>
             <a:endParaRPr lang="pt-BR"/>
           </a:p>
@@ -1930,7 +1931,7 @@
           <a:p>
             <a:fld id="{9642BF85-54FF-46CE-B398-87F998CFD60B}" type="datetimeFigureOut">
               <a:rPr lang="pt-BR" smtClean="0"/>
-              <a:t>11/09/2019</a:t>
+              <a:t>12/09/2019</a:t>
             </a:fld>
             <a:endParaRPr lang="pt-BR"/>
           </a:p>
@@ -2294,7 +2295,7 @@
           <a:p>
             <a:fld id="{9642BF85-54FF-46CE-B398-87F998CFD60B}" type="datetimeFigureOut">
               <a:rPr lang="pt-BR" smtClean="0"/>
-              <a:t>11/09/2019</a:t>
+              <a:t>12/09/2019</a:t>
             </a:fld>
             <a:endParaRPr lang="pt-BR"/>
           </a:p>
@@ -2428,7 +2429,7 @@
           <a:p>
             <a:fld id="{9642BF85-54FF-46CE-B398-87F998CFD60B}" type="datetimeFigureOut">
               <a:rPr lang="pt-BR" smtClean="0"/>
-              <a:t>11/09/2019</a:t>
+              <a:t>12/09/2019</a:t>
             </a:fld>
             <a:endParaRPr lang="pt-BR"/>
           </a:p>
@@ -2523,7 +2524,7 @@
           <a:p>
             <a:fld id="{9642BF85-54FF-46CE-B398-87F998CFD60B}" type="datetimeFigureOut">
               <a:rPr lang="pt-BR" smtClean="0"/>
-              <a:t>11/09/2019</a:t>
+              <a:t>12/09/2019</a:t>
             </a:fld>
             <a:endParaRPr lang="pt-BR"/>
           </a:p>
@@ -2798,7 +2799,7 @@
           <a:p>
             <a:fld id="{9642BF85-54FF-46CE-B398-87F998CFD60B}" type="datetimeFigureOut">
               <a:rPr lang="pt-BR" smtClean="0"/>
-              <a:t>11/09/2019</a:t>
+              <a:t>12/09/2019</a:t>
             </a:fld>
             <a:endParaRPr lang="pt-BR"/>
           </a:p>
@@ -3050,7 +3051,7 @@
           <a:p>
             <a:fld id="{9642BF85-54FF-46CE-B398-87F998CFD60B}" type="datetimeFigureOut">
               <a:rPr lang="pt-BR" smtClean="0"/>
-              <a:t>11/09/2019</a:t>
+              <a:t>12/09/2019</a:t>
             </a:fld>
             <a:endParaRPr lang="pt-BR"/>
           </a:p>
@@ -3270,7 +3271,7 @@
           <a:p>
             <a:fld id="{9642BF85-54FF-46CE-B398-87F998CFD60B}" type="datetimeFigureOut">
               <a:rPr lang="pt-BR" smtClean="0"/>
-              <a:t>11/09/2019</a:t>
+              <a:t>12/09/2019</a:t>
             </a:fld>
             <a:endParaRPr lang="pt-BR"/>
           </a:p>
@@ -4060,6 +4061,56 @@
               <a:t> que não são players.</a:t>
             </a:r>
           </a:p>
+          <a:p>
+            <a:r>
+              <a:rPr lang="pt-BR" dirty="0" err="1"/>
+              <a:t>GameObjects</a:t>
+            </a:r>
+            <a:r>
+              <a:rPr lang="pt-BR" dirty="0"/>
+              <a:t> com </a:t>
+            </a:r>
+            <a:r>
+              <a:rPr lang="pt-BR" b="1" dirty="0"/>
+              <a:t>Server </a:t>
+            </a:r>
+            <a:r>
+              <a:rPr lang="pt-BR" b="1" dirty="0" err="1"/>
+              <a:t>Authority</a:t>
+            </a:r>
+            <a:r>
+              <a:rPr lang="pt-BR" dirty="0"/>
+              <a:t> (</a:t>
+            </a:r>
+            <a:r>
+              <a:rPr lang="pt-BR" b="1" dirty="0"/>
+              <a:t>Server </a:t>
+            </a:r>
+            <a:r>
+              <a:rPr lang="pt-BR" b="1" dirty="0" err="1"/>
+              <a:t>Only</a:t>
+            </a:r>
+            <a:r>
+              <a:rPr lang="pt-BR" b="1" dirty="0"/>
+              <a:t> marcado </a:t>
+            </a:r>
+            <a:r>
+              <a:rPr lang="pt-BR" dirty="0"/>
+              <a:t>no componente </a:t>
+            </a:r>
+            <a:r>
+              <a:rPr lang="pt-BR" b="1" dirty="0"/>
+              <a:t>Network </a:t>
+            </a:r>
+            <a:r>
+              <a:rPr lang="pt-BR" b="1" dirty="0" err="1"/>
+              <a:t>Identity</a:t>
+            </a:r>
+            <a:r>
+              <a:rPr lang="pt-BR" dirty="0"/>
+              <a:t>) ficam ativos apenas no servidor.</a:t>
+            </a:r>
+          </a:p>
         </p:txBody>
       </p:sp>
     </p:spTree>
@@ -4168,6 +4219,56 @@
               <a:t> em rede.</a:t>
             </a:r>
           </a:p>
+          <a:p>
+            <a:r>
+              <a:rPr lang="pt-BR" dirty="0" err="1"/>
+              <a:t>GameObjects</a:t>
+            </a:r>
+            <a:r>
+              <a:rPr lang="pt-BR" dirty="0"/>
+              <a:t> com </a:t>
+            </a:r>
+            <a:r>
+              <a:rPr lang="pt-BR" b="1" dirty="0"/>
+              <a:t>Local </a:t>
+            </a:r>
+            <a:r>
+              <a:rPr lang="pt-BR" b="1" dirty="0" err="1"/>
+              <a:t>Authority</a:t>
+            </a:r>
+            <a:r>
+              <a:rPr lang="pt-BR" dirty="0"/>
+              <a:t> (</a:t>
+            </a:r>
+            <a:r>
+              <a:rPr lang="pt-BR" b="1" dirty="0"/>
+              <a:t>Local Player </a:t>
+            </a:r>
+            <a:r>
+              <a:rPr lang="pt-BR" b="1" dirty="0" err="1"/>
+              <a:t>Authority</a:t>
+            </a:r>
+            <a:r>
+              <a:rPr lang="pt-BR" b="1" dirty="0"/>
+              <a:t> marcado </a:t>
+            </a:r>
+            <a:r>
+              <a:rPr lang="pt-BR" dirty="0"/>
+              <a:t>no componente </a:t>
+            </a:r>
+            <a:r>
+              <a:rPr lang="pt-BR" b="1" dirty="0"/>
+              <a:t>Network </a:t>
+            </a:r>
+            <a:r>
+              <a:rPr lang="pt-BR" b="1" dirty="0" err="1"/>
+              <a:t>Identity</a:t>
+            </a:r>
+            <a:r>
+              <a:rPr lang="pt-BR" dirty="0"/>
+              <a:t>).</a:t>
+            </a:r>
+          </a:p>
         </p:txBody>
       </p:sp>
     </p:spTree>
@@ -4577,11 +4678,11 @@
           <a:p>
             <a:r>
               <a:rPr lang="pt-BR" dirty="0"/>
-              <a:t>Atributo </a:t>
+              <a:t>Método </a:t>
             </a:r>
             <a:r>
               <a:rPr lang="pt-BR" dirty="0" err="1"/>
-              <a:t>Command</a:t>
+              <a:t>OnStartServer</a:t>
             </a:r>
             <a:endParaRPr lang="pt-BR" dirty="0"/>
           </a:p>
@@ -4600,13 +4701,13 @@
         <p:spPr/>
         <p:txBody>
           <a:bodyPr>
-            <a:normAutofit lnSpcReduction="10000"/>
+            <a:normAutofit/>
           </a:bodyPr>
           <a:lstStyle/>
           <a:p>
             <a:r>
               <a:rPr lang="pt-BR" dirty="0"/>
-              <a:t>Este atributo pode ser colocado em métodos da classe </a:t>
+              <a:t>É invocado por objetos </a:t>
             </a:r>
             <a:r>
               <a:rPr lang="pt-BR" b="1" dirty="0" err="1"/>
@@ -4614,43 +4715,37 @@
             </a:r>
             <a:r>
               <a:rPr lang="pt-BR" dirty="0"/>
-              <a:t> para permitir que sejam invocados no servidor por meio de uma mensagem enviada por um cliente.</a:t>
-            </a:r>
-          </a:p>
-          <a:p>
-            <a:r>
-              <a:rPr lang="pt-BR" dirty="0"/>
-              <a:t>Métodos </a:t>
+              <a:t> quando eles se tornam ativos no servidor.</a:t>
+            </a:r>
+          </a:p>
+          <a:p>
+            <a:r>
+              <a:rPr lang="pt-BR" dirty="0"/>
+              <a:t>Eles podem ser acionados pelo método </a:t>
+            </a:r>
+            <a:r>
+              <a:rPr lang="pt-BR" b="1" dirty="0" err="1"/>
+              <a:t>NetworkServer.Listen</a:t>
             </a:r>
             <a:r>
               <a:rPr lang="pt-BR" b="1" dirty="0"/>
-              <a:t>[</a:t>
+              <a:t>()</a:t>
+            </a:r>
+            <a:r>
+              <a:rPr lang="pt-BR" dirty="0"/>
+              <a:t> para objetos na cena ou pelo método </a:t>
             </a:r>
             <a:r>
               <a:rPr lang="pt-BR" b="1" dirty="0" err="1"/>
-              <a:t>Command</a:t>
+              <a:t>NetworServer.Spawn</a:t>
             </a:r>
             <a:r>
               <a:rPr lang="pt-BR" b="1" dirty="0"/>
-              <a:t>]</a:t>
-            </a:r>
-            <a:r>
-              <a:rPr lang="pt-BR" dirty="0"/>
-              <a:t> são invocadas no objeto player associado a conexão. Os argumentos do comando chamado são serializados na rede e o método no servidor é invocado com os mesmos valores. </a:t>
-            </a:r>
-          </a:p>
-          <a:p>
-            <a:r>
-              <a:rPr lang="pt-BR" dirty="0"/>
-              <a:t>O nome destes métodos devem iniciar com o prefixo “</a:t>
-            </a:r>
-            <a:r>
-              <a:rPr lang="pt-BR" b="1" dirty="0" err="1"/>
-              <a:t>Cmd</a:t>
-            </a:r>
-            <a:r>
-              <a:rPr lang="pt-BR" dirty="0"/>
-              <a:t>”. </a:t>
+              <a:t>()</a:t>
+            </a:r>
+            <a:r>
+              <a:rPr lang="pt-BR" dirty="0"/>
+              <a:t> para objetos criados dinamicamente. </a:t>
             </a:r>
           </a:p>
         </p:txBody>
@@ -4658,7 +4753,7 @@
     </p:spTree>
     <p:extLst>
       <p:ext uri="{BB962C8B-B14F-4D97-AF65-F5344CB8AC3E}">
-        <p14:creationId xmlns:p14="http://schemas.microsoft.com/office/powerpoint/2010/main" val="2849734184"/>
+        <p14:creationId xmlns:p14="http://schemas.microsoft.com/office/powerpoint/2010/main" val="1587846101"/>
       </p:ext>
     </p:extLst>
   </p:cSld>
@@ -4687,7 +4782,7 @@
       </p:grpSpPr>
       <p:sp>
         <p:nvSpPr>
-          <p:cNvPr id="2" name="Título 1"/>
+          <p:cNvPr id="5" name="Título 4"/>
           <p:cNvSpPr>
             <a:spLocks noGrp="1"/>
           </p:cNvSpPr>
@@ -4702,14 +4797,19 @@
           <a:p>
             <a:r>
               <a:rPr lang="pt-BR" dirty="0"/>
-              <a:t>Sincronização de Estado</a:t>
-            </a:r>
-          </a:p>
-        </p:txBody>
-      </p:sp>
-      <p:sp>
-        <p:nvSpPr>
-          <p:cNvPr id="3" name="Espaço Reservado para Conteúdo 2"/>
+              <a:t>Atributo </a:t>
+            </a:r>
+            <a:r>
+              <a:rPr lang="pt-BR" dirty="0" err="1"/>
+              <a:t>Command</a:t>
+            </a:r>
+            <a:endParaRPr lang="pt-BR" dirty="0"/>
+          </a:p>
+        </p:txBody>
+      </p:sp>
+      <p:sp>
+        <p:nvSpPr>
+          <p:cNvPr id="6" name="Espaço Reservado para Conteúdo 5"/>
           <p:cNvSpPr>
             <a:spLocks noGrp="1"/>
           </p:cNvSpPr>
@@ -4726,43 +4826,51 @@
           <a:p>
             <a:r>
               <a:rPr lang="pt-BR" dirty="0"/>
-              <a:t>Refere-se a sincronização de valores tais como inteiros, decimais, texto e booleanos em scripts dos </a:t>
-            </a:r>
-            <a:r>
-              <a:rPr lang="pt-BR" dirty="0" err="1"/>
-              <a:t>GameObjects</a:t>
-            </a:r>
-            <a:r>
-              <a:rPr lang="pt-BR" dirty="0"/>
-              <a:t> em rede.</a:t>
-            </a:r>
-          </a:p>
-          <a:p>
-            <a:r>
-              <a:rPr lang="pt-BR" dirty="0"/>
-              <a:t>A sincronização de estado é feita </a:t>
+              <a:t>Este atributo pode ser colocado em métodos da classe </a:t>
+            </a:r>
+            <a:r>
+              <a:rPr lang="pt-BR" b="1" dirty="0" err="1"/>
+              <a:t>NetworkBehaviour</a:t>
+            </a:r>
+            <a:r>
+              <a:rPr lang="pt-BR" dirty="0"/>
+              <a:t> para permitir que sejam invocados no servidor por meio de uma mensagem enviada por um cliente.</a:t>
+            </a:r>
+          </a:p>
+          <a:p>
+            <a:r>
+              <a:rPr lang="pt-BR" dirty="0"/>
+              <a:t>Métodos </a:t>
             </a:r>
             <a:r>
               <a:rPr lang="pt-BR" b="1" dirty="0"/>
-              <a:t>do servidor para os clientes remotos</a:t>
-            </a:r>
-            <a:r>
-              <a:rPr lang="pt-BR" dirty="0"/>
-              <a:t>.</a:t>
-            </a:r>
-          </a:p>
-          <a:p>
-            <a:r>
-              <a:rPr lang="pt-BR" dirty="0"/>
-              <a:t>Os dados não são sincronizados na direção oposta – dos clientes remotos para o servidor. Para isso é necessário usar </a:t>
+              <a:t>[</a:t>
             </a:r>
             <a:r>
               <a:rPr lang="pt-BR" b="1" dirty="0" err="1"/>
-              <a:t>Commands</a:t>
-            </a:r>
-            <a:r>
-              <a:rPr lang="pt-BR" dirty="0"/>
-              <a:t>.</a:t>
+              <a:t>Command</a:t>
+            </a:r>
+            <a:r>
+              <a:rPr lang="pt-BR" b="1" dirty="0"/>
+              <a:t>]</a:t>
+            </a:r>
+            <a:r>
+              <a:rPr lang="pt-BR" dirty="0"/>
+              <a:t> são invocadas no objeto player associado a conexão. Os argumentos do comando chamado são serializados na rede e o método no servidor é invocado com os mesmos valores. </a:t>
+            </a:r>
+          </a:p>
+          <a:p>
+            <a:r>
+              <a:rPr lang="pt-BR" dirty="0"/>
+              <a:t>O nome destes métodos devem iniciar com o prefixo “</a:t>
+            </a:r>
+            <a:r>
+              <a:rPr lang="pt-BR" b="1" dirty="0" err="1"/>
+              <a:t>Cmd</a:t>
+            </a:r>
+            <a:r>
+              <a:rPr lang="pt-BR" dirty="0"/>
+              <a:t>”. </a:t>
             </a:r>
           </a:p>
         </p:txBody>
@@ -4770,7 +4878,7 @@
     </p:spTree>
     <p:extLst>
       <p:ext uri="{BB962C8B-B14F-4D97-AF65-F5344CB8AC3E}">
-        <p14:creationId xmlns:p14="http://schemas.microsoft.com/office/powerpoint/2010/main" val="1974983137"/>
+        <p14:creationId xmlns:p14="http://schemas.microsoft.com/office/powerpoint/2010/main" val="2849734184"/>
       </p:ext>
     </p:extLst>
   </p:cSld>
@@ -4814,70 +4922,67 @@
           <a:p>
             <a:r>
               <a:rPr lang="pt-BR" dirty="0"/>
-              <a:t>Sincronização de Estado - </a:t>
+              <a:t>Sincronização de Estado</a:t>
+            </a:r>
+          </a:p>
+        </p:txBody>
+      </p:sp>
+      <p:sp>
+        <p:nvSpPr>
+          <p:cNvPr id="3" name="Espaço Reservado para Conteúdo 2"/>
+          <p:cNvSpPr>
+            <a:spLocks noGrp="1"/>
+          </p:cNvSpPr>
+          <p:nvPr>
+            <p:ph idx="1"/>
+          </p:nvPr>
+        </p:nvSpPr>
+        <p:spPr/>
+        <p:txBody>
+          <a:bodyPr>
+            <a:normAutofit lnSpcReduction="10000"/>
+          </a:bodyPr>
+          <a:lstStyle/>
+          <a:p>
+            <a:r>
+              <a:rPr lang="pt-BR" dirty="0"/>
+              <a:t>Refere-se a sincronização de valores tais como inteiros, decimais, texto e booleanos em scripts dos </a:t>
             </a:r>
             <a:r>
               <a:rPr lang="pt-BR" dirty="0" err="1"/>
-              <a:t>SyncVars</a:t>
-            </a:r>
-            <a:endParaRPr lang="pt-BR" dirty="0"/>
-          </a:p>
-        </p:txBody>
-      </p:sp>
-      <p:sp>
-        <p:nvSpPr>
-          <p:cNvPr id="3" name="Espaço Reservado para Conteúdo 2"/>
-          <p:cNvSpPr>
-            <a:spLocks noGrp="1"/>
-          </p:cNvSpPr>
-          <p:nvPr>
-            <p:ph idx="1"/>
-          </p:nvPr>
-        </p:nvSpPr>
-        <p:spPr/>
-        <p:txBody>
-          <a:bodyPr>
-            <a:normAutofit/>
-          </a:bodyPr>
-          <a:lstStyle/>
-          <a:p>
-            <a:r>
-              <a:rPr lang="pt-BR" dirty="0" err="1"/>
-              <a:t>SyncVars</a:t>
-            </a:r>
-            <a:r>
-              <a:rPr lang="pt-BR" dirty="0"/>
-              <a:t> são variáveis de script herdadas de </a:t>
+              <a:t>GameObjects</a:t>
+            </a:r>
+            <a:r>
+              <a:rPr lang="pt-BR" dirty="0"/>
+              <a:t> em rede.</a:t>
+            </a:r>
+          </a:p>
+          <a:p>
+            <a:r>
+              <a:rPr lang="pt-BR" dirty="0"/>
+              <a:t>A sincronização de estado é feita </a:t>
+            </a:r>
+            <a:r>
+              <a:rPr lang="pt-BR" b="1" dirty="0"/>
+              <a:t>do servidor para os clientes remotos</a:t>
+            </a:r>
+            <a:r>
+              <a:rPr lang="pt-BR" dirty="0"/>
+              <a:t>.</a:t>
+            </a:r>
+          </a:p>
+          <a:p>
+            <a:r>
+              <a:rPr lang="pt-BR" dirty="0"/>
+              <a:t>Os dados não são sincronizados na direção oposta – dos clientes remotos para o servidor. Para isso é necessário usar </a:t>
             </a:r>
             <a:r>
               <a:rPr lang="pt-BR" b="1" dirty="0" err="1"/>
-              <a:t>NetworkBehaviour</a:t>
-            </a:r>
-            <a:r>
-              <a:rPr lang="pt-BR" dirty="0"/>
-              <a:t> que são sincronizadas do servidor para os clientes.</a:t>
-            </a:r>
-          </a:p>
-          <a:p>
-            <a:r>
-              <a:rPr lang="pt-BR" dirty="0"/>
-              <a:t>Quando um </a:t>
-            </a:r>
-            <a:r>
-              <a:rPr lang="pt-BR" dirty="0" err="1"/>
-              <a:t>GameObject</a:t>
-            </a:r>
-            <a:r>
-              <a:rPr lang="pt-BR" dirty="0"/>
-              <a:t> é instanciado, ou um novo jogador entra no jogo em andamento, eles recebem o estado mais recente de todas as </a:t>
-            </a:r>
-            <a:r>
-              <a:rPr lang="pt-BR" dirty="0" err="1"/>
-              <a:t>SyncVars</a:t>
-            </a:r>
-            <a:r>
-              <a:rPr lang="pt-BR" dirty="0"/>
-              <a:t> dos objetos em rede que são visíveis a eles.</a:t>
+              <a:t>Commands</a:t>
+            </a:r>
+            <a:r>
+              <a:rPr lang="pt-BR" dirty="0"/>
+              <a:t>.</a:t>
             </a:r>
           </a:p>
         </p:txBody>
@@ -4885,7 +4990,7 @@
     </p:spTree>
     <p:extLst>
       <p:ext uri="{BB962C8B-B14F-4D97-AF65-F5344CB8AC3E}">
-        <p14:creationId xmlns:p14="http://schemas.microsoft.com/office/powerpoint/2010/main" val="1030447914"/>
+        <p14:creationId xmlns:p14="http://schemas.microsoft.com/office/powerpoint/2010/main" val="1974983137"/>
       </p:ext>
     </p:extLst>
   </p:cSld>
@@ -5069,38 +5174,42 @@
           <a:lstStyle/>
           <a:p>
             <a:r>
-              <a:rPr lang="pt-BR" dirty="0"/>
-              <a:t>É necessário usar o atributo [</a:t>
-            </a:r>
-            <a:r>
               <a:rPr lang="pt-BR" dirty="0" err="1"/>
-              <a:t>SyncVar</a:t>
-            </a:r>
-            <a:r>
-              <a:rPr lang="pt-BR" dirty="0"/>
-              <a:t>] para especificar quais variáveis no script você quer sincronizar.</a:t>
-            </a:r>
-          </a:p>
-          <a:p>
-            <a:r>
-              <a:rPr lang="pt-BR" dirty="0"/>
-              <a:t>O servidor envia atualizações </a:t>
+              <a:t>SyncVars</a:t>
+            </a:r>
+            <a:r>
+              <a:rPr lang="pt-BR" dirty="0"/>
+              <a:t> são variáveis de script herdadas de </a:t>
+            </a:r>
+            <a:r>
+              <a:rPr lang="pt-BR" b="1" dirty="0" err="1"/>
+              <a:t>NetworkBehaviour</a:t>
+            </a:r>
+            <a:r>
+              <a:rPr lang="pt-BR" dirty="0"/>
+              <a:t> que são sincronizadas do servidor para os clientes.</a:t>
+            </a:r>
+          </a:p>
+          <a:p>
+            <a:r>
+              <a:rPr lang="pt-BR" dirty="0"/>
+              <a:t>Quando um </a:t>
             </a:r>
             <a:r>
               <a:rPr lang="pt-BR" dirty="0" err="1"/>
-              <a:t>SyncVar</a:t>
-            </a:r>
-            <a:r>
-              <a:rPr lang="pt-BR" dirty="0"/>
-              <a:t> automaticamente quando o valor de uma variável </a:t>
+              <a:t>GameObject</a:t>
+            </a:r>
+            <a:r>
+              <a:rPr lang="pt-BR" dirty="0"/>
+              <a:t> é instanciado, ou um novo jogador entra no jogo em andamento, eles recebem o estado mais recente de todas as </a:t>
             </a:r>
             <a:r>
               <a:rPr lang="pt-BR" dirty="0" err="1"/>
-              <a:t>SyncVar</a:t>
-            </a:r>
-            <a:r>
-              <a:rPr lang="pt-BR" dirty="0"/>
-              <a:t> é alterado.</a:t>
+              <a:t>SyncVars</a:t>
+            </a:r>
+            <a:r>
+              <a:rPr lang="pt-BR" dirty="0"/>
+              <a:t> dos objetos em rede que são visíveis a eles.</a:t>
             </a:r>
           </a:p>
         </p:txBody>
@@ -5108,7 +5217,7 @@
     </p:spTree>
     <p:extLst>
       <p:ext uri="{BB962C8B-B14F-4D97-AF65-F5344CB8AC3E}">
-        <p14:creationId xmlns:p14="http://schemas.microsoft.com/office/powerpoint/2010/main" val="47902966"/>
+        <p14:creationId xmlns:p14="http://schemas.microsoft.com/office/powerpoint/2010/main" val="1030447914"/>
       </p:ext>
     </p:extLst>
   </p:cSld>
@@ -5181,26 +5290,8 @@
           <a:p>
             <a:r>
               <a:rPr lang="pt-BR" dirty="0"/>
-              <a:t>O atributo </a:t>
-            </a:r>
-            <a:r>
-              <a:rPr lang="pt-BR" b="1" dirty="0" err="1"/>
-              <a:t>hook</a:t>
-            </a:r>
-            <a:r>
-              <a:rPr lang="pt-BR" dirty="0"/>
-              <a:t> pode ser usado para especificar um método a ser chamado quando a variável </a:t>
-            </a:r>
-            <a:r>
-              <a:rPr lang="pt-BR" b="1" dirty="0" err="1"/>
-              <a:t>sync</a:t>
-            </a:r>
-            <a:r>
-              <a:rPr lang="pt-BR" dirty="0"/>
-              <a:t> mudar de valor no cliente:</a:t>
-            </a:r>
-          </a:p>
-          <a:p>
+              <a:t>É necessário usar o atributo </a:t>
+            </a:r>
             <a:r>
               <a:rPr lang="pt-BR" b="1" dirty="0"/>
               <a:t>[</a:t>
@@ -5211,27 +5302,33 @@
             </a:r>
             <a:r>
               <a:rPr lang="pt-BR" b="1" dirty="0"/>
-              <a:t> (</a:t>
-            </a:r>
-            <a:r>
-              <a:rPr lang="pt-BR" b="1" dirty="0" err="1"/>
-              <a:t>hook</a:t>
-            </a:r>
-            <a:r>
-              <a:rPr lang="pt-BR" b="1" dirty="0"/>
-              <a:t> = “</a:t>
-            </a:r>
-            <a:r>
-              <a:rPr lang="pt-BR" b="1" i="1" dirty="0"/>
-              <a:t>nome-do-</a:t>
-            </a:r>
-            <a:r>
-              <a:rPr lang="pt-BR" b="1" i="1" dirty="0" err="1"/>
-              <a:t>metodo</a:t>
-            </a:r>
-            <a:r>
-              <a:rPr lang="pt-BR" b="1" dirty="0"/>
-              <a:t>”)]</a:t>
+              <a:t>]</a:t>
+            </a:r>
+            <a:r>
+              <a:rPr lang="pt-BR" dirty="0"/>
+              <a:t> para especificar quais variáveis no script você quer sincronizar.</a:t>
+            </a:r>
+          </a:p>
+          <a:p>
+            <a:r>
+              <a:rPr lang="pt-BR" dirty="0"/>
+              <a:t>O servidor envia atualizações </a:t>
+            </a:r>
+            <a:r>
+              <a:rPr lang="pt-BR" dirty="0" err="1"/>
+              <a:t>SyncVar</a:t>
+            </a:r>
+            <a:r>
+              <a:rPr lang="pt-BR" dirty="0"/>
+              <a:t> automaticamente quando o valor de uma variável </a:t>
+            </a:r>
+            <a:r>
+              <a:rPr lang="pt-BR" dirty="0" err="1"/>
+              <a:t>SyncVar</a:t>
+            </a:r>
+            <a:r>
+              <a:rPr lang="pt-BR" dirty="0"/>
+              <a:t> é alterado.</a:t>
             </a:r>
           </a:p>
         </p:txBody>
@@ -5239,7 +5336,7 @@
     </p:spTree>
     <p:extLst>
       <p:ext uri="{BB962C8B-B14F-4D97-AF65-F5344CB8AC3E}">
-        <p14:creationId xmlns:p14="http://schemas.microsoft.com/office/powerpoint/2010/main" val="3758710000"/>
+        <p14:creationId xmlns:p14="http://schemas.microsoft.com/office/powerpoint/2010/main" val="47902966"/>
       </p:ext>
     </p:extLst>
   </p:cSld>
@@ -5283,11 +5380,11 @@
           <a:p>
             <a:r>
               <a:rPr lang="pt-BR" dirty="0"/>
-              <a:t>Atributo </a:t>
+              <a:t>Sincronização de Estado - </a:t>
             </a:r>
             <a:r>
               <a:rPr lang="pt-BR" dirty="0" err="1"/>
-              <a:t>ClientRPC</a:t>
+              <a:t>SyncVars</a:t>
             </a:r>
             <a:endParaRPr lang="pt-BR" dirty="0"/>
           </a:p>
@@ -5306,90 +5403,71 @@
         <p:spPr/>
         <p:txBody>
           <a:bodyPr>
-            <a:normAutofit lnSpcReduction="10000"/>
+            <a:normAutofit/>
           </a:bodyPr>
           <a:lstStyle/>
           <a:p>
             <a:r>
               <a:rPr lang="pt-BR" dirty="0"/>
-              <a:t>Este atributo pode ser colocado em métodos da classe </a:t>
+              <a:t>O atributo </a:t>
             </a:r>
             <a:r>
               <a:rPr lang="pt-BR" b="1" dirty="0" err="1"/>
-              <a:t>NetworkBehaviour</a:t>
-            </a:r>
-            <a:r>
-              <a:rPr lang="pt-BR" dirty="0"/>
-              <a:t> para permitir que sejam invocados no clientes a partir de um servidor.</a:t>
-            </a:r>
-          </a:p>
-          <a:p>
-            <a:r>
-              <a:rPr lang="pt-BR" dirty="0"/>
-              <a:t>Métodos </a:t>
-            </a:r>
+              <a:t>hook</a:t>
+            </a:r>
+            <a:r>
+              <a:rPr lang="pt-BR" dirty="0"/>
+              <a:t> pode ser usado para especificar um método a ser chamado quando a variável </a:t>
+            </a:r>
+            <a:r>
+              <a:rPr lang="pt-BR" b="1" dirty="0" err="1"/>
+              <a:t>sync</a:t>
+            </a:r>
+            <a:r>
+              <a:rPr lang="pt-BR" dirty="0"/>
+              <a:t> mudar de valor no cliente:</a:t>
+            </a:r>
+          </a:p>
+          <a:p>
             <a:r>
               <a:rPr lang="pt-BR" b="1" dirty="0"/>
               <a:t>[</a:t>
             </a:r>
             <a:r>
               <a:rPr lang="pt-BR" b="1" dirty="0" err="1"/>
-              <a:t>ClientRPC</a:t>
+              <a:t>SyncVar</a:t>
             </a:r>
             <a:r>
               <a:rPr lang="pt-BR" b="1" dirty="0"/>
-              <a:t>]</a:t>
-            </a:r>
-            <a:r>
-              <a:rPr lang="pt-BR" dirty="0"/>
-              <a:t> são chamados por scripts em servidores </a:t>
-            </a:r>
-            <a:r>
-              <a:rPr lang="pt-BR" dirty="0" err="1"/>
-              <a:t>Unity</a:t>
-            </a:r>
-            <a:r>
-              <a:rPr lang="pt-BR" dirty="0"/>
-              <a:t> Multiplayer, que são invocadas nos </a:t>
-            </a:r>
-            <a:r>
-              <a:rPr lang="pt-BR" dirty="0" err="1"/>
-              <a:t>GameObjects</a:t>
-            </a:r>
-            <a:r>
-              <a:rPr lang="pt-BR" dirty="0"/>
-              <a:t> correspondentes nos clientes conectados ao servidor.</a:t>
-            </a:r>
-          </a:p>
-          <a:p>
-            <a:r>
-              <a:rPr lang="pt-BR" dirty="0"/>
-              <a:t>O nome destes métodos devem iniciar com o prefixo “</a:t>
+              <a:t> (</a:t>
             </a:r>
             <a:r>
               <a:rPr lang="pt-BR" b="1" dirty="0" err="1"/>
-              <a:t>Rpc</a:t>
-            </a:r>
-            <a:r>
-              <a:rPr lang="pt-BR" dirty="0"/>
-              <a:t>” </a:t>
-            </a:r>
-            <a:r>
-              <a:rPr lang="pt-BR"/>
-              <a:t>e eles não </a:t>
-            </a:r>
-            <a:r>
-              <a:rPr lang="pt-BR" dirty="0"/>
-              <a:t>podem ser estáticos.</a:t>
-            </a:r>
-            <a:endParaRPr lang="pt-BR" b="1" dirty="0"/>
+              <a:t>hook</a:t>
+            </a:r>
+            <a:r>
+              <a:rPr lang="pt-BR" b="1" dirty="0"/>
+              <a:t> = “</a:t>
+            </a:r>
+            <a:r>
+              <a:rPr lang="pt-BR" b="1" i="1" dirty="0"/>
+              <a:t>nome-do-</a:t>
+            </a:r>
+            <a:r>
+              <a:rPr lang="pt-BR" b="1" i="1" dirty="0" err="1"/>
+              <a:t>metodo</a:t>
+            </a:r>
+            <a:r>
+              <a:rPr lang="pt-BR" b="1" dirty="0"/>
+              <a:t>”)]</a:t>
+            </a:r>
           </a:p>
         </p:txBody>
       </p:sp>
     </p:spTree>
     <p:extLst>
       <p:ext uri="{BB962C8B-B14F-4D97-AF65-F5344CB8AC3E}">
-        <p14:creationId xmlns:p14="http://schemas.microsoft.com/office/powerpoint/2010/main" val="615486480"/>
+        <p14:creationId xmlns:p14="http://schemas.microsoft.com/office/powerpoint/2010/main" val="3758710000"/>
       </p:ext>
     </p:extLst>
   </p:cSld>
@@ -5418,6 +5496,148 @@
       </p:grpSpPr>
       <p:sp>
         <p:nvSpPr>
+          <p:cNvPr id="2" name="Título 1"/>
+          <p:cNvSpPr>
+            <a:spLocks noGrp="1"/>
+          </p:cNvSpPr>
+          <p:nvPr>
+            <p:ph type="title"/>
+          </p:nvPr>
+        </p:nvSpPr>
+        <p:spPr/>
+        <p:txBody>
+          <a:bodyPr/>
+          <a:lstStyle/>
+          <a:p>
+            <a:r>
+              <a:rPr lang="pt-BR" dirty="0"/>
+              <a:t>Atributo </a:t>
+            </a:r>
+            <a:r>
+              <a:rPr lang="pt-BR" dirty="0" err="1"/>
+              <a:t>ClientRPC</a:t>
+            </a:r>
+            <a:endParaRPr lang="pt-BR" dirty="0"/>
+          </a:p>
+        </p:txBody>
+      </p:sp>
+      <p:sp>
+        <p:nvSpPr>
+          <p:cNvPr id="3" name="Espaço Reservado para Conteúdo 2"/>
+          <p:cNvSpPr>
+            <a:spLocks noGrp="1"/>
+          </p:cNvSpPr>
+          <p:nvPr>
+            <p:ph idx="1"/>
+          </p:nvPr>
+        </p:nvSpPr>
+        <p:spPr/>
+        <p:txBody>
+          <a:bodyPr>
+            <a:normAutofit lnSpcReduction="10000"/>
+          </a:bodyPr>
+          <a:lstStyle/>
+          <a:p>
+            <a:r>
+              <a:rPr lang="pt-BR" dirty="0"/>
+              <a:t>Este atributo pode ser colocado em métodos da classe </a:t>
+            </a:r>
+            <a:r>
+              <a:rPr lang="pt-BR" b="1" dirty="0" err="1"/>
+              <a:t>NetworkBehaviour</a:t>
+            </a:r>
+            <a:r>
+              <a:rPr lang="pt-BR" dirty="0"/>
+              <a:t> para permitir que sejam invocados no clientes a partir de um servidor.</a:t>
+            </a:r>
+          </a:p>
+          <a:p>
+            <a:r>
+              <a:rPr lang="pt-BR" dirty="0"/>
+              <a:t>Métodos </a:t>
+            </a:r>
+            <a:r>
+              <a:rPr lang="pt-BR" b="1" dirty="0"/>
+              <a:t>[</a:t>
+            </a:r>
+            <a:r>
+              <a:rPr lang="pt-BR" b="1" dirty="0" err="1"/>
+              <a:t>ClientRPC</a:t>
+            </a:r>
+            <a:r>
+              <a:rPr lang="pt-BR" b="1" dirty="0"/>
+              <a:t>]</a:t>
+            </a:r>
+            <a:r>
+              <a:rPr lang="pt-BR" dirty="0"/>
+              <a:t> são chamados por scripts em servidores </a:t>
+            </a:r>
+            <a:r>
+              <a:rPr lang="pt-BR" dirty="0" err="1"/>
+              <a:t>Unity</a:t>
+            </a:r>
+            <a:r>
+              <a:rPr lang="pt-BR" dirty="0"/>
+              <a:t> Multiplayer, que são invocadas nos </a:t>
+            </a:r>
+            <a:r>
+              <a:rPr lang="pt-BR" dirty="0" err="1"/>
+              <a:t>GameObjects</a:t>
+            </a:r>
+            <a:r>
+              <a:rPr lang="pt-BR" dirty="0"/>
+              <a:t> correspondentes nos clientes conectados ao servidor.</a:t>
+            </a:r>
+          </a:p>
+          <a:p>
+            <a:r>
+              <a:rPr lang="pt-BR" dirty="0"/>
+              <a:t>O nome destes métodos devem iniciar com o prefixo “</a:t>
+            </a:r>
+            <a:r>
+              <a:rPr lang="pt-BR" b="1" dirty="0" err="1"/>
+              <a:t>Rpc</a:t>
+            </a:r>
+            <a:r>
+              <a:rPr lang="pt-BR" dirty="0"/>
+              <a:t>” e eles não podem ser estáticos.</a:t>
+            </a:r>
+            <a:endParaRPr lang="pt-BR" b="1" dirty="0"/>
+          </a:p>
+        </p:txBody>
+      </p:sp>
+    </p:spTree>
+    <p:extLst>
+      <p:ext uri="{BB962C8B-B14F-4D97-AF65-F5344CB8AC3E}">
+        <p14:creationId xmlns:p14="http://schemas.microsoft.com/office/powerpoint/2010/main" val="615486480"/>
+      </p:ext>
+    </p:extLst>
+  </p:cSld>
+  <p:clrMapOvr>
+    <a:masterClrMapping/>
+  </p:clrMapOvr>
+</p:sld>
+</file>
+
+<file path=ppt/slides/slide24.xml><?xml version="1.0" encoding="utf-8"?>
+<p:sld xmlns:a="http://schemas.openxmlformats.org/drawingml/2006/main" xmlns:r="http://schemas.openxmlformats.org/officeDocument/2006/relationships" xmlns:p="http://schemas.openxmlformats.org/presentationml/2006/main">
+  <p:cSld>
+    <p:spTree>
+      <p:nvGrpSpPr>
+        <p:cNvPr id="1" name=""/>
+        <p:cNvGrpSpPr/>
+        <p:nvPr/>
+      </p:nvGrpSpPr>
+      <p:grpSpPr>
+        <a:xfrm>
+          <a:off x="0" y="0"/>
+          <a:ext cx="0" cy="0"/>
+          <a:chOff x="0" y="0"/>
+          <a:chExt cx="0" cy="0"/>
+        </a:xfrm>
+      </p:grpSpPr>
+      <p:sp>
+        <p:nvSpPr>
           <p:cNvPr id="5" name="Título 4"/>
           <p:cNvSpPr>
             <a:spLocks noGrp="1"/>
@@ -5504,7 +5724,7 @@
 </p:sld>
 </file>
 
-<file path=ppt/slides/slide24.xml><?xml version="1.0" encoding="utf-8"?>
+<file path=ppt/slides/slide25.xml><?xml version="1.0" encoding="utf-8"?>
 <p:sld xmlns:a="http://schemas.openxmlformats.org/drawingml/2006/main" xmlns:r="http://schemas.openxmlformats.org/officeDocument/2006/relationships" xmlns:p="http://schemas.openxmlformats.org/presentationml/2006/main">
   <p:cSld>
     <p:spTree>

</xml_diff>